<commit_message>
Up through Chapter 3
</commit_message>
<xml_diff>
--- a/lectures3/Pythonlearn-01-Intro.pptx
+++ b/lectures3/Pythonlearn-01-Intro.pptx
@@ -8410,16 +8410,6 @@
               </a:rPr>
               <a:t>https://www.youtube.com/watch?v=XiBYM6g8Tck</a:t>
             </a:r>
-            <a:endParaRPr lang="en-US" sz="3200" u="sng" dirty="0">
-              <a:solidFill>
-                <a:srgbClr val="FFFF00"/>
-              </a:solidFill>
-              <a:latin typeface="Arial" charset="0"/>
-              <a:ea typeface="Arial" charset="0"/>
-              <a:cs typeface="Arial" charset="0"/>
-              <a:sym typeface="Cabin"/>
-              <a:hlinkClick r:id="rId4"/>
-            </a:endParaRPr>
           </a:p>
         </p:txBody>
       </p:sp>
@@ -9176,16 +9166,6 @@
               </a:rPr>
               <a:t>https://www.youtube.com/watch?v=XiBYM6g8Tck</a:t>
             </a:r>
-            <a:endParaRPr lang="en-US" sz="3200" u="sng" dirty="0">
-              <a:solidFill>
-                <a:srgbClr val="FFFF00"/>
-              </a:solidFill>
-              <a:latin typeface="Arial" charset="0"/>
-              <a:ea typeface="Arial" charset="0"/>
-              <a:cs typeface="Arial" charset="0"/>
-              <a:sym typeface="Cabin"/>
-              <a:hlinkClick r:id="rId4"/>
-            </a:endParaRPr>
           </a:p>
         </p:txBody>
       </p:sp>
@@ -22166,25 +22146,14 @@
             </a:r>
           </a:p>
           <a:p>
-            <a:pPr marL="0" marR="0" lvl="0" indent="0" algn="l" rtl="0">
-              <a:lnSpc>
-                <a:spcPct val="100000"/>
-              </a:lnSpc>
-              <a:spcBef>
-                <a:spcPts val="0"/>
-              </a:spcBef>
-              <a:spcAft>
-                <a:spcPts val="0"/>
-              </a:spcAft>
+            <a:pPr>
               <a:buClr>
                 <a:srgbClr val="FFFF00"/>
               </a:buClr>
               <a:buSzPct val="25000"/>
-              <a:buFont typeface="Cabin"/>
-              <a:buNone/>
-            </a:pPr>
-            <a:r>
-              <a:rPr lang="en-US" sz="4800" b="1" i="0" u="none" strike="noStrike" cap="none" dirty="0">
+            </a:pPr>
+            <a:r>
+              <a:rPr lang="en-US" sz="4800" b="1" dirty="0">
                 <a:solidFill>
                   <a:srgbClr val="FFFF00"/>
                 </a:solidFill>
@@ -22193,32 +22162,41 @@
                 <a:cs typeface="Courier New"/>
                 <a:sym typeface="Courier New"/>
               </a:rPr>
-              <a:t>print</a:t>
-            </a:r>
-            <a:r>
-              <a:rPr lang="en-US" sz="4800" b="1" i="0" u="none" strike="noStrike" cap="none" dirty="0">
-                <a:solidFill>
-                  <a:srgbClr val="FF7F00"/>
+              <a:t>print(</a:t>
+            </a:r>
+            <a:r>
+              <a:rPr lang="en-US" sz="4800" b="1" dirty="0">
+                <a:solidFill>
+                  <a:srgbClr val="FF9900"/>
                 </a:solidFill>
                 <a:latin typeface="Courier New"/>
                 <a:ea typeface="Courier New"/>
                 <a:cs typeface="Courier New"/>
                 <a:sym typeface="Courier New"/>
               </a:rPr>
-              <a:t> </a:t>
-            </a:r>
-            <a:r>
-              <a:rPr lang="en-US" sz="4800" b="1" i="0" u="none" strike="noStrike" cap="none" dirty="0">
-                <a:solidFill>
-                  <a:srgbClr val="FF9900"/>
+              <a:t>x</a:t>
+            </a:r>
+            <a:r>
+              <a:rPr lang="en-US" sz="4800" b="1" dirty="0" smtClean="0">
+                <a:solidFill>
+                  <a:srgbClr val="FFFF00"/>
                 </a:solidFill>
                 <a:latin typeface="Courier New"/>
                 <a:ea typeface="Courier New"/>
                 <a:cs typeface="Courier New"/>
                 <a:sym typeface="Courier New"/>
               </a:rPr>
-              <a:t>x</a:t>
-            </a:r>
+              <a:t>)</a:t>
+            </a:r>
+            <a:endParaRPr lang="en-US" sz="4800" b="1" dirty="0">
+              <a:solidFill>
+                <a:srgbClr val="FFFF00"/>
+              </a:solidFill>
+              <a:latin typeface="Courier New"/>
+              <a:ea typeface="Courier New"/>
+              <a:cs typeface="Courier New"/>
+              <a:sym typeface="Courier New"/>
+            </a:endParaRPr>
           </a:p>
         </p:txBody>
       </p:sp>
@@ -22458,8 +22436,8 @@
         </p:nvSpPr>
         <p:spPr>
           <a:xfrm>
-            <a:off x="7213600" y="2717800"/>
-            <a:ext cx="8466000" cy="4038599"/>
+            <a:off x="7213599" y="2717800"/>
+            <a:ext cx="8875949" cy="4038599"/>
           </a:xfrm>
           <a:prstGeom prst="rect">
             <a:avLst/>
@@ -22548,7 +22526,7 @@
               <a:buNone/>
             </a:pPr>
             <a:r>
-              <a:rPr lang="en-US" sz="5400" u="none" strike="noStrike" cap="none">
+              <a:rPr lang="en-US" sz="5400" u="none" strike="noStrike" cap="none" dirty="0">
                 <a:solidFill>
                   <a:schemeClr val="lt1"/>
                 </a:solidFill>
@@ -22579,7 +22557,7 @@
               <a:buNone/>
             </a:pPr>
             <a:r>
-              <a:rPr lang="en-US" sz="5400" u="none" strike="noStrike" cap="none">
+              <a:rPr lang="en-US" sz="5400" u="none" strike="noStrike" cap="none" dirty="0">
                 <a:solidFill>
                   <a:schemeClr val="lt1"/>
                 </a:solidFill>
@@ -23748,8 +23726,8 @@
         </p:nvSpPr>
         <p:spPr>
           <a:xfrm>
-            <a:off x="6859571" y="2742665"/>
-            <a:ext cx="2177699" cy="3268799"/>
+            <a:off x="6582116" y="2826310"/>
+            <a:ext cx="3244646" cy="3268799"/>
           </a:xfrm>
           <a:prstGeom prst="rect">
             <a:avLst/>
@@ -23783,7 +23761,7 @@
               <a:buNone/>
             </a:pPr>
             <a:r>
-              <a:rPr lang="en-US" sz="3600" u="none" strike="noStrike" cap="none">
+              <a:rPr lang="en-US" sz="3600" u="none" strike="noStrike" cap="none" dirty="0">
                 <a:solidFill>
                   <a:schemeClr val="lt1"/>
                 </a:solidFill>
@@ -23808,7 +23786,7 @@
               </a:spcAft>
               <a:buNone/>
             </a:pPr>
-            <a:endParaRPr sz="3600" u="none" strike="noStrike" cap="none">
+            <a:endParaRPr sz="3600" u="none" strike="noStrike" cap="none" dirty="0">
               <a:solidFill>
                 <a:srgbClr val="FF7F00"/>
               </a:solidFill>
@@ -23837,19 +23815,72 @@
               <a:buNone/>
             </a:pPr>
             <a:r>
-              <a:rPr lang="en-US" sz="3600" u="none" strike="noStrike" cap="none">
+              <a:rPr lang="en-US" sz="3600" u="none" strike="noStrike" cap="none" dirty="0">
                 <a:solidFill>
                   <a:srgbClr val="00FF00"/>
                 </a:solidFill>
-                <a:latin typeface="Arial" charset="0"/>
-                <a:ea typeface="Arial" charset="0"/>
-                <a:cs typeface="Arial" charset="0"/>
+                <a:latin typeface="Courier" charset="0"/>
+                <a:ea typeface="Courier" charset="0"/>
+                <a:cs typeface="Courier" charset="0"/>
                 <a:sym typeface="Cabin"/>
               </a:rPr>
               <a:t>x = 2</a:t>
             </a:r>
           </a:p>
           <a:p>
+            <a:pPr lvl="0">
+              <a:buClr>
+                <a:srgbClr val="FFFF00"/>
+              </a:buClr>
+              <a:buSzPct val="25000"/>
+            </a:pPr>
+            <a:r>
+              <a:rPr lang="en-US" sz="3600" u="none" strike="noStrike" cap="none" dirty="0" smtClean="0">
+                <a:solidFill>
+                  <a:srgbClr val="FFFF00"/>
+                </a:solidFill>
+                <a:latin typeface="Courier" charset="0"/>
+                <a:ea typeface="Courier" charset="0"/>
+                <a:cs typeface="Courier" charset="0"/>
+                <a:sym typeface="Cabin"/>
+              </a:rPr>
+              <a:t>print(</a:t>
+            </a:r>
+            <a:r>
+              <a:rPr lang="en-US" sz="3600" u="none" strike="noStrike" cap="none" dirty="0" smtClean="0">
+                <a:solidFill>
+                  <a:srgbClr val="00FF00"/>
+                </a:solidFill>
+                <a:latin typeface="Courier" charset="0"/>
+                <a:ea typeface="Courier" charset="0"/>
+                <a:cs typeface="Courier" charset="0"/>
+                <a:sym typeface="Cabin"/>
+              </a:rPr>
+              <a:t>x</a:t>
+            </a:r>
+            <a:r>
+              <a:rPr lang="en-US" sz="3600" dirty="0">
+                <a:solidFill>
+                  <a:srgbClr val="FFFF00"/>
+                </a:solidFill>
+                <a:latin typeface="Courier" charset="0"/>
+                <a:ea typeface="Courier" charset="0"/>
+                <a:cs typeface="Courier" charset="0"/>
+                <a:sym typeface="Cabin"/>
+              </a:rPr>
+              <a:t>)</a:t>
+            </a:r>
+            <a:endParaRPr lang="en-US" sz="3600" u="none" strike="noStrike" cap="none" dirty="0">
+              <a:solidFill>
+                <a:srgbClr val="00FF00"/>
+              </a:solidFill>
+              <a:latin typeface="Courier" charset="0"/>
+              <a:ea typeface="Courier" charset="0"/>
+              <a:cs typeface="Courier" charset="0"/>
+              <a:sym typeface="Cabin"/>
+            </a:endParaRPr>
+          </a:p>
+          <a:p>
             <a:pPr marL="0" marR="0" lvl="0" indent="0" algn="l" rtl="0">
               <a:lnSpc>
                 <a:spcPct val="100000"/>
@@ -23861,134 +23892,77 @@
                 <a:spcPts val="0"/>
               </a:spcAft>
               <a:buClr>
+                <a:srgbClr val="FF7F00"/>
+              </a:buClr>
+              <a:buSzPct val="25000"/>
+              <a:buFont typeface="Cabin"/>
+              <a:buNone/>
+            </a:pPr>
+            <a:r>
+              <a:rPr lang="en-US" sz="3600" u="none" strike="noStrike" cap="none" dirty="0">
+                <a:solidFill>
+                  <a:srgbClr val="00FF00"/>
+                </a:solidFill>
+                <a:latin typeface="Courier" charset="0"/>
+                <a:ea typeface="Courier" charset="0"/>
+                <a:cs typeface="Courier" charset="0"/>
+                <a:sym typeface="Cabin"/>
+              </a:rPr>
+              <a:t>x = x + 2</a:t>
+            </a:r>
+          </a:p>
+          <a:p>
+            <a:pPr lvl="0">
+              <a:buClr>
                 <a:srgbClr val="FFFF00"/>
               </a:buClr>
               <a:buSzPct val="25000"/>
-              <a:buFont typeface="Cabin"/>
-              <a:buNone/>
-            </a:pPr>
-            <a:r>
-              <a:rPr lang="en-US" sz="3600" u="none" strike="noStrike" cap="none">
+            </a:pPr>
+            <a:r>
+              <a:rPr lang="en-US" sz="3600" u="none" strike="noStrike" cap="none" dirty="0" smtClean="0">
                 <a:solidFill>
                   <a:srgbClr val="FFFF00"/>
                 </a:solidFill>
-                <a:latin typeface="Arial" charset="0"/>
-                <a:ea typeface="Arial" charset="0"/>
-                <a:cs typeface="Arial" charset="0"/>
-                <a:sym typeface="Cabin"/>
-              </a:rPr>
-              <a:t>print</a:t>
-            </a:r>
-            <a:r>
-              <a:rPr lang="en-US" sz="3600" u="none" strike="noStrike" cap="none">
-                <a:solidFill>
-                  <a:srgbClr val="FF7F00"/>
-                </a:solidFill>
-                <a:latin typeface="Arial" charset="0"/>
-                <a:ea typeface="Arial" charset="0"/>
-                <a:cs typeface="Arial" charset="0"/>
-                <a:sym typeface="Cabin"/>
-              </a:rPr>
-              <a:t> </a:t>
-            </a:r>
-            <a:r>
-              <a:rPr lang="en-US" sz="3600" u="none" strike="noStrike" cap="none">
+                <a:latin typeface="Courier" charset="0"/>
+                <a:ea typeface="Courier" charset="0"/>
+                <a:cs typeface="Courier" charset="0"/>
+                <a:sym typeface="Cabin"/>
+              </a:rPr>
+              <a:t>print(</a:t>
+            </a:r>
+            <a:r>
+              <a:rPr lang="en-US" sz="3600" u="none" strike="noStrike" cap="none" dirty="0" smtClean="0">
                 <a:solidFill>
                   <a:srgbClr val="00FF00"/>
                 </a:solidFill>
-                <a:latin typeface="Arial" charset="0"/>
-                <a:ea typeface="Arial" charset="0"/>
-                <a:cs typeface="Arial" charset="0"/>
+                <a:latin typeface="Courier" charset="0"/>
+                <a:ea typeface="Courier" charset="0"/>
+                <a:cs typeface="Courier" charset="0"/>
                 <a:sym typeface="Cabin"/>
               </a:rPr>
               <a:t>x</a:t>
             </a:r>
-          </a:p>
-          <a:p>
-            <a:pPr marL="0" marR="0" lvl="0" indent="0" algn="l" rtl="0">
-              <a:lnSpc>
-                <a:spcPct val="100000"/>
-              </a:lnSpc>
-              <a:spcBef>
-                <a:spcPts val="0"/>
-              </a:spcBef>
-              <a:spcAft>
-                <a:spcPts val="0"/>
-              </a:spcAft>
-              <a:buClr>
-                <a:srgbClr val="FF7F00"/>
-              </a:buClr>
-              <a:buSzPct val="25000"/>
-              <a:buFont typeface="Cabin"/>
-              <a:buNone/>
-            </a:pPr>
-            <a:r>
-              <a:rPr lang="en-US" sz="3600" u="none" strike="noStrike" cap="none">
-                <a:solidFill>
-                  <a:srgbClr val="00FF00"/>
-                </a:solidFill>
-                <a:latin typeface="Arial" charset="0"/>
-                <a:ea typeface="Arial" charset="0"/>
-                <a:cs typeface="Arial" charset="0"/>
-                <a:sym typeface="Cabin"/>
-              </a:rPr>
-              <a:t>x = x + 2</a:t>
-            </a:r>
-          </a:p>
-          <a:p>
-            <a:pPr marL="0" marR="0" lvl="0" indent="0" algn="l" rtl="0">
-              <a:lnSpc>
-                <a:spcPct val="100000"/>
-              </a:lnSpc>
-              <a:spcBef>
-                <a:spcPts val="0"/>
-              </a:spcBef>
-              <a:spcAft>
-                <a:spcPts val="0"/>
-              </a:spcAft>
-              <a:buClr>
-                <a:srgbClr val="FFFF00"/>
-              </a:buClr>
-              <a:buSzPct val="25000"/>
-              <a:buFont typeface="Cabin"/>
-              <a:buNone/>
-            </a:pPr>
-            <a:r>
-              <a:rPr lang="en-US" sz="3600" u="none" strike="noStrike" cap="none">
+            <a:r>
+              <a:rPr lang="en-US" sz="3600" dirty="0">
                 <a:solidFill>
                   <a:srgbClr val="FFFF00"/>
                 </a:solidFill>
-                <a:latin typeface="Arial" charset="0"/>
-                <a:ea typeface="Arial" charset="0"/>
-                <a:cs typeface="Arial" charset="0"/>
-                <a:sym typeface="Cabin"/>
-              </a:rPr>
-              <a:t>print</a:t>
-            </a:r>
-            <a:r>
-              <a:rPr lang="en-US" sz="3600" u="none" strike="noStrike" cap="none">
-                <a:solidFill>
-                  <a:srgbClr val="FF7F00"/>
-                </a:solidFill>
-                <a:latin typeface="Arial" charset="0"/>
-                <a:ea typeface="Arial" charset="0"/>
-                <a:cs typeface="Arial" charset="0"/>
-                <a:sym typeface="Cabin"/>
-              </a:rPr>
-              <a:t> </a:t>
-            </a:r>
-            <a:r>
-              <a:rPr lang="en-US" sz="3600" u="none" strike="noStrike" cap="none">
-                <a:solidFill>
-                  <a:srgbClr val="00FF00"/>
-                </a:solidFill>
-                <a:latin typeface="Arial" charset="0"/>
-                <a:ea typeface="Arial" charset="0"/>
-                <a:cs typeface="Arial" charset="0"/>
-                <a:sym typeface="Cabin"/>
-              </a:rPr>
-              <a:t>x</a:t>
-            </a:r>
+                <a:latin typeface="Courier" charset="0"/>
+                <a:ea typeface="Courier" charset="0"/>
+                <a:cs typeface="Courier" charset="0"/>
+                <a:sym typeface="Cabin"/>
+              </a:rPr>
+              <a:t>)</a:t>
+            </a:r>
+            <a:endParaRPr lang="en-US" sz="3600" u="none" strike="noStrike" cap="none" dirty="0">
+              <a:solidFill>
+                <a:srgbClr val="00FF00"/>
+              </a:solidFill>
+              <a:latin typeface="Courier" charset="0"/>
+              <a:ea typeface="Courier" charset="0"/>
+              <a:cs typeface="Courier" charset="0"/>
+              <a:sym typeface="Cabin"/>
+            </a:endParaRPr>
           </a:p>
         </p:txBody>
       </p:sp>
@@ -24246,7 +24220,7 @@
               <a:buNone/>
             </a:pPr>
             <a:r>
-              <a:rPr lang="en-US" sz="3500" u="none" strike="noStrike" cap="none">
+              <a:rPr lang="en-US" sz="3500" u="none" strike="noStrike" cap="none" dirty="0" smtClean="0">
                 <a:solidFill>
                   <a:schemeClr val="lt1"/>
                 </a:solidFill>
@@ -24255,8 +24229,17 @@
                 <a:cs typeface="Arial" charset="0"/>
                 <a:sym typeface="Cabin"/>
               </a:rPr>
-              <a:t>print x</a:t>
-            </a:r>
+              <a:t>print(x)</a:t>
+            </a:r>
+            <a:endParaRPr lang="en-US" sz="3500" u="none" strike="noStrike" cap="none" dirty="0">
+              <a:solidFill>
+                <a:schemeClr val="lt1"/>
+              </a:solidFill>
+              <a:latin typeface="Arial" charset="0"/>
+              <a:ea typeface="Arial" charset="0"/>
+              <a:cs typeface="Arial" charset="0"/>
+              <a:sym typeface="Cabin"/>
+            </a:endParaRPr>
           </a:p>
         </p:txBody>
       </p:sp>
@@ -24424,7 +24407,7 @@
               <a:buNone/>
             </a:pPr>
             <a:r>
-              <a:rPr lang="en-US" sz="3500" u="none" strike="noStrike" cap="none">
+              <a:rPr lang="en-US" sz="3500" u="none" strike="noStrike" cap="none" dirty="0" smtClean="0">
                 <a:solidFill>
                   <a:schemeClr val="lt1"/>
                 </a:solidFill>
@@ -24433,8 +24416,17 @@
                 <a:cs typeface="Arial" charset="0"/>
                 <a:sym typeface="Cabin"/>
               </a:rPr>
-              <a:t>print x</a:t>
-            </a:r>
+              <a:t>print(x)</a:t>
+            </a:r>
+            <a:endParaRPr lang="en-US" sz="3500" u="none" strike="noStrike" cap="none" dirty="0">
+              <a:solidFill>
+                <a:schemeClr val="lt1"/>
+              </a:solidFill>
+              <a:latin typeface="Arial" charset="0"/>
+              <a:ea typeface="Arial" charset="0"/>
+              <a:cs typeface="Arial" charset="0"/>
+              <a:sym typeface="Cabin"/>
+            </a:endParaRPr>
           </a:p>
         </p:txBody>
       </p:sp>
@@ -24471,9 +24463,9 @@
           <p:nvPr/>
         </p:nvCxnSpPr>
         <p:spPr>
-          <a:xfrm rot="10800000">
-            <a:off x="8515349" y="4661789"/>
-            <a:ext cx="3190200" cy="59100"/>
+          <a:xfrm flipH="1">
+            <a:off x="8774349" y="4669277"/>
+            <a:ext cx="2762656" cy="245088"/>
           </a:xfrm>
           <a:prstGeom prst="straightConnector1">
             <a:avLst/>
@@ -24498,8 +24490,8 @@
         </p:nvCxnSpPr>
         <p:spPr>
           <a:xfrm flipH="1">
-            <a:off x="8450400" y="5278965"/>
-            <a:ext cx="3326699" cy="475199"/>
+            <a:off x="8774349" y="5278965"/>
+            <a:ext cx="3002751" cy="557631"/>
           </a:xfrm>
           <a:prstGeom prst="straightConnector1">
             <a:avLst/>
@@ -25091,7 +25083,7 @@
         </p:nvSpPr>
         <p:spPr>
           <a:xfrm>
-            <a:off x="13314362" y="3562350"/>
+            <a:off x="13684013" y="3562350"/>
             <a:ext cx="1581150" cy="2184399"/>
           </a:xfrm>
           <a:prstGeom prst="rect">
@@ -25234,7 +25226,7 @@
         <p:spPr>
           <a:xfrm>
             <a:off x="7799386" y="2873375"/>
-            <a:ext cx="3757614" cy="4984749"/>
+            <a:ext cx="4535286" cy="4984749"/>
           </a:xfrm>
           <a:prstGeom prst="rect">
             <a:avLst/>
@@ -25268,7 +25260,7 @@
               <a:buNone/>
             </a:pPr>
             <a:r>
-              <a:rPr lang="en-US" sz="3600" u="none" strike="noStrike" cap="none">
+              <a:rPr lang="en-US" sz="3600" u="none" strike="noStrike" cap="none" dirty="0">
                 <a:solidFill>
                   <a:schemeClr val="lt1"/>
                 </a:solidFill>
@@ -25322,13 +25314,13 @@
               <a:buNone/>
             </a:pPr>
             <a:r>
-              <a:rPr lang="en-US" sz="3600" u="none" strike="noStrike" cap="none" dirty="0">
+              <a:rPr lang="en-US" sz="2800" u="none" strike="noStrike" cap="none" dirty="0">
                 <a:solidFill>
                   <a:srgbClr val="00FF00"/>
                 </a:solidFill>
-                <a:latin typeface="Arial" charset="0"/>
-                <a:ea typeface="Arial" charset="0"/>
-                <a:cs typeface="Arial" charset="0"/>
+                <a:latin typeface="Courier" charset="0"/>
+                <a:ea typeface="Courier" charset="0"/>
+                <a:cs typeface="Courier" charset="0"/>
                 <a:sym typeface="Cabin"/>
               </a:rPr>
               <a:t>x = 5</a:t>
@@ -25353,251 +25345,104 @@
               <a:buNone/>
             </a:pPr>
             <a:r>
-              <a:rPr lang="en-US" sz="3600" u="none" strike="noStrike" cap="none" dirty="0">
+              <a:rPr lang="en-US" sz="2800" u="none" strike="noStrike" cap="none" dirty="0">
                 <a:solidFill>
                   <a:srgbClr val="FFFF00"/>
                 </a:solidFill>
-                <a:latin typeface="Arial" charset="0"/>
-                <a:ea typeface="Arial" charset="0"/>
-                <a:cs typeface="Arial" charset="0"/>
+                <a:latin typeface="Courier" charset="0"/>
+                <a:ea typeface="Courier" charset="0"/>
+                <a:cs typeface="Courier" charset="0"/>
                 <a:sym typeface="Cabin"/>
               </a:rPr>
               <a:t>if</a:t>
             </a:r>
             <a:r>
-              <a:rPr lang="en-US" sz="3600" u="none" strike="noStrike" cap="none" dirty="0">
+              <a:rPr lang="en-US" sz="2800" u="none" strike="noStrike" cap="none" dirty="0">
                 <a:solidFill>
                   <a:srgbClr val="FF7F00"/>
                 </a:solidFill>
-                <a:latin typeface="Arial" charset="0"/>
-                <a:ea typeface="Arial" charset="0"/>
-                <a:cs typeface="Arial" charset="0"/>
+                <a:latin typeface="Courier" charset="0"/>
+                <a:ea typeface="Courier" charset="0"/>
+                <a:cs typeface="Courier" charset="0"/>
                 <a:sym typeface="Cabin"/>
               </a:rPr>
               <a:t> </a:t>
             </a:r>
             <a:r>
-              <a:rPr lang="en-US" sz="3600" u="none" strike="noStrike" cap="none" dirty="0">
+              <a:rPr lang="en-US" sz="2800" u="none" strike="noStrike" cap="none" dirty="0">
                 <a:solidFill>
                   <a:srgbClr val="00FF00"/>
                 </a:solidFill>
-                <a:latin typeface="Arial" charset="0"/>
-                <a:ea typeface="Arial" charset="0"/>
-                <a:cs typeface="Arial" charset="0"/>
+                <a:latin typeface="Courier" charset="0"/>
+                <a:ea typeface="Courier" charset="0"/>
+                <a:cs typeface="Courier" charset="0"/>
                 <a:sym typeface="Cabin"/>
               </a:rPr>
               <a:t>x &lt; 10:</a:t>
             </a:r>
           </a:p>
           <a:p>
-            <a:pPr marL="0" marR="0" lvl="0" indent="0" algn="l" rtl="0">
-              <a:lnSpc>
-                <a:spcPct val="100000"/>
-              </a:lnSpc>
-              <a:spcBef>
-                <a:spcPts val="0"/>
-              </a:spcBef>
-              <a:spcAft>
-                <a:spcPts val="0"/>
-              </a:spcAft>
+            <a:pPr lvl="0">
               <a:buClr>
                 <a:srgbClr val="FF7F00"/>
               </a:buClr>
               <a:buSzPct val="25000"/>
-              <a:buFont typeface="Cabin"/>
-              <a:buNone/>
-            </a:pPr>
-            <a:r>
-              <a:rPr lang="en-US" sz="3600" u="none" strike="noStrike" cap="none" dirty="0">
+            </a:pPr>
+            <a:r>
+              <a:rPr lang="en-US" sz="2800" u="none" strike="noStrike" cap="none" dirty="0">
                 <a:solidFill>
                   <a:srgbClr val="FF7F00"/>
                 </a:solidFill>
-                <a:latin typeface="Arial" charset="0"/>
-                <a:ea typeface="Arial" charset="0"/>
-                <a:cs typeface="Arial" charset="0"/>
+                <a:latin typeface="Courier" charset="0"/>
+                <a:ea typeface="Courier" charset="0"/>
+                <a:cs typeface="Courier" charset="0"/>
                 <a:sym typeface="Cabin"/>
               </a:rPr>
               <a:t>    </a:t>
             </a:r>
             <a:r>
-              <a:rPr lang="en-US" sz="3600" u="none" strike="noStrike" cap="none" dirty="0">
+              <a:rPr lang="en-US" sz="2800" u="none" strike="noStrike" cap="none" dirty="0" smtClean="0">
                 <a:solidFill>
                   <a:srgbClr val="FFFF00"/>
                 </a:solidFill>
-                <a:latin typeface="Arial" charset="0"/>
-                <a:ea typeface="Arial" charset="0"/>
-                <a:cs typeface="Arial" charset="0"/>
-                <a:sym typeface="Cabin"/>
-              </a:rPr>
-              <a:t>print</a:t>
-            </a:r>
-            <a:r>
-              <a:rPr lang="en-US" sz="3600" u="none" strike="noStrike" cap="none" dirty="0">
-                <a:solidFill>
-                  <a:srgbClr val="FF7F00"/>
-                </a:solidFill>
-                <a:latin typeface="Arial" charset="0"/>
-                <a:ea typeface="Arial" charset="0"/>
-                <a:cs typeface="Arial" charset="0"/>
-                <a:sym typeface="Cabin"/>
-              </a:rPr>
-              <a:t> </a:t>
-            </a:r>
-            <a:r>
-              <a:rPr lang="en-US" sz="3600" u="none" strike="noStrike" cap="none" dirty="0">
+                <a:latin typeface="Courier" charset="0"/>
+                <a:ea typeface="Courier" charset="0"/>
+                <a:cs typeface="Courier" charset="0"/>
+                <a:sym typeface="Cabin"/>
+              </a:rPr>
+              <a:t>print(</a:t>
+            </a:r>
+            <a:r>
+              <a:rPr lang="en-US" sz="2800" u="none" strike="noStrike" cap="none" dirty="0" smtClean="0">
                 <a:solidFill>
                   <a:srgbClr val="00FF00"/>
                 </a:solidFill>
-                <a:latin typeface="Arial" charset="0"/>
-                <a:ea typeface="Arial" charset="0"/>
-                <a:cs typeface="Arial" charset="0"/>
+                <a:latin typeface="Courier" charset="0"/>
+                <a:ea typeface="Courier" charset="0"/>
+                <a:cs typeface="Courier" charset="0"/>
                 <a:sym typeface="Cabin"/>
               </a:rPr>
               <a:t>'Smaller’</a:t>
             </a:r>
-          </a:p>
-          <a:p>
-            <a:pPr marL="0" marR="0" lvl="0" indent="0" algn="l" rtl="0">
-              <a:lnSpc>
-                <a:spcPct val="100000"/>
-              </a:lnSpc>
-              <a:spcBef>
-                <a:spcPts val="0"/>
-              </a:spcBef>
-              <a:spcAft>
-                <a:spcPts val="0"/>
-              </a:spcAft>
-              <a:buClr>
-                <a:srgbClr val="FFFF00"/>
-              </a:buClr>
-              <a:buSzPct val="25000"/>
-              <a:buFont typeface="Cabin"/>
-              <a:buNone/>
-            </a:pPr>
-            <a:r>
-              <a:rPr lang="en-US" sz="3600" u="none" strike="noStrike" cap="none" dirty="0">
+            <a:r>
+              <a:rPr lang="en-US" sz="2800" dirty="0" smtClean="0">
                 <a:solidFill>
                   <a:srgbClr val="FFFF00"/>
                 </a:solidFill>
-                <a:latin typeface="Arial" charset="0"/>
-                <a:ea typeface="Arial" charset="0"/>
-                <a:cs typeface="Arial" charset="0"/>
-                <a:sym typeface="Cabin"/>
-              </a:rPr>
-              <a:t>if</a:t>
-            </a:r>
-            <a:r>
-              <a:rPr lang="en-US" sz="3600" u="none" strike="noStrike" cap="none" dirty="0">
-                <a:solidFill>
-                  <a:srgbClr val="FF7F00"/>
-                </a:solidFill>
-                <a:latin typeface="Arial" charset="0"/>
-                <a:ea typeface="Arial" charset="0"/>
-                <a:cs typeface="Arial" charset="0"/>
-                <a:sym typeface="Cabin"/>
-              </a:rPr>
-              <a:t> </a:t>
-            </a:r>
-            <a:r>
-              <a:rPr lang="en-US" sz="3600" u="none" strike="noStrike" cap="none" dirty="0">
-                <a:solidFill>
-                  <a:srgbClr val="00FF00"/>
-                </a:solidFill>
-                <a:latin typeface="Arial" charset="0"/>
-                <a:ea typeface="Arial" charset="0"/>
-                <a:cs typeface="Arial" charset="0"/>
-                <a:sym typeface="Cabin"/>
-              </a:rPr>
-              <a:t>x &gt; 20:</a:t>
-            </a:r>
-          </a:p>
-          <a:p>
-            <a:pPr marL="0" marR="0" lvl="0" indent="0" algn="l" rtl="0">
-              <a:lnSpc>
-                <a:spcPct val="100000"/>
-              </a:lnSpc>
-              <a:spcBef>
-                <a:spcPts val="0"/>
-              </a:spcBef>
-              <a:spcAft>
-                <a:spcPts val="0"/>
-              </a:spcAft>
-              <a:buClr>
-                <a:srgbClr val="FF7F00"/>
-              </a:buClr>
-              <a:buSzPct val="25000"/>
-              <a:buFont typeface="Cabin"/>
-              <a:buNone/>
-            </a:pPr>
-            <a:r>
-              <a:rPr lang="en-US" sz="3600" u="none" strike="noStrike" cap="none" dirty="0">
-                <a:solidFill>
-                  <a:srgbClr val="FF7F00"/>
-                </a:solidFill>
-                <a:latin typeface="Arial" charset="0"/>
-                <a:ea typeface="Arial" charset="0"/>
-                <a:cs typeface="Arial" charset="0"/>
-                <a:sym typeface="Cabin"/>
-              </a:rPr>
-              <a:t>     </a:t>
-            </a:r>
-            <a:r>
-              <a:rPr lang="en-US" sz="3600" u="none" strike="noStrike" cap="none" dirty="0">
-                <a:solidFill>
-                  <a:srgbClr val="FFFF00"/>
-                </a:solidFill>
-                <a:latin typeface="Arial" charset="0"/>
-                <a:ea typeface="Arial" charset="0"/>
-                <a:cs typeface="Arial" charset="0"/>
-                <a:sym typeface="Cabin"/>
-              </a:rPr>
-              <a:t>print</a:t>
-            </a:r>
-            <a:r>
-              <a:rPr lang="en-US" sz="3600" u="none" strike="noStrike" cap="none" dirty="0">
-                <a:solidFill>
-                  <a:srgbClr val="FF7F00"/>
-                </a:solidFill>
-                <a:latin typeface="Arial" charset="0"/>
-                <a:ea typeface="Arial" charset="0"/>
-                <a:cs typeface="Arial" charset="0"/>
-                <a:sym typeface="Cabin"/>
-              </a:rPr>
-              <a:t> </a:t>
-            </a:r>
-            <a:r>
-              <a:rPr lang="en-US" sz="3600" u="none" strike="noStrike" cap="none" dirty="0">
-                <a:solidFill>
-                  <a:srgbClr val="00FF00"/>
-                </a:solidFill>
-                <a:latin typeface="Arial" charset="0"/>
-                <a:ea typeface="Arial" charset="0"/>
-                <a:cs typeface="Arial" charset="0"/>
-                <a:sym typeface="Cabin"/>
-              </a:rPr>
-              <a:t>'Bigger'</a:t>
-            </a:r>
-          </a:p>
-          <a:p>
-            <a:pPr marL="0" marR="0" lvl="0" indent="0" algn="ctr" rtl="0">
-              <a:lnSpc>
-                <a:spcPct val="100000"/>
-              </a:lnSpc>
-              <a:spcBef>
-                <a:spcPts val="0"/>
-              </a:spcBef>
-              <a:spcAft>
-                <a:spcPts val="0"/>
-              </a:spcAft>
-              <a:buNone/>
-            </a:pPr>
-            <a:endParaRPr sz="3600" u="none" strike="noStrike" cap="none" dirty="0">
+                <a:latin typeface="Courier" charset="0"/>
+                <a:ea typeface="Courier" charset="0"/>
+                <a:cs typeface="Courier" charset="0"/>
+                <a:sym typeface="Cabin"/>
+              </a:rPr>
+              <a:t>)</a:t>
+            </a:r>
+            <a:endParaRPr lang="en-US" sz="2800" u="none" strike="noStrike" cap="none" dirty="0">
               <a:solidFill>
                 <a:srgbClr val="00FF00"/>
               </a:solidFill>
-              <a:latin typeface="Arial" charset="0"/>
-              <a:ea typeface="Arial" charset="0"/>
-              <a:cs typeface="Arial" charset="0"/>
+              <a:latin typeface="Courier" charset="0"/>
+              <a:ea typeface="Courier" charset="0"/>
+              <a:cs typeface="Courier" charset="0"/>
               <a:sym typeface="Cabin"/>
             </a:endParaRPr>
           </a:p>
@@ -25620,41 +25465,206 @@
               <a:buNone/>
             </a:pPr>
             <a:r>
-              <a:rPr lang="en-US" sz="3600" u="none" strike="noStrike" cap="none" dirty="0">
+              <a:rPr lang="en-US" sz="2800" u="none" strike="noStrike" cap="none" dirty="0">
                 <a:solidFill>
                   <a:srgbClr val="FFFF00"/>
                 </a:solidFill>
-                <a:latin typeface="Arial" charset="0"/>
-                <a:ea typeface="Arial" charset="0"/>
-                <a:cs typeface="Arial" charset="0"/>
-                <a:sym typeface="Cabin"/>
-              </a:rPr>
-              <a:t>print</a:t>
-            </a:r>
-            <a:r>
-              <a:rPr lang="en-US" sz="3600" u="none" strike="noStrike" cap="none" dirty="0">
+                <a:latin typeface="Courier" charset="0"/>
+                <a:ea typeface="Courier" charset="0"/>
+                <a:cs typeface="Courier" charset="0"/>
+                <a:sym typeface="Cabin"/>
+              </a:rPr>
+              <a:t>if</a:t>
+            </a:r>
+            <a:r>
+              <a:rPr lang="en-US" sz="2800" u="none" strike="noStrike" cap="none" dirty="0">
                 <a:solidFill>
                   <a:srgbClr val="FF7F00"/>
                 </a:solidFill>
-                <a:latin typeface="Arial" charset="0"/>
-                <a:ea typeface="Arial" charset="0"/>
-                <a:cs typeface="Arial" charset="0"/>
+                <a:latin typeface="Courier" charset="0"/>
+                <a:ea typeface="Courier" charset="0"/>
+                <a:cs typeface="Courier" charset="0"/>
                 <a:sym typeface="Cabin"/>
               </a:rPr>
               <a:t> </a:t>
             </a:r>
             <a:r>
-              <a:rPr lang="en-US" sz="3600" u="none" strike="noStrike" cap="none" dirty="0">
+              <a:rPr lang="en-US" sz="2800" u="none" strike="noStrike" cap="none" dirty="0">
                 <a:solidFill>
                   <a:srgbClr val="00FF00"/>
                 </a:solidFill>
-                <a:latin typeface="Arial" charset="0"/>
-                <a:ea typeface="Arial" charset="0"/>
-                <a:cs typeface="Arial" charset="0"/>
-                <a:sym typeface="Cabin"/>
-              </a:rPr>
-              <a:t>'Finis'</a:t>
-            </a:r>
+                <a:latin typeface="Courier" charset="0"/>
+                <a:ea typeface="Courier" charset="0"/>
+                <a:cs typeface="Courier" charset="0"/>
+                <a:sym typeface="Cabin"/>
+              </a:rPr>
+              <a:t>x &gt; 20:</a:t>
+            </a:r>
+          </a:p>
+          <a:p>
+            <a:pPr lvl="0">
+              <a:buClr>
+                <a:srgbClr val="FF7F00"/>
+              </a:buClr>
+              <a:buSzPct val="25000"/>
+            </a:pPr>
+            <a:r>
+              <a:rPr lang="en-US" sz="2800" u="none" strike="noStrike" cap="none" dirty="0">
+                <a:solidFill>
+                  <a:srgbClr val="FF7F00"/>
+                </a:solidFill>
+                <a:latin typeface="Courier" charset="0"/>
+                <a:ea typeface="Courier" charset="0"/>
+                <a:cs typeface="Courier" charset="0"/>
+                <a:sym typeface="Cabin"/>
+              </a:rPr>
+              <a:t>     </a:t>
+            </a:r>
+            <a:r>
+              <a:rPr lang="en-US" sz="2800" u="none" strike="noStrike" cap="none" dirty="0" smtClean="0">
+                <a:solidFill>
+                  <a:srgbClr val="FFFF00"/>
+                </a:solidFill>
+                <a:latin typeface="Courier" charset="0"/>
+                <a:ea typeface="Courier" charset="0"/>
+                <a:cs typeface="Courier" charset="0"/>
+                <a:sym typeface="Cabin"/>
+              </a:rPr>
+              <a:t>print(</a:t>
+            </a:r>
+            <a:r>
+              <a:rPr lang="en-US" sz="2800" u="none" strike="noStrike" cap="none" dirty="0" smtClean="0">
+                <a:solidFill>
+                  <a:srgbClr val="00FF00"/>
+                </a:solidFill>
+                <a:latin typeface="Courier" charset="0"/>
+                <a:ea typeface="Courier" charset="0"/>
+                <a:cs typeface="Courier" charset="0"/>
+                <a:sym typeface="Cabin"/>
+              </a:rPr>
+              <a:t>'Bigger’</a:t>
+            </a:r>
+            <a:r>
+              <a:rPr lang="en-US" sz="2800" dirty="0" smtClean="0">
+                <a:solidFill>
+                  <a:srgbClr val="FFFF00"/>
+                </a:solidFill>
+                <a:latin typeface="Courier" charset="0"/>
+                <a:ea typeface="Courier" charset="0"/>
+                <a:cs typeface="Courier" charset="0"/>
+                <a:sym typeface="Cabin"/>
+              </a:rPr>
+              <a:t>)</a:t>
+            </a:r>
+            <a:endParaRPr lang="en-US" sz="2800" u="none" strike="noStrike" cap="none" dirty="0">
+              <a:solidFill>
+                <a:srgbClr val="00FF00"/>
+              </a:solidFill>
+              <a:latin typeface="Courier" charset="0"/>
+              <a:ea typeface="Courier" charset="0"/>
+              <a:cs typeface="Courier" charset="0"/>
+              <a:sym typeface="Cabin"/>
+            </a:endParaRPr>
+          </a:p>
+          <a:p>
+            <a:pPr marL="0" marR="0" lvl="0" indent="0" algn="ctr" rtl="0">
+              <a:lnSpc>
+                <a:spcPct val="100000"/>
+              </a:lnSpc>
+              <a:spcBef>
+                <a:spcPts val="0"/>
+              </a:spcBef>
+              <a:spcAft>
+                <a:spcPts val="0"/>
+              </a:spcAft>
+              <a:buNone/>
+            </a:pPr>
+            <a:endParaRPr sz="2800" u="none" strike="noStrike" cap="none" dirty="0">
+              <a:solidFill>
+                <a:srgbClr val="00FF00"/>
+              </a:solidFill>
+              <a:latin typeface="Courier" charset="0"/>
+              <a:ea typeface="Courier" charset="0"/>
+              <a:cs typeface="Courier" charset="0"/>
+              <a:sym typeface="Cabin"/>
+            </a:endParaRPr>
+          </a:p>
+          <a:p>
+            <a:pPr lvl="0">
+              <a:buClr>
+                <a:srgbClr val="FFFF00"/>
+              </a:buClr>
+              <a:buSzPct val="25000"/>
+            </a:pPr>
+            <a:r>
+              <a:rPr lang="en-US" sz="2800" u="none" strike="noStrike" cap="none" dirty="0" smtClean="0">
+                <a:solidFill>
+                  <a:srgbClr val="FFFF00"/>
+                </a:solidFill>
+                <a:latin typeface="Courier" charset="0"/>
+                <a:ea typeface="Courier" charset="0"/>
+                <a:cs typeface="Courier" charset="0"/>
+                <a:sym typeface="Cabin"/>
+              </a:rPr>
+              <a:t>print(</a:t>
+            </a:r>
+            <a:r>
+              <a:rPr lang="en-US" sz="2800" u="none" strike="noStrike" cap="none" dirty="0" smtClean="0">
+                <a:solidFill>
+                  <a:srgbClr val="FF7F00"/>
+                </a:solidFill>
+                <a:latin typeface="Courier" charset="0"/>
+                <a:ea typeface="Courier" charset="0"/>
+                <a:cs typeface="Courier" charset="0"/>
+                <a:sym typeface="Cabin"/>
+              </a:rPr>
+              <a:t> </a:t>
+            </a:r>
+            <a:r>
+              <a:rPr lang="en-US" sz="2800" u="none" strike="noStrike" cap="none" dirty="0">
+                <a:solidFill>
+                  <a:srgbClr val="00FF00"/>
+                </a:solidFill>
+                <a:latin typeface="Courier" charset="0"/>
+                <a:ea typeface="Courier" charset="0"/>
+                <a:cs typeface="Courier" charset="0"/>
+                <a:sym typeface="Cabin"/>
+              </a:rPr>
+              <a:t>'Finis</a:t>
+            </a:r>
+            <a:r>
+              <a:rPr lang="en-US" sz="2800" u="none" strike="noStrike" cap="none" dirty="0" smtClean="0">
+                <a:solidFill>
+                  <a:srgbClr val="00FF00"/>
+                </a:solidFill>
+                <a:latin typeface="Courier" charset="0"/>
+                <a:ea typeface="Courier" charset="0"/>
+                <a:cs typeface="Courier" charset="0"/>
+                <a:sym typeface="Cabin"/>
+              </a:rPr>
+              <a:t>'</a:t>
+            </a:r>
+            <a:r>
+              <a:rPr lang="en-US" sz="2800" dirty="0" smtClean="0">
+                <a:solidFill>
+                  <a:srgbClr val="FFFF00"/>
+                </a:solidFill>
+                <a:latin typeface="Courier" charset="0"/>
+                <a:ea typeface="Courier" charset="0"/>
+                <a:cs typeface="Courier" charset="0"/>
+                <a:sym typeface="Cabin"/>
+              </a:rPr>
+              <a:t>)</a:t>
+            </a:r>
+            <a:endParaRPr lang="en-US" sz="2800" u="none" strike="noStrike" cap="none" dirty="0">
+              <a:solidFill>
+                <a:srgbClr val="00FF00"/>
+              </a:solidFill>
+              <a:latin typeface="Courier" charset="0"/>
+              <a:ea typeface="Courier" charset="0"/>
+              <a:cs typeface="Courier" charset="0"/>
+              <a:sym typeface="Cabin"/>
+            </a:endParaRPr>
           </a:p>
         </p:txBody>
       </p:sp>
@@ -25757,8 +25767,8 @@
         </p:nvCxnSpPr>
         <p:spPr>
           <a:xfrm flipH="1">
-            <a:off x="11557000" y="4941849"/>
-            <a:ext cx="1558786" cy="423901"/>
+            <a:off x="12334672" y="4948237"/>
+            <a:ext cx="1206230" cy="417513"/>
           </a:xfrm>
           <a:prstGeom prst="straightConnector1">
             <a:avLst/>
@@ -25925,7 +25935,7 @@
               <a:buNone/>
             </a:pPr>
             <a:r>
-              <a:rPr lang="en-US" sz="3000" u="none" strike="noStrike" cap="none">
+              <a:rPr lang="en-US" sz="3000" u="none" strike="noStrike" cap="none" dirty="0" smtClean="0">
                 <a:solidFill>
                   <a:schemeClr val="lt1"/>
                 </a:solidFill>
@@ -25934,8 +25944,17 @@
                 <a:cs typeface="Arial" charset="0"/>
                 <a:sym typeface="Cabin"/>
               </a:rPr>
-              <a:t>print 'Smaller'</a:t>
-            </a:r>
+              <a:t>print('Smaller’)</a:t>
+            </a:r>
+            <a:endParaRPr lang="en-US" sz="3000" u="none" strike="noStrike" cap="none" dirty="0">
+              <a:solidFill>
+                <a:schemeClr val="lt1"/>
+              </a:solidFill>
+              <a:latin typeface="Arial" charset="0"/>
+              <a:ea typeface="Arial" charset="0"/>
+              <a:cs typeface="Arial" charset="0"/>
+              <a:sym typeface="Cabin"/>
+            </a:endParaRPr>
           </a:p>
         </p:txBody>
       </p:sp>
@@ -26193,7 +26212,7 @@
               <a:buNone/>
             </a:pPr>
             <a:r>
-              <a:rPr lang="en-US" sz="3000" u="none" strike="noStrike" cap="none">
+              <a:rPr lang="en-US" sz="3000" u="none" strike="noStrike" cap="none" dirty="0" smtClean="0">
                 <a:solidFill>
                   <a:schemeClr val="lt1"/>
                 </a:solidFill>
@@ -26202,8 +26221,17 @@
                 <a:cs typeface="Arial" charset="0"/>
                 <a:sym typeface="Cabin"/>
               </a:rPr>
-              <a:t>print 'Bigger'</a:t>
-            </a:r>
+              <a:t>print('Bigger’)</a:t>
+            </a:r>
+            <a:endParaRPr lang="en-US" sz="3000" u="none" strike="noStrike" cap="none" dirty="0">
+              <a:solidFill>
+                <a:schemeClr val="lt1"/>
+              </a:solidFill>
+              <a:latin typeface="Arial" charset="0"/>
+              <a:ea typeface="Arial" charset="0"/>
+              <a:cs typeface="Arial" charset="0"/>
+              <a:sym typeface="Cabin"/>
+            </a:endParaRPr>
           </a:p>
         </p:txBody>
       </p:sp>
@@ -26319,8 +26347,8 @@
         </p:nvCxnSpPr>
         <p:spPr>
           <a:xfrm flipH="1">
-            <a:off x="10185400" y="5492750"/>
-            <a:ext cx="3006724" cy="2051050"/>
+            <a:off x="11431588" y="5508625"/>
+            <a:ext cx="2109314" cy="1654175"/>
           </a:xfrm>
           <a:prstGeom prst="straightConnector1">
             <a:avLst/>
@@ -26386,7 +26414,7 @@
               <a:buNone/>
             </a:pPr>
             <a:r>
-              <a:rPr lang="en-US" sz="3000" u="none" strike="noStrike" cap="none">
+              <a:rPr lang="en-US" sz="3000" u="none" strike="noStrike" cap="none" dirty="0" smtClean="0">
                 <a:solidFill>
                   <a:schemeClr val="lt1"/>
                 </a:solidFill>
@@ -26395,8 +26423,17 @@
                 <a:cs typeface="Arial" charset="0"/>
                 <a:sym typeface="Cabin"/>
               </a:rPr>
-              <a:t>print 'Finis'</a:t>
-            </a:r>
+              <a:t>print('Finis’)</a:t>
+            </a:r>
+            <a:endParaRPr lang="en-US" sz="3000" u="none" strike="noStrike" cap="none" dirty="0">
+              <a:solidFill>
+                <a:schemeClr val="lt1"/>
+              </a:solidFill>
+              <a:latin typeface="Arial" charset="0"/>
+              <a:ea typeface="Arial" charset="0"/>
+              <a:cs typeface="Arial" charset="0"/>
+              <a:sym typeface="Cabin"/>
+            </a:endParaRPr>
           </a:p>
         </p:txBody>
       </p:sp>
@@ -29316,13 +29353,915 @@
       </p:grpSpPr>
       <p:sp>
         <p:nvSpPr>
+          <p:cNvPr id="9" name="Shape 625"/>
+          <p:cNvSpPr txBox="1"/>
+          <p:nvPr/>
+        </p:nvSpPr>
+        <p:spPr>
+          <a:xfrm>
+            <a:off x="998325" y="778213"/>
+            <a:ext cx="10035299" cy="7548664"/>
+          </a:xfrm>
+          <a:prstGeom prst="rect">
+            <a:avLst/>
+          </a:prstGeom>
+          <a:noFill/>
+          <a:ln>
+            <a:noFill/>
+          </a:ln>
+        </p:spPr>
+        <p:txBody>
+          <a:bodyPr lIns="0" tIns="0" rIns="0" bIns="0" anchor="ctr" anchorCtr="0">
+            <a:noAutofit/>
+          </a:bodyPr>
+          <a:lstStyle/>
+          <a:p>
+            <a:pPr marL="0" marR="0" lvl="0" indent="0" algn="l" rtl="0">
+              <a:lnSpc>
+                <a:spcPct val="100000"/>
+              </a:lnSpc>
+              <a:spcBef>
+                <a:spcPts val="0"/>
+              </a:spcBef>
+              <a:spcAft>
+                <a:spcPts val="0"/>
+              </a:spcAft>
+              <a:buClr>
+                <a:srgbClr val="00FF00"/>
+              </a:buClr>
+              <a:buSzPct val="25000"/>
+              <a:buFont typeface="Cabin"/>
+              <a:buNone/>
+            </a:pPr>
+            <a:r>
+              <a:rPr lang="en-US" sz="2800" b="1" i="0" u="none" strike="noStrike" cap="none" dirty="0">
+                <a:solidFill>
+                  <a:srgbClr val="FFFF00"/>
+                </a:solidFill>
+                <a:latin typeface="Courier New"/>
+                <a:ea typeface="Courier New"/>
+                <a:cs typeface="Courier New"/>
+                <a:sym typeface="Courier New"/>
+              </a:rPr>
+              <a:t>name = </a:t>
+            </a:r>
+            <a:r>
+              <a:rPr lang="en-US" sz="2800" b="1" i="0" u="none" strike="noStrike" cap="none" dirty="0" smtClean="0">
+                <a:solidFill>
+                  <a:schemeClr val="bg1"/>
+                </a:solidFill>
+                <a:latin typeface="Courier New"/>
+                <a:ea typeface="Courier New"/>
+                <a:cs typeface="Courier New"/>
+                <a:sym typeface="Courier New"/>
+              </a:rPr>
+              <a:t>input</a:t>
+            </a:r>
+            <a:r>
+              <a:rPr lang="en-US" sz="2800" b="1" i="0" u="none" strike="noStrike" cap="none" dirty="0">
+                <a:solidFill>
+                  <a:srgbClr val="FFFF00"/>
+                </a:solidFill>
+                <a:latin typeface="Courier New"/>
+                <a:ea typeface="Courier New"/>
+                <a:cs typeface="Courier New"/>
+                <a:sym typeface="Courier New"/>
+              </a:rPr>
+              <a:t>('Enter file:')</a:t>
+            </a:r>
+          </a:p>
+          <a:p>
+            <a:pPr marL="0" marR="0" lvl="0" indent="0" algn="l" rtl="0">
+              <a:lnSpc>
+                <a:spcPct val="100000"/>
+              </a:lnSpc>
+              <a:spcBef>
+                <a:spcPts val="0"/>
+              </a:spcBef>
+              <a:spcAft>
+                <a:spcPts val="0"/>
+              </a:spcAft>
+              <a:buClr>
+                <a:srgbClr val="00FF00"/>
+              </a:buClr>
+              <a:buSzPct val="25000"/>
+              <a:buFont typeface="Cabin"/>
+              <a:buNone/>
+            </a:pPr>
+            <a:r>
+              <a:rPr lang="en-US" sz="2800" b="1" i="0" u="none" strike="noStrike" cap="none" dirty="0">
+                <a:solidFill>
+                  <a:srgbClr val="FFFF00"/>
+                </a:solidFill>
+                <a:latin typeface="Courier New"/>
+                <a:ea typeface="Courier New"/>
+                <a:cs typeface="Courier New"/>
+                <a:sym typeface="Courier New"/>
+              </a:rPr>
+              <a:t>handle = open(name, 'r')</a:t>
+            </a:r>
+          </a:p>
+          <a:p>
+            <a:pPr marL="0" marR="0" lvl="0" indent="0" algn="l" rtl="0">
+              <a:lnSpc>
+                <a:spcPct val="100000"/>
+              </a:lnSpc>
+              <a:spcBef>
+                <a:spcPts val="0"/>
+              </a:spcBef>
+              <a:spcAft>
+                <a:spcPts val="0"/>
+              </a:spcAft>
+              <a:buClr>
+                <a:srgbClr val="00FF00"/>
+              </a:buClr>
+              <a:buSzPct val="25000"/>
+              <a:buFont typeface="Cabin"/>
+              <a:buNone/>
+            </a:pPr>
+            <a:r>
+              <a:rPr lang="en-US" sz="2800" b="1" i="0" u="none" strike="noStrike" cap="none" dirty="0">
+                <a:solidFill>
+                  <a:srgbClr val="FFFF00"/>
+                </a:solidFill>
+                <a:latin typeface="Courier New"/>
+                <a:ea typeface="Courier New"/>
+                <a:cs typeface="Courier New"/>
+                <a:sym typeface="Courier New"/>
+              </a:rPr>
+              <a:t>text = </a:t>
+            </a:r>
+            <a:r>
+              <a:rPr lang="en-US" sz="2800" b="1" i="0" u="none" strike="noStrike" cap="none" dirty="0" err="1">
+                <a:solidFill>
+                  <a:srgbClr val="FFFF00"/>
+                </a:solidFill>
+                <a:latin typeface="Courier New"/>
+                <a:ea typeface="Courier New"/>
+                <a:cs typeface="Courier New"/>
+                <a:sym typeface="Courier New"/>
+              </a:rPr>
+              <a:t>handle.read</a:t>
+            </a:r>
+            <a:r>
+              <a:rPr lang="en-US" sz="2800" b="1" i="0" u="none" strike="noStrike" cap="none" dirty="0">
+                <a:solidFill>
+                  <a:srgbClr val="FFFF00"/>
+                </a:solidFill>
+                <a:latin typeface="Courier New"/>
+                <a:ea typeface="Courier New"/>
+                <a:cs typeface="Courier New"/>
+                <a:sym typeface="Courier New"/>
+              </a:rPr>
+              <a:t>()</a:t>
+            </a:r>
+          </a:p>
+          <a:p>
+            <a:pPr marL="0" marR="0" lvl="0" indent="0" algn="l" rtl="0">
+              <a:lnSpc>
+                <a:spcPct val="100000"/>
+              </a:lnSpc>
+              <a:spcBef>
+                <a:spcPts val="0"/>
+              </a:spcBef>
+              <a:spcAft>
+                <a:spcPts val="0"/>
+              </a:spcAft>
+              <a:buClr>
+                <a:srgbClr val="00FF00"/>
+              </a:buClr>
+              <a:buSzPct val="25000"/>
+              <a:buFont typeface="Cabin"/>
+              <a:buNone/>
+            </a:pPr>
+            <a:r>
+              <a:rPr lang="en-US" sz="2800" b="1" i="0" u="none" strike="noStrike" cap="none" dirty="0">
+                <a:solidFill>
+                  <a:srgbClr val="FFFF00"/>
+                </a:solidFill>
+                <a:latin typeface="Courier New"/>
+                <a:ea typeface="Courier New"/>
+                <a:cs typeface="Courier New"/>
+                <a:sym typeface="Courier New"/>
+              </a:rPr>
+              <a:t>words = </a:t>
+            </a:r>
+            <a:r>
+              <a:rPr lang="en-US" sz="2800" b="1" i="0" u="none" strike="noStrike" cap="none" dirty="0" err="1">
+                <a:solidFill>
+                  <a:srgbClr val="FFFF00"/>
+                </a:solidFill>
+                <a:latin typeface="Courier New"/>
+                <a:ea typeface="Courier New"/>
+                <a:cs typeface="Courier New"/>
+                <a:sym typeface="Courier New"/>
+              </a:rPr>
+              <a:t>text.split</a:t>
+            </a:r>
+            <a:r>
+              <a:rPr lang="en-US" sz="2800" b="1" i="0" u="none" strike="noStrike" cap="none" dirty="0">
+                <a:solidFill>
+                  <a:srgbClr val="FFFF00"/>
+                </a:solidFill>
+                <a:latin typeface="Courier New"/>
+                <a:ea typeface="Courier New"/>
+                <a:cs typeface="Courier New"/>
+                <a:sym typeface="Courier New"/>
+              </a:rPr>
+              <a:t>()</a:t>
+            </a:r>
+          </a:p>
+          <a:p>
+            <a:pPr marL="0" marR="0" lvl="0" indent="0" algn="ctr" rtl="0">
+              <a:lnSpc>
+                <a:spcPct val="100000"/>
+              </a:lnSpc>
+              <a:spcBef>
+                <a:spcPts val="0"/>
+              </a:spcBef>
+              <a:spcAft>
+                <a:spcPts val="0"/>
+              </a:spcAft>
+              <a:buNone/>
+            </a:pPr>
+            <a:endParaRPr sz="2800" b="1" i="0" u="none" strike="noStrike" cap="none" dirty="0">
+              <a:solidFill>
+                <a:srgbClr val="00FF00"/>
+              </a:solidFill>
+              <a:latin typeface="Courier New"/>
+              <a:ea typeface="Courier New"/>
+              <a:cs typeface="Courier New"/>
+              <a:sym typeface="Courier New"/>
+            </a:endParaRPr>
+          </a:p>
+          <a:p>
+            <a:pPr marL="0" marR="0" lvl="0" indent="0" algn="l" rtl="0">
+              <a:lnSpc>
+                <a:spcPct val="100000"/>
+              </a:lnSpc>
+              <a:spcBef>
+                <a:spcPts val="0"/>
+              </a:spcBef>
+              <a:spcAft>
+                <a:spcPts val="0"/>
+              </a:spcAft>
+              <a:buClr>
+                <a:srgbClr val="00FF00"/>
+              </a:buClr>
+              <a:buSzPct val="25000"/>
+              <a:buFont typeface="Cabin"/>
+              <a:buNone/>
+            </a:pPr>
+            <a:r>
+              <a:rPr lang="en-US" sz="2800" b="1" i="0" u="none" strike="noStrike" cap="none" dirty="0">
+                <a:solidFill>
+                  <a:srgbClr val="FFFF00"/>
+                </a:solidFill>
+                <a:latin typeface="Courier New"/>
+                <a:ea typeface="Courier New"/>
+                <a:cs typeface="Courier New"/>
+                <a:sym typeface="Courier New"/>
+              </a:rPr>
+              <a:t>counts = </a:t>
+            </a:r>
+            <a:r>
+              <a:rPr lang="en-US" sz="2800" b="1" i="0" u="none" strike="noStrike" cap="none" dirty="0" err="1">
+                <a:solidFill>
+                  <a:srgbClr val="FFFF00"/>
+                </a:solidFill>
+                <a:latin typeface="Courier New"/>
+                <a:ea typeface="Courier New"/>
+                <a:cs typeface="Courier New"/>
+                <a:sym typeface="Courier New"/>
+              </a:rPr>
+              <a:t>dict</a:t>
+            </a:r>
+            <a:r>
+              <a:rPr lang="en-US" sz="2800" b="1" i="0" u="none" strike="noStrike" cap="none" dirty="0">
+                <a:solidFill>
+                  <a:srgbClr val="FFFF00"/>
+                </a:solidFill>
+                <a:latin typeface="Courier New"/>
+                <a:ea typeface="Courier New"/>
+                <a:cs typeface="Courier New"/>
+                <a:sym typeface="Courier New"/>
+              </a:rPr>
+              <a:t>()</a:t>
+            </a:r>
+          </a:p>
+          <a:p>
+            <a:pPr marL="0" marR="0" lvl="0" indent="0" algn="l" rtl="0">
+              <a:lnSpc>
+                <a:spcPct val="100000"/>
+              </a:lnSpc>
+              <a:spcBef>
+                <a:spcPts val="0"/>
+              </a:spcBef>
+              <a:spcAft>
+                <a:spcPts val="0"/>
+              </a:spcAft>
+              <a:buClr>
+                <a:srgbClr val="00FF00"/>
+              </a:buClr>
+              <a:buSzPct val="25000"/>
+              <a:buFont typeface="Cabin"/>
+              <a:buNone/>
+            </a:pPr>
+            <a:r>
+              <a:rPr lang="en-US" sz="2800" b="1" i="0" u="none" strike="noStrike" cap="none" dirty="0">
+                <a:solidFill>
+                  <a:srgbClr val="00FF00"/>
+                </a:solidFill>
+                <a:latin typeface="Courier New"/>
+                <a:ea typeface="Courier New"/>
+                <a:cs typeface="Courier New"/>
+                <a:sym typeface="Courier New"/>
+              </a:rPr>
+              <a:t>for word in words:</a:t>
+            </a:r>
+          </a:p>
+          <a:p>
+            <a:pPr marL="0" marR="0" lvl="0" indent="0" algn="l" rtl="0">
+              <a:lnSpc>
+                <a:spcPct val="100000"/>
+              </a:lnSpc>
+              <a:spcBef>
+                <a:spcPts val="0"/>
+              </a:spcBef>
+              <a:spcAft>
+                <a:spcPts val="0"/>
+              </a:spcAft>
+              <a:buClr>
+                <a:srgbClr val="00FF00"/>
+              </a:buClr>
+              <a:buSzPct val="25000"/>
+              <a:buFont typeface="Cabin"/>
+              <a:buNone/>
+            </a:pPr>
+            <a:r>
+              <a:rPr lang="en-US" sz="2800" b="1" i="0" u="none" strike="noStrike" cap="none" dirty="0">
+                <a:solidFill>
+                  <a:srgbClr val="00FF00"/>
+                </a:solidFill>
+                <a:latin typeface="Courier New"/>
+                <a:ea typeface="Courier New"/>
+                <a:cs typeface="Courier New"/>
+                <a:sym typeface="Courier New"/>
+              </a:rPr>
+              <a:t>   counts[word] = </a:t>
+            </a:r>
+            <a:r>
+              <a:rPr lang="en-US" sz="2800" b="1" i="0" u="none" strike="noStrike" cap="none" dirty="0" err="1">
+                <a:solidFill>
+                  <a:srgbClr val="00FF00"/>
+                </a:solidFill>
+                <a:latin typeface="Courier New"/>
+                <a:ea typeface="Courier New"/>
+                <a:cs typeface="Courier New"/>
+                <a:sym typeface="Courier New"/>
+              </a:rPr>
+              <a:t>counts.get</a:t>
+            </a:r>
+            <a:r>
+              <a:rPr lang="en-US" sz="2800" b="1" i="0" u="none" strike="noStrike" cap="none" dirty="0">
+                <a:solidFill>
+                  <a:srgbClr val="00FF00"/>
+                </a:solidFill>
+                <a:latin typeface="Courier New"/>
+                <a:ea typeface="Courier New"/>
+                <a:cs typeface="Courier New"/>
+                <a:sym typeface="Courier New"/>
+              </a:rPr>
+              <a:t>(word,0) + 1</a:t>
+            </a:r>
+          </a:p>
+          <a:p>
+            <a:pPr marL="0" marR="0" lvl="0" indent="0" algn="l" rtl="0">
+              <a:lnSpc>
+                <a:spcPct val="100000"/>
+              </a:lnSpc>
+              <a:spcBef>
+                <a:spcPts val="0"/>
+              </a:spcBef>
+              <a:spcAft>
+                <a:spcPts val="0"/>
+              </a:spcAft>
+              <a:buClr>
+                <a:srgbClr val="00FF00"/>
+              </a:buClr>
+              <a:buSzPct val="25000"/>
+              <a:buFont typeface="Cabin"/>
+              <a:buNone/>
+            </a:pPr>
+            <a:r>
+              <a:rPr lang="en-US" sz="2800" b="1" i="0" u="none" strike="noStrike" cap="none" dirty="0" err="1">
+                <a:solidFill>
+                  <a:srgbClr val="FFFF00"/>
+                </a:solidFill>
+                <a:latin typeface="Courier New"/>
+                <a:ea typeface="Courier New"/>
+                <a:cs typeface="Courier New"/>
+                <a:sym typeface="Courier New"/>
+              </a:rPr>
+              <a:t>bigcount</a:t>
+            </a:r>
+            <a:r>
+              <a:rPr lang="en-US" sz="2800" b="1" i="0" u="none" strike="noStrike" cap="none" dirty="0">
+                <a:solidFill>
+                  <a:srgbClr val="FFFF00"/>
+                </a:solidFill>
+                <a:latin typeface="Courier New"/>
+                <a:ea typeface="Courier New"/>
+                <a:cs typeface="Courier New"/>
+                <a:sym typeface="Courier New"/>
+              </a:rPr>
+              <a:t> = None</a:t>
+            </a:r>
+          </a:p>
+          <a:p>
+            <a:pPr marL="0" marR="0" lvl="0" indent="0" algn="l" rtl="0">
+              <a:lnSpc>
+                <a:spcPct val="100000"/>
+              </a:lnSpc>
+              <a:spcBef>
+                <a:spcPts val="0"/>
+              </a:spcBef>
+              <a:spcAft>
+                <a:spcPts val="0"/>
+              </a:spcAft>
+              <a:buClr>
+                <a:srgbClr val="00FF00"/>
+              </a:buClr>
+              <a:buSzPct val="25000"/>
+              <a:buFont typeface="Cabin"/>
+              <a:buNone/>
+            </a:pPr>
+            <a:r>
+              <a:rPr lang="en-US" sz="2800" b="1" i="0" u="none" strike="noStrike" cap="none" dirty="0" err="1">
+                <a:solidFill>
+                  <a:srgbClr val="FFFF00"/>
+                </a:solidFill>
+                <a:latin typeface="Courier New"/>
+                <a:ea typeface="Courier New"/>
+                <a:cs typeface="Courier New"/>
+                <a:sym typeface="Courier New"/>
+              </a:rPr>
+              <a:t>bigword</a:t>
+            </a:r>
+            <a:r>
+              <a:rPr lang="en-US" sz="2800" b="1" i="0" u="none" strike="noStrike" cap="none" dirty="0">
+                <a:solidFill>
+                  <a:srgbClr val="FFFF00"/>
+                </a:solidFill>
+                <a:latin typeface="Courier New"/>
+                <a:ea typeface="Courier New"/>
+                <a:cs typeface="Courier New"/>
+                <a:sym typeface="Courier New"/>
+              </a:rPr>
+              <a:t> = None</a:t>
+            </a:r>
+          </a:p>
+          <a:p>
+            <a:pPr marL="0" marR="0" lvl="0" indent="0" algn="ctr" rtl="0">
+              <a:lnSpc>
+                <a:spcPct val="100000"/>
+              </a:lnSpc>
+              <a:spcBef>
+                <a:spcPts val="0"/>
+              </a:spcBef>
+              <a:spcAft>
+                <a:spcPts val="0"/>
+              </a:spcAft>
+              <a:buNone/>
+            </a:pPr>
+            <a:endParaRPr sz="2800" b="1" i="0" u="none" strike="noStrike" cap="none" dirty="0">
+              <a:solidFill>
+                <a:srgbClr val="00FF00"/>
+              </a:solidFill>
+              <a:latin typeface="Courier New"/>
+              <a:ea typeface="Courier New"/>
+              <a:cs typeface="Courier New"/>
+              <a:sym typeface="Courier New"/>
+            </a:endParaRPr>
+          </a:p>
+          <a:p>
+            <a:pPr marL="0" marR="0" lvl="0" indent="0" algn="l" rtl="0">
+              <a:lnSpc>
+                <a:spcPct val="100000"/>
+              </a:lnSpc>
+              <a:spcBef>
+                <a:spcPts val="0"/>
+              </a:spcBef>
+              <a:spcAft>
+                <a:spcPts val="0"/>
+              </a:spcAft>
+              <a:buClr>
+                <a:srgbClr val="00FF00"/>
+              </a:buClr>
+              <a:buSzPct val="25000"/>
+              <a:buFont typeface="Cabin"/>
+              <a:buNone/>
+            </a:pPr>
+            <a:r>
+              <a:rPr lang="en-US" sz="2800" b="1" i="0" u="none" strike="noStrike" cap="none" dirty="0">
+                <a:solidFill>
+                  <a:srgbClr val="00FF00"/>
+                </a:solidFill>
+                <a:latin typeface="Courier New"/>
+                <a:ea typeface="Courier New"/>
+                <a:cs typeface="Courier New"/>
+                <a:sym typeface="Courier New"/>
+              </a:rPr>
+              <a:t>for </a:t>
+            </a:r>
+            <a:r>
+              <a:rPr lang="en-US" sz="2800" b="1" i="0" u="none" strike="noStrike" cap="none" dirty="0" err="1">
+                <a:solidFill>
+                  <a:srgbClr val="00FF00"/>
+                </a:solidFill>
+                <a:latin typeface="Courier New"/>
+                <a:ea typeface="Courier New"/>
+                <a:cs typeface="Courier New"/>
+                <a:sym typeface="Courier New"/>
+              </a:rPr>
+              <a:t>word,count</a:t>
+            </a:r>
+            <a:r>
+              <a:rPr lang="en-US" sz="2800" b="1" i="0" u="none" strike="noStrike" cap="none" dirty="0">
+                <a:solidFill>
+                  <a:srgbClr val="00FF00"/>
+                </a:solidFill>
+                <a:latin typeface="Courier New"/>
+                <a:ea typeface="Courier New"/>
+                <a:cs typeface="Courier New"/>
+                <a:sym typeface="Courier New"/>
+              </a:rPr>
+              <a:t> in </a:t>
+            </a:r>
+            <a:r>
+              <a:rPr lang="en-US" sz="2800" b="1" i="0" u="none" strike="noStrike" cap="none" dirty="0" err="1">
+                <a:solidFill>
+                  <a:srgbClr val="00FF00"/>
+                </a:solidFill>
+                <a:latin typeface="Courier New"/>
+                <a:ea typeface="Courier New"/>
+                <a:cs typeface="Courier New"/>
+                <a:sym typeface="Courier New"/>
+              </a:rPr>
+              <a:t>counts.items</a:t>
+            </a:r>
+            <a:r>
+              <a:rPr lang="en-US" sz="2800" b="1" i="0" u="none" strike="noStrike" cap="none" dirty="0">
+                <a:solidFill>
+                  <a:srgbClr val="00FF00"/>
+                </a:solidFill>
+                <a:latin typeface="Courier New"/>
+                <a:ea typeface="Courier New"/>
+                <a:cs typeface="Courier New"/>
+                <a:sym typeface="Courier New"/>
+              </a:rPr>
+              <a:t>():</a:t>
+            </a:r>
+          </a:p>
+          <a:p>
+            <a:pPr marL="0" marR="0" lvl="0" indent="0" algn="l" rtl="0">
+              <a:lnSpc>
+                <a:spcPct val="100000"/>
+              </a:lnSpc>
+              <a:spcBef>
+                <a:spcPts val="0"/>
+              </a:spcBef>
+              <a:spcAft>
+                <a:spcPts val="0"/>
+              </a:spcAft>
+              <a:buClr>
+                <a:srgbClr val="00FF00"/>
+              </a:buClr>
+              <a:buSzPct val="25000"/>
+              <a:buFont typeface="Cabin"/>
+              <a:buNone/>
+            </a:pPr>
+            <a:r>
+              <a:rPr lang="en-US" sz="2800" b="1" i="0" u="none" strike="noStrike" cap="none" dirty="0">
+                <a:solidFill>
+                  <a:srgbClr val="FF00FF"/>
+                </a:solidFill>
+                <a:latin typeface="Courier New"/>
+                <a:ea typeface="Courier New"/>
+                <a:cs typeface="Courier New"/>
+                <a:sym typeface="Courier New"/>
+              </a:rPr>
+              <a:t>  </a:t>
+            </a:r>
+            <a:r>
+              <a:rPr lang="en-US" sz="2800" b="1" i="0" u="none" strike="noStrike" cap="none" dirty="0">
+                <a:solidFill>
+                  <a:srgbClr val="FF7F00"/>
+                </a:solidFill>
+                <a:latin typeface="Courier New"/>
+                <a:ea typeface="Courier New"/>
+                <a:cs typeface="Courier New"/>
+                <a:sym typeface="Courier New"/>
+              </a:rPr>
+              <a:t>  </a:t>
+            </a:r>
+            <a:r>
+              <a:rPr lang="en-US" sz="2800" b="1" i="0" u="none" strike="noStrike" cap="none" dirty="0">
+                <a:solidFill>
+                  <a:srgbClr val="FF9900"/>
+                </a:solidFill>
+                <a:latin typeface="Courier New"/>
+                <a:ea typeface="Courier New"/>
+                <a:cs typeface="Courier New"/>
+                <a:sym typeface="Courier New"/>
+              </a:rPr>
+              <a:t>if </a:t>
+            </a:r>
+            <a:r>
+              <a:rPr lang="en-US" sz="2800" b="1" i="0" u="none" strike="noStrike" cap="none" dirty="0" err="1">
+                <a:solidFill>
+                  <a:srgbClr val="FF9900"/>
+                </a:solidFill>
+                <a:latin typeface="Courier New"/>
+                <a:ea typeface="Courier New"/>
+                <a:cs typeface="Courier New"/>
+                <a:sym typeface="Courier New"/>
+              </a:rPr>
+              <a:t>bigcount</a:t>
+            </a:r>
+            <a:r>
+              <a:rPr lang="en-US" sz="2800" b="1" i="0" u="none" strike="noStrike" cap="none" dirty="0">
+                <a:solidFill>
+                  <a:srgbClr val="FF9900"/>
+                </a:solidFill>
+                <a:latin typeface="Courier New"/>
+                <a:ea typeface="Courier New"/>
+                <a:cs typeface="Courier New"/>
+                <a:sym typeface="Courier New"/>
+              </a:rPr>
+              <a:t> is None or count &gt; </a:t>
+            </a:r>
+            <a:r>
+              <a:rPr lang="en-US" sz="2800" b="1" i="0" u="none" strike="noStrike" cap="none" dirty="0" err="1">
+                <a:solidFill>
+                  <a:srgbClr val="FF9900"/>
+                </a:solidFill>
+                <a:latin typeface="Courier New"/>
+                <a:ea typeface="Courier New"/>
+                <a:cs typeface="Courier New"/>
+                <a:sym typeface="Courier New"/>
+              </a:rPr>
+              <a:t>bigcount</a:t>
+            </a:r>
+            <a:r>
+              <a:rPr lang="en-US" sz="2800" b="1" i="0" u="none" strike="noStrike" cap="none" dirty="0">
+                <a:solidFill>
+                  <a:srgbClr val="FF9900"/>
+                </a:solidFill>
+                <a:latin typeface="Courier New"/>
+                <a:ea typeface="Courier New"/>
+                <a:cs typeface="Courier New"/>
+                <a:sym typeface="Courier New"/>
+              </a:rPr>
+              <a:t>:</a:t>
+            </a:r>
+          </a:p>
+          <a:p>
+            <a:pPr marL="0" marR="0" lvl="0" indent="0" algn="l" rtl="0">
+              <a:lnSpc>
+                <a:spcPct val="100000"/>
+              </a:lnSpc>
+              <a:spcBef>
+                <a:spcPts val="0"/>
+              </a:spcBef>
+              <a:spcAft>
+                <a:spcPts val="0"/>
+              </a:spcAft>
+              <a:buClr>
+                <a:srgbClr val="00FF00"/>
+              </a:buClr>
+              <a:buSzPct val="25000"/>
+              <a:buFont typeface="Cabin"/>
+              <a:buNone/>
+            </a:pPr>
+            <a:r>
+              <a:rPr lang="en-US" sz="2800" b="1" i="0" u="none" strike="noStrike" cap="none" dirty="0">
+                <a:solidFill>
+                  <a:srgbClr val="FF9900"/>
+                </a:solidFill>
+                <a:latin typeface="Courier New"/>
+                <a:ea typeface="Courier New"/>
+                <a:cs typeface="Courier New"/>
+                <a:sym typeface="Courier New"/>
+              </a:rPr>
+              <a:t>        </a:t>
+            </a:r>
+            <a:r>
+              <a:rPr lang="en-US" sz="2800" b="1" i="0" u="none" strike="noStrike" cap="none" dirty="0" err="1">
+                <a:solidFill>
+                  <a:srgbClr val="FF9900"/>
+                </a:solidFill>
+                <a:latin typeface="Courier New"/>
+                <a:ea typeface="Courier New"/>
+                <a:cs typeface="Courier New"/>
+                <a:sym typeface="Courier New"/>
+              </a:rPr>
+              <a:t>bigword</a:t>
+            </a:r>
+            <a:r>
+              <a:rPr lang="en-US" sz="2800" b="1" i="0" u="none" strike="noStrike" cap="none" dirty="0">
+                <a:solidFill>
+                  <a:srgbClr val="FF9900"/>
+                </a:solidFill>
+                <a:latin typeface="Courier New"/>
+                <a:ea typeface="Courier New"/>
+                <a:cs typeface="Courier New"/>
+                <a:sym typeface="Courier New"/>
+              </a:rPr>
+              <a:t> = word</a:t>
+            </a:r>
+          </a:p>
+          <a:p>
+            <a:pPr marL="0" marR="0" lvl="0" indent="0" algn="l" rtl="0">
+              <a:lnSpc>
+                <a:spcPct val="100000"/>
+              </a:lnSpc>
+              <a:spcBef>
+                <a:spcPts val="0"/>
+              </a:spcBef>
+              <a:spcAft>
+                <a:spcPts val="0"/>
+              </a:spcAft>
+              <a:buClr>
+                <a:srgbClr val="00FF00"/>
+              </a:buClr>
+              <a:buSzPct val="25000"/>
+              <a:buFont typeface="Cabin"/>
+              <a:buNone/>
+            </a:pPr>
+            <a:r>
+              <a:rPr lang="en-US" sz="2800" b="1" i="0" u="none" strike="noStrike" cap="none" dirty="0">
+                <a:solidFill>
+                  <a:srgbClr val="FF9900"/>
+                </a:solidFill>
+                <a:latin typeface="Courier New"/>
+                <a:ea typeface="Courier New"/>
+                <a:cs typeface="Courier New"/>
+                <a:sym typeface="Courier New"/>
+              </a:rPr>
+              <a:t>        </a:t>
+            </a:r>
+            <a:r>
+              <a:rPr lang="en-US" sz="2800" b="1" i="0" u="none" strike="noStrike" cap="none" dirty="0" err="1">
+                <a:solidFill>
+                  <a:srgbClr val="FF9900"/>
+                </a:solidFill>
+                <a:latin typeface="Courier New"/>
+                <a:ea typeface="Courier New"/>
+                <a:cs typeface="Courier New"/>
+                <a:sym typeface="Courier New"/>
+              </a:rPr>
+              <a:t>bigcount</a:t>
+            </a:r>
+            <a:r>
+              <a:rPr lang="en-US" sz="2800" b="1" i="0" u="none" strike="noStrike" cap="none" dirty="0">
+                <a:solidFill>
+                  <a:srgbClr val="FF9900"/>
+                </a:solidFill>
+                <a:latin typeface="Courier New"/>
+                <a:ea typeface="Courier New"/>
+                <a:cs typeface="Courier New"/>
+                <a:sym typeface="Courier New"/>
+              </a:rPr>
+              <a:t> = count</a:t>
+            </a:r>
+          </a:p>
+          <a:p>
+            <a:pPr marL="0" marR="0" lvl="0" indent="0" algn="l" rtl="0">
+              <a:lnSpc>
+                <a:spcPct val="100000"/>
+              </a:lnSpc>
+              <a:spcBef>
+                <a:spcPts val="0"/>
+              </a:spcBef>
+              <a:spcAft>
+                <a:spcPts val="0"/>
+              </a:spcAft>
+              <a:buClr>
+                <a:srgbClr val="00FF00"/>
+              </a:buClr>
+              <a:buFont typeface="Cabin"/>
+              <a:buNone/>
+            </a:pPr>
+            <a:endParaRPr sz="2800" b="1" dirty="0">
+              <a:solidFill>
+                <a:srgbClr val="00FF00"/>
+              </a:solidFill>
+              <a:latin typeface="Courier New"/>
+              <a:ea typeface="Courier New"/>
+              <a:cs typeface="Courier New"/>
+              <a:sym typeface="Courier New"/>
+            </a:endParaRPr>
+          </a:p>
+          <a:p>
+            <a:pPr marL="0" marR="0" lvl="0" indent="0" algn="l" rtl="0">
+              <a:lnSpc>
+                <a:spcPct val="100000"/>
+              </a:lnSpc>
+              <a:spcBef>
+                <a:spcPts val="0"/>
+              </a:spcBef>
+              <a:spcAft>
+                <a:spcPts val="0"/>
+              </a:spcAft>
+              <a:buClr>
+                <a:srgbClr val="00FF00"/>
+              </a:buClr>
+              <a:buSzPct val="25000"/>
+              <a:buFont typeface="Cabin"/>
+              <a:buNone/>
+            </a:pPr>
+            <a:r>
+              <a:rPr lang="en-US" sz="2800" b="1" i="0" u="none" strike="noStrike" cap="none" dirty="0" smtClean="0">
+                <a:solidFill>
+                  <a:srgbClr val="FFFF00"/>
+                </a:solidFill>
+                <a:latin typeface="Courier New"/>
+                <a:ea typeface="Courier New"/>
+                <a:cs typeface="Courier New"/>
+                <a:sym typeface="Courier New"/>
+              </a:rPr>
+              <a:t>print(</a:t>
+            </a:r>
+            <a:r>
+              <a:rPr lang="en-US" sz="2800" b="1" i="0" u="none" strike="noStrike" cap="none" dirty="0" err="1" smtClean="0">
+                <a:solidFill>
+                  <a:srgbClr val="FFFF00"/>
+                </a:solidFill>
+                <a:latin typeface="Courier New"/>
+                <a:ea typeface="Courier New"/>
+                <a:cs typeface="Courier New"/>
+                <a:sym typeface="Courier New"/>
+              </a:rPr>
+              <a:t>bigword</a:t>
+            </a:r>
+            <a:r>
+              <a:rPr lang="en-US" sz="2800" b="1" i="0" u="none" strike="noStrike" cap="none" dirty="0">
+                <a:solidFill>
+                  <a:srgbClr val="FFFF00"/>
+                </a:solidFill>
+                <a:latin typeface="Courier New"/>
+                <a:ea typeface="Courier New"/>
+                <a:cs typeface="Courier New"/>
+                <a:sym typeface="Courier New"/>
+              </a:rPr>
+              <a:t>, </a:t>
+            </a:r>
+            <a:r>
+              <a:rPr lang="en-US" sz="2800" b="1" i="0" u="none" strike="noStrike" cap="none" dirty="0" err="1" smtClean="0">
+                <a:solidFill>
+                  <a:srgbClr val="FFFF00"/>
+                </a:solidFill>
+                <a:latin typeface="Courier New"/>
+                <a:ea typeface="Courier New"/>
+                <a:cs typeface="Courier New"/>
+                <a:sym typeface="Courier New"/>
+              </a:rPr>
+              <a:t>bigcount</a:t>
+            </a:r>
+            <a:r>
+              <a:rPr lang="en-US" sz="2800" b="1" i="0" u="none" strike="noStrike" cap="none" dirty="0" smtClean="0">
+                <a:solidFill>
+                  <a:srgbClr val="FFFF00"/>
+                </a:solidFill>
+                <a:latin typeface="Courier New"/>
+                <a:ea typeface="Courier New"/>
+                <a:cs typeface="Courier New"/>
+                <a:sym typeface="Courier New"/>
+              </a:rPr>
+              <a:t>)</a:t>
+            </a:r>
+            <a:endParaRPr lang="en-US" sz="2800" b="1" i="0" u="none" strike="noStrike" cap="none" dirty="0">
+              <a:solidFill>
+                <a:srgbClr val="FFFF00"/>
+              </a:solidFill>
+              <a:latin typeface="Courier New"/>
+              <a:ea typeface="Courier New"/>
+              <a:cs typeface="Courier New"/>
+              <a:sym typeface="Courier New"/>
+            </a:endParaRPr>
+          </a:p>
+        </p:txBody>
+      </p:sp>
+      <p:sp>
+        <p:nvSpPr>
           <p:cNvPr id="632" name="Shape 632"/>
           <p:cNvSpPr txBox="1"/>
           <p:nvPr/>
         </p:nvSpPr>
         <p:spPr>
           <a:xfrm>
-            <a:off x="11244375" y="734950"/>
+            <a:off x="12003133" y="712245"/>
             <a:ext cx="3996000" cy="7680599"/>
           </a:xfrm>
           <a:prstGeom prst="rect">
@@ -29560,7 +30499,7 @@
         <p:spPr>
           <a:xfrm>
             <a:off x="6986588" y="1100138"/>
-            <a:ext cx="4011411" cy="2020087"/>
+            <a:ext cx="5172986" cy="2323998"/>
           </a:xfrm>
           <a:prstGeom prst="straightConnector1">
             <a:avLst/>
@@ -29585,8 +30524,8 @@
         </p:nvCxnSpPr>
         <p:spPr>
           <a:xfrm>
-            <a:off x="9972675" y="3971925"/>
-            <a:ext cx="1633575" cy="1094274"/>
+            <a:off x="9786026" y="4202349"/>
+            <a:ext cx="2373548" cy="972766"/>
           </a:xfrm>
           <a:prstGeom prst="straightConnector1">
             <a:avLst/>
@@ -29611,8 +30550,8 @@
         </p:nvCxnSpPr>
         <p:spPr>
           <a:xfrm>
-            <a:off x="7558088" y="6643688"/>
-            <a:ext cx="3629037" cy="314161"/>
+            <a:off x="10214043" y="6887183"/>
+            <a:ext cx="1789090" cy="680936"/>
           </a:xfrm>
           <a:prstGeom prst="straightConnector1">
             <a:avLst/>
@@ -29629,908 +30568,6 @@
           </a:ln>
         </p:spPr>
       </p:cxnSp>
-      <p:sp>
-        <p:nvSpPr>
-          <p:cNvPr id="9" name="Shape 625"/>
-          <p:cNvSpPr txBox="1"/>
-          <p:nvPr/>
-        </p:nvSpPr>
-        <p:spPr>
-          <a:xfrm>
-            <a:off x="998325" y="778213"/>
-            <a:ext cx="10035299" cy="7548664"/>
-          </a:xfrm>
-          <a:prstGeom prst="rect">
-            <a:avLst/>
-          </a:prstGeom>
-          <a:noFill/>
-          <a:ln>
-            <a:noFill/>
-          </a:ln>
-        </p:spPr>
-        <p:txBody>
-          <a:bodyPr lIns="0" tIns="0" rIns="0" bIns="0" anchor="ctr" anchorCtr="0">
-            <a:noAutofit/>
-          </a:bodyPr>
-          <a:lstStyle/>
-          <a:p>
-            <a:pPr marL="0" marR="0" lvl="0" indent="0" algn="l" rtl="0">
-              <a:lnSpc>
-                <a:spcPct val="100000"/>
-              </a:lnSpc>
-              <a:spcBef>
-                <a:spcPts val="0"/>
-              </a:spcBef>
-              <a:spcAft>
-                <a:spcPts val="0"/>
-              </a:spcAft>
-              <a:buClr>
-                <a:srgbClr val="00FF00"/>
-              </a:buClr>
-              <a:buSzPct val="25000"/>
-              <a:buFont typeface="Cabin"/>
-              <a:buNone/>
-            </a:pPr>
-            <a:r>
-              <a:rPr lang="en-US" sz="2800" b="1" i="0" u="none" strike="noStrike" cap="none" dirty="0">
-                <a:solidFill>
-                  <a:srgbClr val="FFFF00"/>
-                </a:solidFill>
-                <a:latin typeface="Courier New"/>
-                <a:ea typeface="Courier New"/>
-                <a:cs typeface="Courier New"/>
-                <a:sym typeface="Courier New"/>
-              </a:rPr>
-              <a:t>name = </a:t>
-            </a:r>
-            <a:r>
-              <a:rPr lang="en-US" sz="2800" b="1" i="0" u="none" strike="noStrike" cap="none" dirty="0" smtClean="0">
-                <a:solidFill>
-                  <a:schemeClr val="bg1"/>
-                </a:solidFill>
-                <a:latin typeface="Courier New"/>
-                <a:ea typeface="Courier New"/>
-                <a:cs typeface="Courier New"/>
-                <a:sym typeface="Courier New"/>
-              </a:rPr>
-              <a:t>input</a:t>
-            </a:r>
-            <a:r>
-              <a:rPr lang="en-US" sz="2800" b="1" i="0" u="none" strike="noStrike" cap="none" dirty="0">
-                <a:solidFill>
-                  <a:srgbClr val="FFFF00"/>
-                </a:solidFill>
-                <a:latin typeface="Courier New"/>
-                <a:ea typeface="Courier New"/>
-                <a:cs typeface="Courier New"/>
-                <a:sym typeface="Courier New"/>
-              </a:rPr>
-              <a:t>('Enter file:')</a:t>
-            </a:r>
-          </a:p>
-          <a:p>
-            <a:pPr marL="0" marR="0" lvl="0" indent="0" algn="l" rtl="0">
-              <a:lnSpc>
-                <a:spcPct val="100000"/>
-              </a:lnSpc>
-              <a:spcBef>
-                <a:spcPts val="0"/>
-              </a:spcBef>
-              <a:spcAft>
-                <a:spcPts val="0"/>
-              </a:spcAft>
-              <a:buClr>
-                <a:srgbClr val="00FF00"/>
-              </a:buClr>
-              <a:buSzPct val="25000"/>
-              <a:buFont typeface="Cabin"/>
-              <a:buNone/>
-            </a:pPr>
-            <a:r>
-              <a:rPr lang="en-US" sz="2800" b="1" i="0" u="none" strike="noStrike" cap="none" dirty="0">
-                <a:solidFill>
-                  <a:srgbClr val="FFFF00"/>
-                </a:solidFill>
-                <a:latin typeface="Courier New"/>
-                <a:ea typeface="Courier New"/>
-                <a:cs typeface="Courier New"/>
-                <a:sym typeface="Courier New"/>
-              </a:rPr>
-              <a:t>handle = open(name, 'r')</a:t>
-            </a:r>
-          </a:p>
-          <a:p>
-            <a:pPr marL="0" marR="0" lvl="0" indent="0" algn="l" rtl="0">
-              <a:lnSpc>
-                <a:spcPct val="100000"/>
-              </a:lnSpc>
-              <a:spcBef>
-                <a:spcPts val="0"/>
-              </a:spcBef>
-              <a:spcAft>
-                <a:spcPts val="0"/>
-              </a:spcAft>
-              <a:buClr>
-                <a:srgbClr val="00FF00"/>
-              </a:buClr>
-              <a:buSzPct val="25000"/>
-              <a:buFont typeface="Cabin"/>
-              <a:buNone/>
-            </a:pPr>
-            <a:r>
-              <a:rPr lang="en-US" sz="2800" b="1" i="0" u="none" strike="noStrike" cap="none" dirty="0">
-                <a:solidFill>
-                  <a:srgbClr val="FFFF00"/>
-                </a:solidFill>
-                <a:latin typeface="Courier New"/>
-                <a:ea typeface="Courier New"/>
-                <a:cs typeface="Courier New"/>
-                <a:sym typeface="Courier New"/>
-              </a:rPr>
-              <a:t>text = </a:t>
-            </a:r>
-            <a:r>
-              <a:rPr lang="en-US" sz="2800" b="1" i="0" u="none" strike="noStrike" cap="none" dirty="0" err="1">
-                <a:solidFill>
-                  <a:srgbClr val="FFFF00"/>
-                </a:solidFill>
-                <a:latin typeface="Courier New"/>
-                <a:ea typeface="Courier New"/>
-                <a:cs typeface="Courier New"/>
-                <a:sym typeface="Courier New"/>
-              </a:rPr>
-              <a:t>handle.read</a:t>
-            </a:r>
-            <a:r>
-              <a:rPr lang="en-US" sz="2800" b="1" i="0" u="none" strike="noStrike" cap="none" dirty="0">
-                <a:solidFill>
-                  <a:srgbClr val="FFFF00"/>
-                </a:solidFill>
-                <a:latin typeface="Courier New"/>
-                <a:ea typeface="Courier New"/>
-                <a:cs typeface="Courier New"/>
-                <a:sym typeface="Courier New"/>
-              </a:rPr>
-              <a:t>()</a:t>
-            </a:r>
-          </a:p>
-          <a:p>
-            <a:pPr marL="0" marR="0" lvl="0" indent="0" algn="l" rtl="0">
-              <a:lnSpc>
-                <a:spcPct val="100000"/>
-              </a:lnSpc>
-              <a:spcBef>
-                <a:spcPts val="0"/>
-              </a:spcBef>
-              <a:spcAft>
-                <a:spcPts val="0"/>
-              </a:spcAft>
-              <a:buClr>
-                <a:srgbClr val="00FF00"/>
-              </a:buClr>
-              <a:buSzPct val="25000"/>
-              <a:buFont typeface="Cabin"/>
-              <a:buNone/>
-            </a:pPr>
-            <a:r>
-              <a:rPr lang="en-US" sz="2800" b="1" i="0" u="none" strike="noStrike" cap="none" dirty="0">
-                <a:solidFill>
-                  <a:srgbClr val="FFFF00"/>
-                </a:solidFill>
-                <a:latin typeface="Courier New"/>
-                <a:ea typeface="Courier New"/>
-                <a:cs typeface="Courier New"/>
-                <a:sym typeface="Courier New"/>
-              </a:rPr>
-              <a:t>words = </a:t>
-            </a:r>
-            <a:r>
-              <a:rPr lang="en-US" sz="2800" b="1" i="0" u="none" strike="noStrike" cap="none" dirty="0" err="1">
-                <a:solidFill>
-                  <a:srgbClr val="FFFF00"/>
-                </a:solidFill>
-                <a:latin typeface="Courier New"/>
-                <a:ea typeface="Courier New"/>
-                <a:cs typeface="Courier New"/>
-                <a:sym typeface="Courier New"/>
-              </a:rPr>
-              <a:t>text.split</a:t>
-            </a:r>
-            <a:r>
-              <a:rPr lang="en-US" sz="2800" b="1" i="0" u="none" strike="noStrike" cap="none" dirty="0">
-                <a:solidFill>
-                  <a:srgbClr val="FFFF00"/>
-                </a:solidFill>
-                <a:latin typeface="Courier New"/>
-                <a:ea typeface="Courier New"/>
-                <a:cs typeface="Courier New"/>
-                <a:sym typeface="Courier New"/>
-              </a:rPr>
-              <a:t>()</a:t>
-            </a:r>
-          </a:p>
-          <a:p>
-            <a:pPr marL="0" marR="0" lvl="0" indent="0" algn="ctr" rtl="0">
-              <a:lnSpc>
-                <a:spcPct val="100000"/>
-              </a:lnSpc>
-              <a:spcBef>
-                <a:spcPts val="0"/>
-              </a:spcBef>
-              <a:spcAft>
-                <a:spcPts val="0"/>
-              </a:spcAft>
-              <a:buNone/>
-            </a:pPr>
-            <a:endParaRPr sz="2800" b="1" i="0" u="none" strike="noStrike" cap="none" dirty="0">
-              <a:solidFill>
-                <a:srgbClr val="00FF00"/>
-              </a:solidFill>
-              <a:latin typeface="Courier New"/>
-              <a:ea typeface="Courier New"/>
-              <a:cs typeface="Courier New"/>
-              <a:sym typeface="Courier New"/>
-            </a:endParaRPr>
-          </a:p>
-          <a:p>
-            <a:pPr marL="0" marR="0" lvl="0" indent="0" algn="l" rtl="0">
-              <a:lnSpc>
-                <a:spcPct val="100000"/>
-              </a:lnSpc>
-              <a:spcBef>
-                <a:spcPts val="0"/>
-              </a:spcBef>
-              <a:spcAft>
-                <a:spcPts val="0"/>
-              </a:spcAft>
-              <a:buClr>
-                <a:srgbClr val="00FF00"/>
-              </a:buClr>
-              <a:buSzPct val="25000"/>
-              <a:buFont typeface="Cabin"/>
-              <a:buNone/>
-            </a:pPr>
-            <a:r>
-              <a:rPr lang="en-US" sz="2800" b="1" i="0" u="none" strike="noStrike" cap="none" dirty="0">
-                <a:solidFill>
-                  <a:srgbClr val="FFFF00"/>
-                </a:solidFill>
-                <a:latin typeface="Courier New"/>
-                <a:ea typeface="Courier New"/>
-                <a:cs typeface="Courier New"/>
-                <a:sym typeface="Courier New"/>
-              </a:rPr>
-              <a:t>counts = </a:t>
-            </a:r>
-            <a:r>
-              <a:rPr lang="en-US" sz="2800" b="1" i="0" u="none" strike="noStrike" cap="none" dirty="0" err="1">
-                <a:solidFill>
-                  <a:srgbClr val="FFFF00"/>
-                </a:solidFill>
-                <a:latin typeface="Courier New"/>
-                <a:ea typeface="Courier New"/>
-                <a:cs typeface="Courier New"/>
-                <a:sym typeface="Courier New"/>
-              </a:rPr>
-              <a:t>dict</a:t>
-            </a:r>
-            <a:r>
-              <a:rPr lang="en-US" sz="2800" b="1" i="0" u="none" strike="noStrike" cap="none" dirty="0">
-                <a:solidFill>
-                  <a:srgbClr val="FFFF00"/>
-                </a:solidFill>
-                <a:latin typeface="Courier New"/>
-                <a:ea typeface="Courier New"/>
-                <a:cs typeface="Courier New"/>
-                <a:sym typeface="Courier New"/>
-              </a:rPr>
-              <a:t>()</a:t>
-            </a:r>
-          </a:p>
-          <a:p>
-            <a:pPr marL="0" marR="0" lvl="0" indent="0" algn="l" rtl="0">
-              <a:lnSpc>
-                <a:spcPct val="100000"/>
-              </a:lnSpc>
-              <a:spcBef>
-                <a:spcPts val="0"/>
-              </a:spcBef>
-              <a:spcAft>
-                <a:spcPts val="0"/>
-              </a:spcAft>
-              <a:buClr>
-                <a:srgbClr val="00FF00"/>
-              </a:buClr>
-              <a:buSzPct val="25000"/>
-              <a:buFont typeface="Cabin"/>
-              <a:buNone/>
-            </a:pPr>
-            <a:r>
-              <a:rPr lang="en-US" sz="2800" b="1" i="0" u="none" strike="noStrike" cap="none" dirty="0">
-                <a:solidFill>
-                  <a:srgbClr val="00FF00"/>
-                </a:solidFill>
-                <a:latin typeface="Courier New"/>
-                <a:ea typeface="Courier New"/>
-                <a:cs typeface="Courier New"/>
-                <a:sym typeface="Courier New"/>
-              </a:rPr>
-              <a:t>for word in words:</a:t>
-            </a:r>
-          </a:p>
-          <a:p>
-            <a:pPr marL="0" marR="0" lvl="0" indent="0" algn="l" rtl="0">
-              <a:lnSpc>
-                <a:spcPct val="100000"/>
-              </a:lnSpc>
-              <a:spcBef>
-                <a:spcPts val="0"/>
-              </a:spcBef>
-              <a:spcAft>
-                <a:spcPts val="0"/>
-              </a:spcAft>
-              <a:buClr>
-                <a:srgbClr val="00FF00"/>
-              </a:buClr>
-              <a:buSzPct val="25000"/>
-              <a:buFont typeface="Cabin"/>
-              <a:buNone/>
-            </a:pPr>
-            <a:r>
-              <a:rPr lang="en-US" sz="2800" b="1" i="0" u="none" strike="noStrike" cap="none" dirty="0">
-                <a:solidFill>
-                  <a:srgbClr val="00FF00"/>
-                </a:solidFill>
-                <a:latin typeface="Courier New"/>
-                <a:ea typeface="Courier New"/>
-                <a:cs typeface="Courier New"/>
-                <a:sym typeface="Courier New"/>
-              </a:rPr>
-              <a:t>   counts[word] = </a:t>
-            </a:r>
-            <a:r>
-              <a:rPr lang="en-US" sz="2800" b="1" i="0" u="none" strike="noStrike" cap="none" dirty="0" err="1">
-                <a:solidFill>
-                  <a:srgbClr val="00FF00"/>
-                </a:solidFill>
-                <a:latin typeface="Courier New"/>
-                <a:ea typeface="Courier New"/>
-                <a:cs typeface="Courier New"/>
-                <a:sym typeface="Courier New"/>
-              </a:rPr>
-              <a:t>counts.get</a:t>
-            </a:r>
-            <a:r>
-              <a:rPr lang="en-US" sz="2800" b="1" i="0" u="none" strike="noStrike" cap="none" dirty="0">
-                <a:solidFill>
-                  <a:srgbClr val="00FF00"/>
-                </a:solidFill>
-                <a:latin typeface="Courier New"/>
-                <a:ea typeface="Courier New"/>
-                <a:cs typeface="Courier New"/>
-                <a:sym typeface="Courier New"/>
-              </a:rPr>
-              <a:t>(word,0) + 1</a:t>
-            </a:r>
-          </a:p>
-          <a:p>
-            <a:pPr marL="0" marR="0" lvl="0" indent="0" algn="l" rtl="0">
-              <a:lnSpc>
-                <a:spcPct val="100000"/>
-              </a:lnSpc>
-              <a:spcBef>
-                <a:spcPts val="0"/>
-              </a:spcBef>
-              <a:spcAft>
-                <a:spcPts val="0"/>
-              </a:spcAft>
-              <a:buClr>
-                <a:srgbClr val="00FF00"/>
-              </a:buClr>
-              <a:buSzPct val="25000"/>
-              <a:buFont typeface="Cabin"/>
-              <a:buNone/>
-            </a:pPr>
-            <a:r>
-              <a:rPr lang="en-US" sz="2800" b="1" i="0" u="none" strike="noStrike" cap="none" dirty="0" err="1">
-                <a:solidFill>
-                  <a:srgbClr val="FFFF00"/>
-                </a:solidFill>
-                <a:latin typeface="Courier New"/>
-                <a:ea typeface="Courier New"/>
-                <a:cs typeface="Courier New"/>
-                <a:sym typeface="Courier New"/>
-              </a:rPr>
-              <a:t>bigcount</a:t>
-            </a:r>
-            <a:r>
-              <a:rPr lang="en-US" sz="2800" b="1" i="0" u="none" strike="noStrike" cap="none" dirty="0">
-                <a:solidFill>
-                  <a:srgbClr val="FFFF00"/>
-                </a:solidFill>
-                <a:latin typeface="Courier New"/>
-                <a:ea typeface="Courier New"/>
-                <a:cs typeface="Courier New"/>
-                <a:sym typeface="Courier New"/>
-              </a:rPr>
-              <a:t> = None</a:t>
-            </a:r>
-          </a:p>
-          <a:p>
-            <a:pPr marL="0" marR="0" lvl="0" indent="0" algn="l" rtl="0">
-              <a:lnSpc>
-                <a:spcPct val="100000"/>
-              </a:lnSpc>
-              <a:spcBef>
-                <a:spcPts val="0"/>
-              </a:spcBef>
-              <a:spcAft>
-                <a:spcPts val="0"/>
-              </a:spcAft>
-              <a:buClr>
-                <a:srgbClr val="00FF00"/>
-              </a:buClr>
-              <a:buSzPct val="25000"/>
-              <a:buFont typeface="Cabin"/>
-              <a:buNone/>
-            </a:pPr>
-            <a:r>
-              <a:rPr lang="en-US" sz="2800" b="1" i="0" u="none" strike="noStrike" cap="none" dirty="0" err="1">
-                <a:solidFill>
-                  <a:srgbClr val="FFFF00"/>
-                </a:solidFill>
-                <a:latin typeface="Courier New"/>
-                <a:ea typeface="Courier New"/>
-                <a:cs typeface="Courier New"/>
-                <a:sym typeface="Courier New"/>
-              </a:rPr>
-              <a:t>bigword</a:t>
-            </a:r>
-            <a:r>
-              <a:rPr lang="en-US" sz="2800" b="1" i="0" u="none" strike="noStrike" cap="none" dirty="0">
-                <a:solidFill>
-                  <a:srgbClr val="FFFF00"/>
-                </a:solidFill>
-                <a:latin typeface="Courier New"/>
-                <a:ea typeface="Courier New"/>
-                <a:cs typeface="Courier New"/>
-                <a:sym typeface="Courier New"/>
-              </a:rPr>
-              <a:t> = None</a:t>
-            </a:r>
-          </a:p>
-          <a:p>
-            <a:pPr marL="0" marR="0" lvl="0" indent="0" algn="ctr" rtl="0">
-              <a:lnSpc>
-                <a:spcPct val="100000"/>
-              </a:lnSpc>
-              <a:spcBef>
-                <a:spcPts val="0"/>
-              </a:spcBef>
-              <a:spcAft>
-                <a:spcPts val="0"/>
-              </a:spcAft>
-              <a:buNone/>
-            </a:pPr>
-            <a:endParaRPr sz="2800" b="1" i="0" u="none" strike="noStrike" cap="none" dirty="0">
-              <a:solidFill>
-                <a:srgbClr val="00FF00"/>
-              </a:solidFill>
-              <a:latin typeface="Courier New"/>
-              <a:ea typeface="Courier New"/>
-              <a:cs typeface="Courier New"/>
-              <a:sym typeface="Courier New"/>
-            </a:endParaRPr>
-          </a:p>
-          <a:p>
-            <a:pPr marL="0" marR="0" lvl="0" indent="0" algn="l" rtl="0">
-              <a:lnSpc>
-                <a:spcPct val="100000"/>
-              </a:lnSpc>
-              <a:spcBef>
-                <a:spcPts val="0"/>
-              </a:spcBef>
-              <a:spcAft>
-                <a:spcPts val="0"/>
-              </a:spcAft>
-              <a:buClr>
-                <a:srgbClr val="00FF00"/>
-              </a:buClr>
-              <a:buSzPct val="25000"/>
-              <a:buFont typeface="Cabin"/>
-              <a:buNone/>
-            </a:pPr>
-            <a:r>
-              <a:rPr lang="en-US" sz="2800" b="1" i="0" u="none" strike="noStrike" cap="none" dirty="0">
-                <a:solidFill>
-                  <a:srgbClr val="00FF00"/>
-                </a:solidFill>
-                <a:latin typeface="Courier New"/>
-                <a:ea typeface="Courier New"/>
-                <a:cs typeface="Courier New"/>
-                <a:sym typeface="Courier New"/>
-              </a:rPr>
-              <a:t>for </a:t>
-            </a:r>
-            <a:r>
-              <a:rPr lang="en-US" sz="2800" b="1" i="0" u="none" strike="noStrike" cap="none" dirty="0" err="1">
-                <a:solidFill>
-                  <a:srgbClr val="00FF00"/>
-                </a:solidFill>
-                <a:latin typeface="Courier New"/>
-                <a:ea typeface="Courier New"/>
-                <a:cs typeface="Courier New"/>
-                <a:sym typeface="Courier New"/>
-              </a:rPr>
-              <a:t>word,count</a:t>
-            </a:r>
-            <a:r>
-              <a:rPr lang="en-US" sz="2800" b="1" i="0" u="none" strike="noStrike" cap="none" dirty="0">
-                <a:solidFill>
-                  <a:srgbClr val="00FF00"/>
-                </a:solidFill>
-                <a:latin typeface="Courier New"/>
-                <a:ea typeface="Courier New"/>
-                <a:cs typeface="Courier New"/>
-                <a:sym typeface="Courier New"/>
-              </a:rPr>
-              <a:t> in </a:t>
-            </a:r>
-            <a:r>
-              <a:rPr lang="en-US" sz="2800" b="1" i="0" u="none" strike="noStrike" cap="none" dirty="0" err="1">
-                <a:solidFill>
-                  <a:srgbClr val="00FF00"/>
-                </a:solidFill>
-                <a:latin typeface="Courier New"/>
-                <a:ea typeface="Courier New"/>
-                <a:cs typeface="Courier New"/>
-                <a:sym typeface="Courier New"/>
-              </a:rPr>
-              <a:t>counts.items</a:t>
-            </a:r>
-            <a:r>
-              <a:rPr lang="en-US" sz="2800" b="1" i="0" u="none" strike="noStrike" cap="none" dirty="0">
-                <a:solidFill>
-                  <a:srgbClr val="00FF00"/>
-                </a:solidFill>
-                <a:latin typeface="Courier New"/>
-                <a:ea typeface="Courier New"/>
-                <a:cs typeface="Courier New"/>
-                <a:sym typeface="Courier New"/>
-              </a:rPr>
-              <a:t>():</a:t>
-            </a:r>
-          </a:p>
-          <a:p>
-            <a:pPr marL="0" marR="0" lvl="0" indent="0" algn="l" rtl="0">
-              <a:lnSpc>
-                <a:spcPct val="100000"/>
-              </a:lnSpc>
-              <a:spcBef>
-                <a:spcPts val="0"/>
-              </a:spcBef>
-              <a:spcAft>
-                <a:spcPts val="0"/>
-              </a:spcAft>
-              <a:buClr>
-                <a:srgbClr val="00FF00"/>
-              </a:buClr>
-              <a:buSzPct val="25000"/>
-              <a:buFont typeface="Cabin"/>
-              <a:buNone/>
-            </a:pPr>
-            <a:r>
-              <a:rPr lang="en-US" sz="2800" b="1" i="0" u="none" strike="noStrike" cap="none" dirty="0">
-                <a:solidFill>
-                  <a:srgbClr val="FF00FF"/>
-                </a:solidFill>
-                <a:latin typeface="Courier New"/>
-                <a:ea typeface="Courier New"/>
-                <a:cs typeface="Courier New"/>
-                <a:sym typeface="Courier New"/>
-              </a:rPr>
-              <a:t>  </a:t>
-            </a:r>
-            <a:r>
-              <a:rPr lang="en-US" sz="2800" b="1" i="0" u="none" strike="noStrike" cap="none" dirty="0">
-                <a:solidFill>
-                  <a:srgbClr val="FF7F00"/>
-                </a:solidFill>
-                <a:latin typeface="Courier New"/>
-                <a:ea typeface="Courier New"/>
-                <a:cs typeface="Courier New"/>
-                <a:sym typeface="Courier New"/>
-              </a:rPr>
-              <a:t>  </a:t>
-            </a:r>
-            <a:r>
-              <a:rPr lang="en-US" sz="2800" b="1" i="0" u="none" strike="noStrike" cap="none" dirty="0">
-                <a:solidFill>
-                  <a:srgbClr val="FF9900"/>
-                </a:solidFill>
-                <a:latin typeface="Courier New"/>
-                <a:ea typeface="Courier New"/>
-                <a:cs typeface="Courier New"/>
-                <a:sym typeface="Courier New"/>
-              </a:rPr>
-              <a:t>if </a:t>
-            </a:r>
-            <a:r>
-              <a:rPr lang="en-US" sz="2800" b="1" i="0" u="none" strike="noStrike" cap="none" dirty="0" err="1">
-                <a:solidFill>
-                  <a:srgbClr val="FF9900"/>
-                </a:solidFill>
-                <a:latin typeface="Courier New"/>
-                <a:ea typeface="Courier New"/>
-                <a:cs typeface="Courier New"/>
-                <a:sym typeface="Courier New"/>
-              </a:rPr>
-              <a:t>bigcount</a:t>
-            </a:r>
-            <a:r>
-              <a:rPr lang="en-US" sz="2800" b="1" i="0" u="none" strike="noStrike" cap="none" dirty="0">
-                <a:solidFill>
-                  <a:srgbClr val="FF9900"/>
-                </a:solidFill>
-                <a:latin typeface="Courier New"/>
-                <a:ea typeface="Courier New"/>
-                <a:cs typeface="Courier New"/>
-                <a:sym typeface="Courier New"/>
-              </a:rPr>
-              <a:t> is None or count &gt; </a:t>
-            </a:r>
-            <a:r>
-              <a:rPr lang="en-US" sz="2800" b="1" i="0" u="none" strike="noStrike" cap="none" dirty="0" err="1">
-                <a:solidFill>
-                  <a:srgbClr val="FF9900"/>
-                </a:solidFill>
-                <a:latin typeface="Courier New"/>
-                <a:ea typeface="Courier New"/>
-                <a:cs typeface="Courier New"/>
-                <a:sym typeface="Courier New"/>
-              </a:rPr>
-              <a:t>bigcount</a:t>
-            </a:r>
-            <a:r>
-              <a:rPr lang="en-US" sz="2800" b="1" i="0" u="none" strike="noStrike" cap="none" dirty="0">
-                <a:solidFill>
-                  <a:srgbClr val="FF9900"/>
-                </a:solidFill>
-                <a:latin typeface="Courier New"/>
-                <a:ea typeface="Courier New"/>
-                <a:cs typeface="Courier New"/>
-                <a:sym typeface="Courier New"/>
-              </a:rPr>
-              <a:t>:</a:t>
-            </a:r>
-          </a:p>
-          <a:p>
-            <a:pPr marL="0" marR="0" lvl="0" indent="0" algn="l" rtl="0">
-              <a:lnSpc>
-                <a:spcPct val="100000"/>
-              </a:lnSpc>
-              <a:spcBef>
-                <a:spcPts val="0"/>
-              </a:spcBef>
-              <a:spcAft>
-                <a:spcPts val="0"/>
-              </a:spcAft>
-              <a:buClr>
-                <a:srgbClr val="00FF00"/>
-              </a:buClr>
-              <a:buSzPct val="25000"/>
-              <a:buFont typeface="Cabin"/>
-              <a:buNone/>
-            </a:pPr>
-            <a:r>
-              <a:rPr lang="en-US" sz="2800" b="1" i="0" u="none" strike="noStrike" cap="none" dirty="0">
-                <a:solidFill>
-                  <a:srgbClr val="FF9900"/>
-                </a:solidFill>
-                <a:latin typeface="Courier New"/>
-                <a:ea typeface="Courier New"/>
-                <a:cs typeface="Courier New"/>
-                <a:sym typeface="Courier New"/>
-              </a:rPr>
-              <a:t>        </a:t>
-            </a:r>
-            <a:r>
-              <a:rPr lang="en-US" sz="2800" b="1" i="0" u="none" strike="noStrike" cap="none" dirty="0" err="1">
-                <a:solidFill>
-                  <a:srgbClr val="FF9900"/>
-                </a:solidFill>
-                <a:latin typeface="Courier New"/>
-                <a:ea typeface="Courier New"/>
-                <a:cs typeface="Courier New"/>
-                <a:sym typeface="Courier New"/>
-              </a:rPr>
-              <a:t>bigword</a:t>
-            </a:r>
-            <a:r>
-              <a:rPr lang="en-US" sz="2800" b="1" i="0" u="none" strike="noStrike" cap="none" dirty="0">
-                <a:solidFill>
-                  <a:srgbClr val="FF9900"/>
-                </a:solidFill>
-                <a:latin typeface="Courier New"/>
-                <a:ea typeface="Courier New"/>
-                <a:cs typeface="Courier New"/>
-                <a:sym typeface="Courier New"/>
-              </a:rPr>
-              <a:t> = word</a:t>
-            </a:r>
-          </a:p>
-          <a:p>
-            <a:pPr marL="0" marR="0" lvl="0" indent="0" algn="l" rtl="0">
-              <a:lnSpc>
-                <a:spcPct val="100000"/>
-              </a:lnSpc>
-              <a:spcBef>
-                <a:spcPts val="0"/>
-              </a:spcBef>
-              <a:spcAft>
-                <a:spcPts val="0"/>
-              </a:spcAft>
-              <a:buClr>
-                <a:srgbClr val="00FF00"/>
-              </a:buClr>
-              <a:buSzPct val="25000"/>
-              <a:buFont typeface="Cabin"/>
-              <a:buNone/>
-            </a:pPr>
-            <a:r>
-              <a:rPr lang="en-US" sz="2800" b="1" i="0" u="none" strike="noStrike" cap="none" dirty="0">
-                <a:solidFill>
-                  <a:srgbClr val="FF9900"/>
-                </a:solidFill>
-                <a:latin typeface="Courier New"/>
-                <a:ea typeface="Courier New"/>
-                <a:cs typeface="Courier New"/>
-                <a:sym typeface="Courier New"/>
-              </a:rPr>
-              <a:t>        </a:t>
-            </a:r>
-            <a:r>
-              <a:rPr lang="en-US" sz="2800" b="1" i="0" u="none" strike="noStrike" cap="none" dirty="0" err="1">
-                <a:solidFill>
-                  <a:srgbClr val="FF9900"/>
-                </a:solidFill>
-                <a:latin typeface="Courier New"/>
-                <a:ea typeface="Courier New"/>
-                <a:cs typeface="Courier New"/>
-                <a:sym typeface="Courier New"/>
-              </a:rPr>
-              <a:t>bigcount</a:t>
-            </a:r>
-            <a:r>
-              <a:rPr lang="en-US" sz="2800" b="1" i="0" u="none" strike="noStrike" cap="none" dirty="0">
-                <a:solidFill>
-                  <a:srgbClr val="FF9900"/>
-                </a:solidFill>
-                <a:latin typeface="Courier New"/>
-                <a:ea typeface="Courier New"/>
-                <a:cs typeface="Courier New"/>
-                <a:sym typeface="Courier New"/>
-              </a:rPr>
-              <a:t> = count</a:t>
-            </a:r>
-          </a:p>
-          <a:p>
-            <a:pPr marL="0" marR="0" lvl="0" indent="0" algn="l" rtl="0">
-              <a:lnSpc>
-                <a:spcPct val="100000"/>
-              </a:lnSpc>
-              <a:spcBef>
-                <a:spcPts val="0"/>
-              </a:spcBef>
-              <a:spcAft>
-                <a:spcPts val="0"/>
-              </a:spcAft>
-              <a:buClr>
-                <a:srgbClr val="00FF00"/>
-              </a:buClr>
-              <a:buFont typeface="Cabin"/>
-              <a:buNone/>
-            </a:pPr>
-            <a:endParaRPr sz="2800" b="1" dirty="0">
-              <a:solidFill>
-                <a:srgbClr val="00FF00"/>
-              </a:solidFill>
-              <a:latin typeface="Courier New"/>
-              <a:ea typeface="Courier New"/>
-              <a:cs typeface="Courier New"/>
-              <a:sym typeface="Courier New"/>
-            </a:endParaRPr>
-          </a:p>
-          <a:p>
-            <a:pPr marL="0" marR="0" lvl="0" indent="0" algn="l" rtl="0">
-              <a:lnSpc>
-                <a:spcPct val="100000"/>
-              </a:lnSpc>
-              <a:spcBef>
-                <a:spcPts val="0"/>
-              </a:spcBef>
-              <a:spcAft>
-                <a:spcPts val="0"/>
-              </a:spcAft>
-              <a:buClr>
-                <a:srgbClr val="00FF00"/>
-              </a:buClr>
-              <a:buSzPct val="25000"/>
-              <a:buFont typeface="Cabin"/>
-              <a:buNone/>
-            </a:pPr>
-            <a:r>
-              <a:rPr lang="en-US" sz="2800" b="1" i="0" u="none" strike="noStrike" cap="none" dirty="0" smtClean="0">
-                <a:solidFill>
-                  <a:srgbClr val="FFFF00"/>
-                </a:solidFill>
-                <a:latin typeface="Courier New"/>
-                <a:ea typeface="Courier New"/>
-                <a:cs typeface="Courier New"/>
-                <a:sym typeface="Courier New"/>
-              </a:rPr>
-              <a:t>print(</a:t>
-            </a:r>
-            <a:r>
-              <a:rPr lang="en-US" sz="2800" b="1" i="0" u="none" strike="noStrike" cap="none" dirty="0" err="1" smtClean="0">
-                <a:solidFill>
-                  <a:srgbClr val="FFFF00"/>
-                </a:solidFill>
-                <a:latin typeface="Courier New"/>
-                <a:ea typeface="Courier New"/>
-                <a:cs typeface="Courier New"/>
-                <a:sym typeface="Courier New"/>
-              </a:rPr>
-              <a:t>bigword</a:t>
-            </a:r>
-            <a:r>
-              <a:rPr lang="en-US" sz="2800" b="1" i="0" u="none" strike="noStrike" cap="none" dirty="0">
-                <a:solidFill>
-                  <a:srgbClr val="FFFF00"/>
-                </a:solidFill>
-                <a:latin typeface="Courier New"/>
-                <a:ea typeface="Courier New"/>
-                <a:cs typeface="Courier New"/>
-                <a:sym typeface="Courier New"/>
-              </a:rPr>
-              <a:t>, </a:t>
-            </a:r>
-            <a:r>
-              <a:rPr lang="en-US" sz="2800" b="1" i="0" u="none" strike="noStrike" cap="none" dirty="0" err="1" smtClean="0">
-                <a:solidFill>
-                  <a:srgbClr val="FFFF00"/>
-                </a:solidFill>
-                <a:latin typeface="Courier New"/>
-                <a:ea typeface="Courier New"/>
-                <a:cs typeface="Courier New"/>
-                <a:sym typeface="Courier New"/>
-              </a:rPr>
-              <a:t>bigcount</a:t>
-            </a:r>
-            <a:r>
-              <a:rPr lang="en-US" sz="2800" b="1" i="0" u="none" strike="noStrike" cap="none" dirty="0" smtClean="0">
-                <a:solidFill>
-                  <a:srgbClr val="FFFF00"/>
-                </a:solidFill>
-                <a:latin typeface="Courier New"/>
-                <a:ea typeface="Courier New"/>
-                <a:cs typeface="Courier New"/>
-                <a:sym typeface="Courier New"/>
-              </a:rPr>
-              <a:t>)</a:t>
-            </a:r>
-            <a:endParaRPr lang="en-US" sz="2800" b="1" i="0" u="none" strike="noStrike" cap="none" dirty="0">
-              <a:solidFill>
-                <a:srgbClr val="FFFF00"/>
-              </a:solidFill>
-              <a:latin typeface="Courier New"/>
-              <a:ea typeface="Courier New"/>
-              <a:cs typeface="Courier New"/>
-              <a:sym typeface="Courier New"/>
-            </a:endParaRPr>
-          </a:p>
-        </p:txBody>
-      </p:sp>
     </p:spTree>
   </p:cSld>
   <p:clrMapOvr>
@@ -30861,32 +30898,31 @@
                   <a:srgbClr val="FFFFFF"/>
                 </a:solidFill>
               </a:rPr>
-              <a:t>) of the University of Michigan School of Information and </a:t>
-            </a:r>
-            <a:r>
-              <a:rPr lang="en-US" sz="1800" u="sng" dirty="0">
-                <a:solidFill>
-                  <a:srgbClr val="FFFF00"/>
-                </a:solidFill>
-                <a:hlinkClick r:id="rId4"/>
-              </a:rPr>
-              <a:t>open.umich.edu</a:t>
+              <a:t>) of the University of Michigan School of </a:t>
+            </a:r>
+            <a:r>
+              <a:rPr lang="en-US" sz="1800">
+                <a:solidFill>
+                  <a:srgbClr val="FFFFFF"/>
+                </a:solidFill>
+              </a:rPr>
+              <a:t>Information </a:t>
+            </a:r>
+            <a:r>
+              <a:rPr lang="en-US" sz="1800" smtClean="0">
+                <a:solidFill>
+                  <a:srgbClr val="FFFFFF"/>
+                </a:solidFill>
+              </a:rPr>
+              <a:t>and </a:t>
             </a:r>
             <a:r>
               <a:rPr lang="en-US" sz="1800" dirty="0">
                 <a:solidFill>
-                  <a:srgbClr val="FFFF00"/>
-                </a:solidFill>
-              </a:rPr>
-              <a:t> </a:t>
-            </a:r>
-            <a:r>
-              <a:rPr lang="en-US" sz="1800" dirty="0">
-                <a:solidFill>
                   <a:srgbClr val="FFFFFF"/>
                 </a:solidFill>
               </a:rPr>
-              <a:t>and made available under a Creative Commons Attribution 4.0 License.  Please maintain this last slide in all copies of the document to comply with the attribution requirements of the license.  If you make a change, feel free to add your name and organization to the list of contributors on this page as you republish the materials.</a:t>
+              <a:t>made available under a Creative Commons Attribution 4.0 License.  Please maintain this last slide in all copies of the document to comply with the attribution requirements of the license.  If you make a change, feel free to add your name and organization to the list of contributors on this page as you republish the materials.</a:t>
             </a:r>
           </a:p>
           <a:p>
@@ -30974,7 +31010,7 @@
           <p:nvPr/>
         </p:nvPicPr>
         <p:blipFill rotWithShape="1">
-          <a:blip r:embed="rId5">
+          <a:blip r:embed="rId4">
             <a:alphaModFix/>
           </a:blip>
           <a:srcRect/>
@@ -32519,16 +32555,6 @@
               </a:rPr>
               <a:t>https://www.youtube.com/watch?v=XiBYM6g8Tck</a:t>
             </a:r>
-            <a:endParaRPr lang="en-US" sz="3200" u="sng" dirty="0">
-              <a:solidFill>
-                <a:srgbClr val="FFFF00"/>
-              </a:solidFill>
-              <a:latin typeface="Arial" charset="0"/>
-              <a:ea typeface="Arial" charset="0"/>
-              <a:cs typeface="Arial" charset="0"/>
-              <a:sym typeface="Cabin"/>
-              <a:hlinkClick r:id="rId3"/>
-            </a:endParaRPr>
           </a:p>
         </p:txBody>
       </p:sp>
@@ -33234,16 +33260,6 @@
               </a:rPr>
               <a:t>https://www.youtube.com/watch?v=XiBYM6g8Tck</a:t>
             </a:r>
-            <a:endParaRPr lang="en-US" sz="3200" u="sng" dirty="0">
-              <a:solidFill>
-                <a:srgbClr val="FFFF00"/>
-              </a:solidFill>
-              <a:latin typeface="Arial" charset="0"/>
-              <a:ea typeface="Arial" charset="0"/>
-              <a:cs typeface="Arial" charset="0"/>
-              <a:sym typeface="Cabin"/>
-              <a:hlinkClick r:id="rId4"/>
-            </a:endParaRPr>
           </a:p>
         </p:txBody>
       </p:sp>

</xml_diff>

<commit_message>
Adding more videos for CHapter 2
</commit_message>
<xml_diff>
--- a/lectures3/Pythonlearn-01-Intro.pptx
+++ b/lectures3/Pythonlearn-01-Intro.pptx
@@ -15827,7 +15827,7 @@
               <a:buNone/>
             </a:pPr>
             <a:r>
-              <a:rPr lang="en-US" sz="7400" u="none" strike="noStrike" cap="none">
+              <a:rPr lang="en-US" u="none" strike="noStrike" cap="none" dirty="0" smtClean="0">
                 <a:solidFill>
                   <a:srgbClr val="FFFF00"/>
                 </a:solidFill>
@@ -15836,8 +15836,17 @@
                 <a:cs typeface="Arial" charset="0"/>
                 <a:sym typeface="Cabin"/>
               </a:rPr>
-              <a:t>Totally Hot CPU</a:t>
-            </a:r>
+              <a:t>What Happens When a CPU Cooler is Removed?</a:t>
+            </a:r>
+            <a:endParaRPr lang="en-US" u="none" strike="noStrike" cap="none" dirty="0">
+              <a:solidFill>
+                <a:srgbClr val="FFFF00"/>
+              </a:solidFill>
+              <a:latin typeface="Arial" charset="0"/>
+              <a:ea typeface="Arial" charset="0"/>
+              <a:cs typeface="Arial" charset="0"/>
+              <a:sym typeface="Cabin"/>
+            </a:endParaRPr>
           </a:p>
         </p:txBody>
       </p:sp>
@@ -15884,7 +15893,7 @@
               <a:buNone/>
             </a:pPr>
             <a:r>
-              <a:rPr lang="en-US" sz="3000" u="sng" strike="noStrike" cap="none">
+              <a:rPr lang="en-US" sz="3000" u="sng" strike="noStrike" cap="none" dirty="0">
                 <a:solidFill>
                   <a:srgbClr val="FFFF00"/>
                 </a:solidFill>
@@ -16097,7 +16106,7 @@
               <a:buNone/>
             </a:pPr>
             <a:r>
-              <a:rPr lang="en-US" sz="7400" u="none" strike="noStrike" cap="none">
+              <a:rPr lang="en-US" sz="7400" u="none" strike="noStrike" cap="none" dirty="0" smtClean="0">
                 <a:solidFill>
                   <a:srgbClr val="FFFF00"/>
                 </a:solidFill>
@@ -16106,8 +16115,17 @@
                 <a:cs typeface="Arial" charset="0"/>
                 <a:sym typeface="Cabin"/>
               </a:rPr>
-              <a:t>Hard Disk in Action</a:t>
-            </a:r>
+              <a:t>Inside of a Hard Drive</a:t>
+            </a:r>
+            <a:endParaRPr lang="en-US" sz="7400" u="none" strike="noStrike" cap="none" dirty="0">
+              <a:solidFill>
+                <a:srgbClr val="FFFF00"/>
+              </a:solidFill>
+              <a:latin typeface="Arial" charset="0"/>
+              <a:ea typeface="Arial" charset="0"/>
+              <a:cs typeface="Arial" charset="0"/>
+              <a:sym typeface="Cabin"/>
+            </a:endParaRPr>
           </a:p>
         </p:txBody>
       </p:sp>

</xml_diff>

<commit_message>
More changes from Sue
</commit_message>
<xml_diff>
--- a/lectures3/Pythonlearn-01-Intro.pptx
+++ b/lectures3/Pythonlearn-01-Intro.pptx
@@ -18075,19 +18075,7 @@
                 <a:cs typeface="Arial" charset="0"/>
                 <a:sym typeface="Cabin"/>
               </a:rPr>
-              <a:t>print(x</a:t>
-            </a:r>
-            <a:r>
-              <a:rPr lang="en-US" sz="3600" u="none" strike="noStrike" cap="none" dirty="0" smtClean="0">
-                <a:solidFill>
-                  <a:srgbClr val="FFFF00"/>
-                </a:solidFill>
-                <a:latin typeface="Arial" charset="0"/>
-                <a:ea typeface="Arial" charset="0"/>
-                <a:cs typeface="Arial" charset="0"/>
-                <a:sym typeface="Cabin"/>
-              </a:rPr>
-              <a:t>)</a:t>
+              <a:t>print(x)</a:t>
             </a:r>
             <a:endParaRPr lang="en-US" sz="3600" u="none" strike="noStrike" cap="none" dirty="0">
               <a:solidFill>
@@ -18225,19 +18213,7 @@
                 <a:cs typeface="Arial" charset="0"/>
                 <a:sym typeface="Cabin"/>
               </a:rPr>
-              <a:t>print(x</a:t>
-            </a:r>
-            <a:r>
-              <a:rPr lang="en-US" sz="3600" u="none" strike="noStrike" cap="none" dirty="0" smtClean="0">
-                <a:solidFill>
-                  <a:srgbClr val="FFFF00"/>
-                </a:solidFill>
-                <a:latin typeface="Arial" charset="0"/>
-                <a:ea typeface="Arial" charset="0"/>
-                <a:cs typeface="Arial" charset="0"/>
-                <a:sym typeface="Cabin"/>
-              </a:rPr>
-              <a:t>)</a:t>
+              <a:t>print(x)</a:t>
             </a:r>
             <a:endParaRPr lang="en-US" sz="3600" u="none" strike="noStrike" cap="none" dirty="0">
               <a:solidFill>
@@ -28368,19 +28344,7 @@
                 <a:cs typeface="Courier New"/>
                 <a:sym typeface="Courier New"/>
               </a:rPr>
-              <a:t>name = </a:t>
-            </a:r>
-            <a:r>
-              <a:rPr lang="en-US" sz="2800" b="1" dirty="0">
-                <a:solidFill>
-                  <a:schemeClr val="bg1"/>
-                </a:solidFill>
-                <a:latin typeface="Courier New"/>
-                <a:ea typeface="Courier New"/>
-                <a:cs typeface="Courier New"/>
-                <a:sym typeface="Courier New"/>
-              </a:rPr>
-              <a:t>input</a:t>
+              <a:t>name = input</a:t>
             </a:r>
             <a:r>
               <a:rPr lang="en-US" sz="2800" b="1" dirty="0" smtClean="0">
@@ -29230,7 +29194,7 @@
             <a:r>
               <a:rPr lang="en-US" sz="2800" b="1" i="0" u="none" strike="noStrike" cap="none" dirty="0" smtClean="0">
                 <a:solidFill>
-                  <a:schemeClr val="bg1"/>
+                  <a:srgbClr val="FFFF00"/>
                 </a:solidFill>
                 <a:latin typeface="Courier New"/>
                 <a:ea typeface="Courier New"/>

</xml_diff>

<commit_message>
Most of the way chapters 1-10 book / slides
</commit_message>
<xml_diff>
--- a/lectures3/Pythonlearn-01-Intro.pptx
+++ b/lectures3/Pythonlearn-01-Intro.pptx
@@ -260,7 +260,7 @@
   </p:defaultTextStyle>
   <p:extLst>
     <p:ext uri="{EFAFB233-063F-42B5-8137-9DF3F51BA10A}">
-      <p15:sldGuideLst xmlns="" xmlns:p15="http://schemas.microsoft.com/office/powerpoint/2012/main">
+      <p15:sldGuideLst xmlns:p15="http://schemas.microsoft.com/office/powerpoint/2012/main">
         <p15:guide id="1" orient="horz" pos="2880">
           <p15:clr>
             <a:srgbClr val="A4A3A4"/>
@@ -956,37 +956,24 @@
                   <a:schemeClr val="dk2"/>
                 </a:solidFill>
               </a:rPr>
-              <a:t>Note from Chuck.  If you are using these materials, you can remove the UM logo and replace it with your own, but please retain the CC-BY logo on the first page as well as retain the </a:t>
-            </a:r>
-            <a:r>
-              <a:rPr lang="en-US" dirty="0" smtClean="0">
+              <a:t>Note from Chuck.  If you are using these materials, you can remove the UM logo and replace it with your own, but please retain the CC-BY logo on the first page as well as retain the acknowledgements</a:t>
+            </a:r>
+            <a:r>
+              <a:rPr lang="en-US" baseline="0" dirty="0">
                 <a:solidFill>
                   <a:schemeClr val="dk2"/>
                 </a:solidFill>
               </a:rPr>
-              <a:t>acknowledgements</a:t>
-            </a:r>
-            <a:r>
-              <a:rPr lang="en-US" baseline="0" dirty="0" smtClean="0">
+              <a:t> page(s)</a:t>
+            </a:r>
+            <a:r>
+              <a:rPr lang="en-US" dirty="0">
                 <a:solidFill>
                   <a:schemeClr val="dk2"/>
                 </a:solidFill>
               </a:rPr>
-              <a:t> page(s)</a:t>
-            </a:r>
-            <a:r>
-              <a:rPr lang="en-US" dirty="0" smtClean="0">
-                <a:solidFill>
-                  <a:schemeClr val="dk2"/>
-                </a:solidFill>
-              </a:rPr>
               <a:t>.</a:t>
             </a:r>
-            <a:endParaRPr lang="en-US" dirty="0">
-              <a:solidFill>
-                <a:schemeClr val="dk2"/>
-              </a:solidFill>
-            </a:endParaRPr>
           </a:p>
         </p:txBody>
       </p:sp>
@@ -3742,7 +3729,7 @@
               </a:spcBef>
               <a:buNone/>
             </a:pPr>
-            <a:endParaRPr/>
+            <a:endParaRPr dirty="0"/>
           </a:p>
         </p:txBody>
       </p:sp>
@@ -6701,7 +6688,6 @@
           <a:ln>
             <a:noFill/>
           </a:ln>
-          <a:extLst/>
         </p:spPr>
         <p:txBody>
           <a:bodyPr/>
@@ -6825,7 +6811,7 @@
             <a:pPr eaLnBrk="1" hangingPunct="1">
               <a:defRPr/>
             </a:pPr>
-            <a:endParaRPr lang="en-US" altLang="en-US" sz="3600" smtClean="0">
+            <a:endParaRPr lang="en-US" altLang="en-US" sz="3600">
               <a:solidFill>
                 <a:schemeClr val="bg1"/>
               </a:solidFill>
@@ -6856,7 +6842,6 @@
           <a:ln>
             <a:noFill/>
           </a:ln>
-          <a:extLst/>
         </p:spPr>
         <p:txBody>
           <a:bodyPr/>
@@ -6980,7 +6965,7 @@
             <a:pPr eaLnBrk="1" hangingPunct="1">
               <a:defRPr/>
             </a:pPr>
-            <a:endParaRPr lang="en-US" altLang="en-US" sz="3600" smtClean="0">
+            <a:endParaRPr lang="en-US" altLang="en-US" sz="3600">
               <a:solidFill>
                 <a:schemeClr val="bg1"/>
               </a:solidFill>
@@ -7616,7 +7601,7 @@
               <a:buNone/>
             </a:pPr>
             <a:r>
-              <a:rPr lang="en-US" sz="3200" u="none" strike="noStrike" cap="none" dirty="0" smtClean="0">
+              <a:rPr lang="en-US" sz="3200" u="none" strike="noStrike" cap="none" dirty="0">
                 <a:solidFill>
                   <a:srgbClr val="FFFF00"/>
                 </a:solidFill>
@@ -7627,36 +7612,27 @@
               </a:rPr>
               <a:t>Python for Everybody</a:t>
             </a:r>
-            <a:endParaRPr lang="en-US" sz="3200" u="none" strike="noStrike" cap="none" dirty="0">
-              <a:solidFill>
+          </a:p>
+          <a:p>
+            <a:pPr marL="0" marR="0" lvl="0" indent="0" algn="ctr" rtl="0">
+              <a:lnSpc>
+                <a:spcPct val="100000"/>
+              </a:lnSpc>
+              <a:spcBef>
+                <a:spcPts val="0"/>
+              </a:spcBef>
+              <a:spcAft>
+                <a:spcPts val="0"/>
+              </a:spcAft>
+              <a:buClr>
                 <a:srgbClr val="FFFF00"/>
-              </a:solidFill>
-              <a:latin typeface="Arial" charset="0"/>
-              <a:ea typeface="Arial" charset="0"/>
-              <a:cs typeface="Arial" charset="0"/>
-              <a:sym typeface="Cabin"/>
-            </a:endParaRPr>
-          </a:p>
-          <a:p>
-            <a:pPr marL="0" marR="0" lvl="0" indent="0" algn="ctr" rtl="0">
-              <a:lnSpc>
-                <a:spcPct val="100000"/>
-              </a:lnSpc>
-              <a:spcBef>
-                <a:spcPts val="0"/>
-              </a:spcBef>
-              <a:spcAft>
-                <a:spcPts val="0"/>
-              </a:spcAft>
-              <a:buClr>
-                <a:srgbClr val="FFFF00"/>
               </a:buClr>
               <a:buSzPct val="25000"/>
               <a:buFont typeface="Cabin"/>
               <a:buNone/>
             </a:pPr>
             <a:r>
-              <a:rPr lang="en-US" sz="3200" u="sng" strike="noStrike" cap="none" smtClean="0">
+              <a:rPr lang="en-US" sz="3200" u="sng" strike="noStrike" cap="none">
                 <a:solidFill>
                   <a:srgbClr val="FFFF00"/>
                 </a:solidFill>
@@ -7740,13 +7716,6 @@
   <p:clrMapOvr>
     <a:masterClrMapping/>
   </p:clrMapOvr>
-  <p:timing>
-    <p:tnLst>
-      <p:par>
-        <p:cTn xmlns:p14="http://schemas.microsoft.com/office/powerpoint/2010/main" id="1" dur="indefinite" restart="never" nodeType="tmRoot"/>
-      </p:par>
-    </p:tnLst>
-  </p:timing>
 </p:sld>
 </file>
 
@@ -8473,13 +8442,6 @@
   <p:clrMapOvr>
     <a:masterClrMapping/>
   </p:clrMapOvr>
-  <p:timing>
-    <p:tnLst>
-      <p:par>
-        <p:cTn xmlns:p14="http://schemas.microsoft.com/office/powerpoint/2010/main" id="1" dur="indefinite" restart="never" nodeType="tmRoot"/>
-      </p:par>
-    </p:tnLst>
-  </p:timing>
 </p:sld>
 </file>
 
@@ -8887,7 +8849,7 @@
               <a:t>Right </a:t>
             </a:r>
             <a:r>
-              <a:rPr lang="en-US" sz="2400" u="none" strike="noStrike" cap="none" dirty="0" smtClean="0">
+              <a:rPr lang="en-US" sz="2400" u="none" strike="noStrike" cap="none" dirty="0">
                 <a:solidFill>
                   <a:srgbClr val="00FA00"/>
                 </a:solidFill>
@@ -8899,7 +8861,7 @@
               <a:t>hand </a:t>
             </a:r>
             <a:r>
-              <a:rPr lang="en-US" sz="2400" u="none" strike="noStrike" cap="none" dirty="0" smtClean="0">
+              <a:rPr lang="en-US" sz="2400" u="none" strike="noStrike" cap="none" dirty="0">
                 <a:solidFill>
                   <a:schemeClr val="lt1"/>
                 </a:solidFill>
@@ -8908,8 +8870,27 @@
                 <a:cs typeface="Arial" charset="0"/>
                 <a:sym typeface="Cabin"/>
               </a:rPr>
-              <a:t>to </a:t>
-            </a:r>
+              <a:t>to back of head</a:t>
+            </a:r>
+          </a:p>
+          <a:p>
+            <a:pPr marL="685800" marR="0" lvl="2" indent="0" algn="l" rtl="0">
+              <a:lnSpc>
+                <a:spcPct val="100000"/>
+              </a:lnSpc>
+              <a:spcBef>
+                <a:spcPts val="0"/>
+              </a:spcBef>
+              <a:spcAft>
+                <a:spcPts val="0"/>
+              </a:spcAft>
+              <a:buClr>
+                <a:schemeClr val="lt1"/>
+              </a:buClr>
+              <a:buSzPct val="25000"/>
+              <a:buFont typeface="Cabin"/>
+              <a:buNone/>
+            </a:pPr>
             <a:r>
               <a:rPr lang="en-US" sz="2400" u="none" strike="noStrike" cap="none" dirty="0">
                 <a:solidFill>
@@ -8920,7 +8901,19 @@
                 <a:cs typeface="Arial" charset="0"/>
                 <a:sym typeface="Cabin"/>
               </a:rPr>
-              <a:t>back of head</a:t>
+              <a:t>Left hand to right </a:t>
+            </a:r>
+            <a:r>
+              <a:rPr lang="en-US" sz="2400" u="none" strike="noStrike" cap="none" dirty="0">
+                <a:solidFill>
+                  <a:srgbClr val="00FA00"/>
+                </a:solidFill>
+                <a:latin typeface="Arial" charset="0"/>
+                <a:ea typeface="Arial" charset="0"/>
+                <a:cs typeface="Arial" charset="0"/>
+                <a:sym typeface="Cabin"/>
+              </a:rPr>
+              <a:t>hip</a:t>
             </a:r>
           </a:p>
           <a:p>
@@ -8951,10 +8944,10 @@
                 <a:cs typeface="Arial" charset="0"/>
                 <a:sym typeface="Cabin"/>
               </a:rPr>
-              <a:t>Left hand to right </a:t>
-            </a:r>
-            <a:r>
-              <a:rPr lang="en-US" sz="2400" u="none" strike="noStrike" cap="none" dirty="0" smtClean="0">
+              <a:t>Right hand to left </a:t>
+            </a:r>
+            <a:r>
+              <a:rPr lang="en-US" sz="2400" u="none" strike="noStrike" cap="none" dirty="0">
                 <a:solidFill>
                   <a:srgbClr val="00FA00"/>
                 </a:solidFill>
@@ -8965,67 +8958,6 @@
               </a:rPr>
               <a:t>hip</a:t>
             </a:r>
-            <a:endParaRPr lang="en-US" sz="2400" u="none" strike="noStrike" cap="none" dirty="0">
-              <a:solidFill>
-                <a:srgbClr val="00FA00"/>
-              </a:solidFill>
-              <a:latin typeface="Arial" charset="0"/>
-              <a:ea typeface="Arial" charset="0"/>
-              <a:cs typeface="Arial" charset="0"/>
-              <a:sym typeface="Cabin"/>
-            </a:endParaRPr>
-          </a:p>
-          <a:p>
-            <a:pPr marL="685800" marR="0" lvl="2" indent="0" algn="l" rtl="0">
-              <a:lnSpc>
-                <a:spcPct val="100000"/>
-              </a:lnSpc>
-              <a:spcBef>
-                <a:spcPts val="0"/>
-              </a:spcBef>
-              <a:spcAft>
-                <a:spcPts val="0"/>
-              </a:spcAft>
-              <a:buClr>
-                <a:schemeClr val="lt1"/>
-              </a:buClr>
-              <a:buSzPct val="25000"/>
-              <a:buFont typeface="Cabin"/>
-              <a:buNone/>
-            </a:pPr>
-            <a:r>
-              <a:rPr lang="en-US" sz="2400" u="none" strike="noStrike" cap="none" dirty="0">
-                <a:solidFill>
-                  <a:schemeClr val="lt1"/>
-                </a:solidFill>
-                <a:latin typeface="Arial" charset="0"/>
-                <a:ea typeface="Arial" charset="0"/>
-                <a:cs typeface="Arial" charset="0"/>
-                <a:sym typeface="Cabin"/>
-              </a:rPr>
-              <a:t>Right hand to left </a:t>
-            </a:r>
-            <a:r>
-              <a:rPr lang="en-US" sz="2400" u="none" strike="noStrike" cap="none" dirty="0" smtClean="0">
-                <a:solidFill>
-                  <a:srgbClr val="00FA00"/>
-                </a:solidFill>
-                <a:latin typeface="Arial" charset="0"/>
-                <a:ea typeface="Arial" charset="0"/>
-                <a:cs typeface="Arial" charset="0"/>
-                <a:sym typeface="Cabin"/>
-              </a:rPr>
-              <a:t>hip</a:t>
-            </a:r>
-            <a:endParaRPr lang="en-US" sz="2400" u="none" strike="noStrike" cap="none" dirty="0">
-              <a:solidFill>
-                <a:srgbClr val="00FA00"/>
-              </a:solidFill>
-              <a:latin typeface="Arial" charset="0"/>
-              <a:ea typeface="Arial" charset="0"/>
-              <a:cs typeface="Arial" charset="0"/>
-              <a:sym typeface="Cabin"/>
-            </a:endParaRPr>
           </a:p>
           <a:p>
             <a:pPr marL="685800" marR="0" lvl="2" indent="0" algn="l" rtl="0">
@@ -9236,13 +9168,6 @@
   <p:clrMapOvr>
     <a:masterClrMapping/>
   </p:clrMapOvr>
-  <p:timing>
-    <p:tnLst>
-      <p:par>
-        <p:cTn xmlns:p14="http://schemas.microsoft.com/office/powerpoint/2010/main" id="1" dur="indefinite" restart="never" nodeType="tmRoot"/>
-      </p:par>
-    </p:tnLst>
-  </p:timing>
 </p:sld>
 </file>
 
@@ -9430,70 +9355,45 @@
           <a:lstStyle/>
           <a:p>
             <a:r>
-              <a:rPr lang="en-US" sz="1600" dirty="0" smtClean="0">
+              <a:rPr lang="en-US" sz="1600" dirty="0">
                 <a:solidFill>
                   <a:schemeClr val="bg1"/>
                 </a:solidFill>
               </a:rPr>
-              <a:t>Image</a:t>
+              <a:t>Image: </a:t>
             </a:r>
             <a:r>
               <a:rPr lang="en-US" sz="1600" dirty="0">
                 <a:solidFill>
                   <a:schemeClr val="bg1"/>
                 </a:solidFill>
-              </a:rPr>
-              <a:t>: </a:t>
+                <a:hlinkClick r:id="rId4"/>
+              </a:rPr>
+              <a:t>https://www.flickr.com/photos/allan_harris/4908070612/</a:t>
             </a:r>
             <a:r>
               <a:rPr lang="en-US" sz="1600" dirty="0">
                 <a:solidFill>
                   <a:schemeClr val="bg1"/>
                 </a:solidFill>
-                <a:hlinkClick r:id="rId4"/>
-              </a:rPr>
-              <a:t>https://www.flickr.com/photos/allan_harris/4908070612</a:t>
-            </a:r>
-            <a:r>
-              <a:rPr lang="en-US" sz="1600" dirty="0" smtClean="0">
+              </a:rPr>
+              <a:t> Attribution-</a:t>
+            </a:r>
+            <a:r>
+              <a:rPr lang="en-US" sz="1600" dirty="0" err="1">
                 <a:solidFill>
                   <a:schemeClr val="bg1"/>
                 </a:solidFill>
-                <a:hlinkClick r:id="rId4"/>
-              </a:rPr>
-              <a:t>/</a:t>
-            </a:r>
-            <a:r>
-              <a:rPr lang="en-US" sz="1600" dirty="0" smtClean="0">
+              </a:rPr>
+              <a:t>NoDerivs</a:t>
+            </a:r>
+            <a:r>
+              <a:rPr lang="en-US" sz="1600" dirty="0">
                 <a:solidFill>
                   <a:schemeClr val="bg1"/>
                 </a:solidFill>
               </a:rPr>
-              <a:t> Attribution-</a:t>
-            </a:r>
-            <a:r>
-              <a:rPr lang="en-US" sz="1600" dirty="0" err="1" smtClean="0">
-                <a:solidFill>
-                  <a:schemeClr val="bg1"/>
-                </a:solidFill>
-              </a:rPr>
-              <a:t>NoDerivs</a:t>
-            </a:r>
-            <a:r>
-              <a:rPr lang="en-US" sz="1600" dirty="0" smtClean="0">
-                <a:solidFill>
-                  <a:schemeClr val="bg1"/>
-                </a:solidFill>
-              </a:rPr>
-              <a:t> </a:t>
-            </a:r>
-            <a:r>
-              <a:rPr lang="en-US" sz="1600" dirty="0">
-                <a:solidFill>
-                  <a:schemeClr val="bg1"/>
-                </a:solidFill>
-              </a:rPr>
-              <a:t>2.0 Generic (CC BY-ND 2.0)</a:t>
+              <a:t> 2.0 Generic (CC BY-ND 2.0)</a:t>
             </a:r>
           </a:p>
         </p:txBody>
@@ -9506,7 +9406,7 @@
   <p:timing>
     <p:tnLst>
       <p:par>
-        <p:cTn xmlns:p14="http://schemas.microsoft.com/office/powerpoint/2010/main" id="1" dur="indefinite" restart="never" nodeType="tmRoot">
+        <p:cTn id="1" dur="indefinite" restart="never" nodeType="tmRoot">
           <p:childTnLst>
             <p:seq concurrent="1" nextAc="seek">
               <p:cTn id="2" dur="indefinite" nodeType="mainSeq">
@@ -9901,70 +9801,45 @@
           <a:lstStyle/>
           <a:p>
             <a:r>
-              <a:rPr lang="en-US" sz="1600" dirty="0" smtClean="0">
+              <a:rPr lang="en-US" sz="1600" dirty="0">
                 <a:solidFill>
                   <a:schemeClr val="bg1"/>
                 </a:solidFill>
               </a:rPr>
-              <a:t>Image</a:t>
+              <a:t>Image: </a:t>
             </a:r>
             <a:r>
               <a:rPr lang="en-US" sz="1600" dirty="0">
                 <a:solidFill>
                   <a:schemeClr val="bg1"/>
                 </a:solidFill>
-              </a:rPr>
-              <a:t>: </a:t>
+                <a:hlinkClick r:id="rId4"/>
+              </a:rPr>
+              <a:t>https://www.flickr.com/photos/allan_harris/4908070612/</a:t>
             </a:r>
             <a:r>
               <a:rPr lang="en-US" sz="1600" dirty="0">
                 <a:solidFill>
                   <a:schemeClr val="bg1"/>
                 </a:solidFill>
-                <a:hlinkClick r:id="rId4"/>
-              </a:rPr>
-              <a:t>https://www.flickr.com/photos/allan_harris/4908070612</a:t>
-            </a:r>
-            <a:r>
-              <a:rPr lang="en-US" sz="1600" dirty="0" smtClean="0">
+              </a:rPr>
+              <a:t> Attribution-</a:t>
+            </a:r>
+            <a:r>
+              <a:rPr lang="en-US" sz="1600" dirty="0" err="1">
                 <a:solidFill>
                   <a:schemeClr val="bg1"/>
                 </a:solidFill>
-                <a:hlinkClick r:id="rId4"/>
-              </a:rPr>
-              <a:t>/</a:t>
-            </a:r>
-            <a:r>
-              <a:rPr lang="en-US" sz="1600" dirty="0" smtClean="0">
+              </a:rPr>
+              <a:t>NoDerivs</a:t>
+            </a:r>
+            <a:r>
+              <a:rPr lang="en-US" sz="1600" dirty="0">
                 <a:solidFill>
                   <a:schemeClr val="bg1"/>
                 </a:solidFill>
               </a:rPr>
-              <a:t> Attribution-</a:t>
-            </a:r>
-            <a:r>
-              <a:rPr lang="en-US" sz="1600" dirty="0" err="1" smtClean="0">
-                <a:solidFill>
-                  <a:schemeClr val="bg1"/>
-                </a:solidFill>
-              </a:rPr>
-              <a:t>NoDerivs</a:t>
-            </a:r>
-            <a:r>
-              <a:rPr lang="en-US" sz="1600" dirty="0" smtClean="0">
-                <a:solidFill>
-                  <a:schemeClr val="bg1"/>
-                </a:solidFill>
-              </a:rPr>
-              <a:t> </a:t>
-            </a:r>
-            <a:r>
-              <a:rPr lang="en-US" sz="1600" dirty="0">
-                <a:solidFill>
-                  <a:schemeClr val="bg1"/>
-                </a:solidFill>
-              </a:rPr>
-              <a:t>2.0 Generic (CC BY-ND 2.0)</a:t>
+              <a:t> 2.0 Generic (CC BY-ND 2.0)</a:t>
             </a:r>
           </a:p>
         </p:txBody>
@@ -9977,7 +9852,7 @@
   <p:timing>
     <p:tnLst>
       <p:par>
-        <p:cTn xmlns:p14="http://schemas.microsoft.com/office/powerpoint/2010/main" id="1" dur="indefinite" restart="never" nodeType="tmRoot">
+        <p:cTn id="1" dur="indefinite" restart="never" nodeType="tmRoot">
           <p:childTnLst>
             <p:seq concurrent="1" nextAc="seek">
               <p:cTn id="2" dur="indefinite" nodeType="mainSeq">
@@ -10118,31 +9993,7 @@
                 <a:cs typeface="Courier"/>
                 <a:sym typeface="Courier New"/>
               </a:rPr>
-              <a:t>name = </a:t>
-            </a:r>
-            <a:r>
-              <a:rPr lang="en-US" sz="2800" dirty="0" smtClean="0">
-                <a:solidFill>
-                  <a:srgbClr val="00FF00"/>
-                </a:solidFill>
-                <a:latin typeface="Courier"/>
-                <a:ea typeface="Courier"/>
-                <a:cs typeface="Courier"/>
-                <a:sym typeface="Courier New"/>
-              </a:rPr>
-              <a:t>input(</a:t>
-            </a:r>
-            <a:r>
-              <a:rPr lang="en-US" sz="2800" dirty="0">
-                <a:solidFill>
-                  <a:srgbClr val="00FF00"/>
-                </a:solidFill>
-                <a:latin typeface="Courier"/>
-                <a:ea typeface="Courier"/>
-                <a:cs typeface="Courier"/>
-                <a:sym typeface="Courier New"/>
-              </a:rPr>
-              <a:t>'Enter file:')</a:t>
+              <a:t>name = input('Enter file:')</a:t>
             </a:r>
           </a:p>
           <a:p>
@@ -11090,13 +10941,6 @@
   <p:clrMapOvr>
     <a:masterClrMapping/>
   </p:clrMapOvr>
-  <p:timing>
-    <p:tnLst>
-      <p:par>
-        <p:cTn xmlns:p14="http://schemas.microsoft.com/office/powerpoint/2010/main" id="1" dur="indefinite" restart="never" nodeType="tmRoot"/>
-      </p:par>
-    </p:tnLst>
-  </p:timing>
 </p:sld>
 </file>
 
@@ -11183,13 +11027,6 @@
   <p:clrMapOvr>
     <a:masterClrMapping/>
   </p:clrMapOvr>
-  <p:timing>
-    <p:tnLst>
-      <p:par>
-        <p:cTn xmlns:p14="http://schemas.microsoft.com/office/powerpoint/2010/main" id="1" dur="indefinite" restart="never" nodeType="tmRoot"/>
-      </p:par>
-    </p:tnLst>
-  </p:timing>
 </p:sld>
 </file>
 
@@ -11313,13 +11150,6 @@
   <p:clrMapOvr>
     <a:masterClrMapping/>
   </p:clrMapOvr>
-  <p:timing>
-    <p:tnLst>
-      <p:par>
-        <p:cTn xmlns:p14="http://schemas.microsoft.com/office/powerpoint/2010/main" id="1" dur="indefinite" restart="never" nodeType="tmRoot"/>
-      </p:par>
-    </p:tnLst>
-  </p:timing>
 </p:sld>
 </file>
 
@@ -12172,13 +12002,6 @@
   <p:clrMapOvr>
     <a:masterClrMapping/>
   </p:clrMapOvr>
-  <p:timing>
-    <p:tnLst>
-      <p:par>
-        <p:cTn xmlns:p14="http://schemas.microsoft.com/office/powerpoint/2010/main" id="1" dur="indefinite" restart="never" nodeType="tmRoot"/>
-      </p:par>
-    </p:tnLst>
-  </p:timing>
 </p:sld>
 </file>
 
@@ -12370,7 +12193,7 @@
               <a:t>what to do next</a:t>
             </a:r>
             <a:r>
-              <a:rPr lang="en-US" sz="3000" b="0" i="0" u="none" strike="noStrike" cap="none" dirty="0" smtClean="0">
+              <a:rPr lang="en-US" sz="3000" b="0" i="0" u="none" strike="noStrike" cap="none" dirty="0">
                 <a:solidFill>
                   <a:srgbClr val="FFFFFF"/>
                 </a:solidFill>
@@ -12394,7 +12217,7 @@
               <a:t>.</a:t>
             </a:r>
             <a:r>
-              <a:rPr lang="en-US" sz="3000" u="none" strike="noStrike" cap="none" dirty="0" smtClean="0">
+              <a:rPr lang="en-US" sz="3000" u="none" strike="noStrike" cap="none" dirty="0">
                 <a:solidFill>
                   <a:srgbClr val="FFFFFF"/>
                 </a:solidFill>
@@ -12403,19 +12226,7 @@
                 <a:cs typeface="Arial" charset="0"/>
                 <a:sym typeface="Cabin"/>
               </a:rPr>
-              <a:t>  </a:t>
-            </a:r>
-            <a:r>
-              <a:rPr lang="en-US" sz="3000" u="none" strike="noStrike" cap="none" dirty="0">
-                <a:solidFill>
-                  <a:srgbClr val="FFFFFF"/>
-                </a:solidFill>
-                <a:latin typeface="Arial" charset="0"/>
-                <a:ea typeface="Arial" charset="0"/>
-                <a:cs typeface="Arial" charset="0"/>
-                <a:sym typeface="Cabin"/>
-              </a:rPr>
-              <a:t>Not the brains </a:t>
+              <a:t>  Not the brains </a:t>
             </a:r>
             <a:br>
               <a:rPr lang="en-US" sz="3000" u="none" strike="noStrike" cap="none" dirty="0">
@@ -12743,13 +12554,6 @@
   <p:clrMapOvr>
     <a:masterClrMapping/>
   </p:clrMapOvr>
-  <p:timing>
-    <p:tnLst>
-      <p:par>
-        <p:cTn xmlns:p14="http://schemas.microsoft.com/office/powerpoint/2010/main" id="1" dur="indefinite" restart="never" nodeType="tmRoot"/>
-      </p:par>
-    </p:tnLst>
-  </p:timing>
 </p:sld>
 </file>
 
@@ -13687,13 +13491,6 @@
   <p:clrMapOvr>
     <a:masterClrMapping/>
   </p:clrMapOvr>
-  <p:timing>
-    <p:tnLst>
-      <p:par>
-        <p:cTn xmlns:p14="http://schemas.microsoft.com/office/powerpoint/2010/main" id="1" dur="indefinite" restart="never" nodeType="tmRoot"/>
-      </p:par>
-    </p:tnLst>
-  </p:timing>
 </p:sld>
 </file>
 
@@ -13889,31 +13686,7 @@
                 <a:cs typeface="Arial" charset="0"/>
                 <a:sym typeface="Cabin"/>
               </a:rPr>
-              <a:t>Users have it easy - someone already put many different programs (instructions) into the computer and users just pick the ones </a:t>
-            </a:r>
-            <a:r>
-              <a:rPr lang="en-US" sz="3200" u="none" strike="noStrike" cap="none" dirty="0" smtClean="0">
-                <a:solidFill>
-                  <a:schemeClr val="lt1"/>
-                </a:solidFill>
-                <a:latin typeface="Arial" charset="0"/>
-                <a:ea typeface="Arial" charset="0"/>
-                <a:cs typeface="Arial" charset="0"/>
-                <a:sym typeface="Cabin"/>
-              </a:rPr>
-              <a:t>they </a:t>
-            </a:r>
-            <a:r>
-              <a:rPr lang="en-US" sz="3200" u="none" strike="noStrike" cap="none" dirty="0">
-                <a:solidFill>
-                  <a:schemeClr val="lt1"/>
-                </a:solidFill>
-                <a:latin typeface="Arial" charset="0"/>
-                <a:ea typeface="Arial" charset="0"/>
-                <a:cs typeface="Arial" charset="0"/>
-                <a:sym typeface="Cabin"/>
-              </a:rPr>
-              <a:t>want to use</a:t>
+              <a:t>Users have it easy - someone already put many different programs (instructions) into the computer and users just pick the ones they want to use</a:t>
             </a:r>
           </a:p>
         </p:txBody>
@@ -14693,13 +14466,6 @@
   <p:clrMapOvr>
     <a:masterClrMapping/>
   </p:clrMapOvr>
-  <p:timing>
-    <p:tnLst>
-      <p:par>
-        <p:cTn xmlns:p14="http://schemas.microsoft.com/office/powerpoint/2010/main" id="1" dur="indefinite" restart="never" nodeType="tmRoot"/>
-      </p:par>
-    </p:tnLst>
-  </p:timing>
 </p:sld>
 </file>
 
@@ -15761,13 +15527,6 @@
   <p:clrMapOvr>
     <a:masterClrMapping/>
   </p:clrMapOvr>
-  <p:timing>
-    <p:tnLst>
-      <p:par>
-        <p:cTn xmlns:p14="http://schemas.microsoft.com/office/powerpoint/2010/main" id="1" dur="indefinite" restart="never" nodeType="tmRoot"/>
-      </p:par>
-    </p:tnLst>
-  </p:timing>
 </p:sld>
 </file>
 
@@ -15831,7 +15590,7 @@
               <a:buNone/>
             </a:pPr>
             <a:r>
-              <a:rPr lang="en-US" sz="7200" u="none" strike="noStrike" cap="none" dirty="0" smtClean="0">
+              <a:rPr lang="en-US" sz="7200" u="none" strike="noStrike" cap="none" dirty="0">
                 <a:solidFill>
                   <a:srgbClr val="FFD966"/>
                 </a:solidFill>
@@ -15842,15 +15601,6 @@
               </a:rPr>
               <a:t>Totally Hot CPU</a:t>
             </a:r>
-            <a:endParaRPr lang="en-US" sz="7200" u="none" strike="noStrike" cap="none" dirty="0">
-              <a:solidFill>
-                <a:srgbClr val="FFD966"/>
-              </a:solidFill>
-              <a:latin typeface="Arial" charset="0"/>
-              <a:ea typeface="Arial" charset="0"/>
-              <a:cs typeface="Arial" charset="0"/>
-              <a:sym typeface="Cabin"/>
-            </a:endParaRPr>
           </a:p>
         </p:txBody>
       </p:sp>
@@ -16040,13 +15790,6 @@
   <p:clrMapOvr>
     <a:masterClrMapping/>
   </p:clrMapOvr>
-  <p:timing>
-    <p:tnLst>
-      <p:par>
-        <p:cTn xmlns:p14="http://schemas.microsoft.com/office/powerpoint/2010/main" id="1" dur="indefinite" restart="never" nodeType="tmRoot"/>
-      </p:par>
-    </p:tnLst>
-  </p:timing>
 </p:sld>
 </file>
 
@@ -16110,7 +15853,7 @@
               <a:buNone/>
             </a:pPr>
             <a:r>
-              <a:rPr lang="en-US" sz="7200" u="none" strike="noStrike" cap="none" dirty="0" smtClean="0">
+              <a:rPr lang="en-US" sz="7200" u="none" strike="noStrike" cap="none" dirty="0">
                 <a:solidFill>
                   <a:srgbClr val="FFD966"/>
                 </a:solidFill>
@@ -16121,15 +15864,6 @@
               </a:rPr>
               <a:t>Hard Disk in Action</a:t>
             </a:r>
-            <a:endParaRPr lang="en-US" sz="7200" u="none" strike="noStrike" cap="none" dirty="0">
-              <a:solidFill>
-                <a:srgbClr val="FFD966"/>
-              </a:solidFill>
-              <a:latin typeface="Arial" charset="0"/>
-              <a:ea typeface="Arial" charset="0"/>
-              <a:cs typeface="Arial" charset="0"/>
-              <a:sym typeface="Cabin"/>
-            </a:endParaRPr>
           </a:p>
         </p:txBody>
       </p:sp>
@@ -16223,13 +15957,6 @@
   <p:clrMapOvr>
     <a:masterClrMapping/>
   </p:clrMapOvr>
-  <p:timing>
-    <p:tnLst>
-      <p:par>
-        <p:cTn xmlns:p14="http://schemas.microsoft.com/office/powerpoint/2010/main" id="1" dur="indefinite" restart="never" nodeType="tmRoot"/>
-      </p:par>
-    </p:tnLst>
-  </p:timing>
 </p:sld>
 </file>
 
@@ -16312,13 +16039,6 @@
   <p:clrMapOvr>
     <a:masterClrMapping/>
   </p:clrMapOvr>
-  <p:timing>
-    <p:tnLst>
-      <p:par>
-        <p:cTn xmlns:p14="http://schemas.microsoft.com/office/powerpoint/2010/main" id="1" dur="indefinite" restart="never" nodeType="tmRoot"/>
-      </p:par>
-    </p:tnLst>
-  </p:timing>
 </p:sld>
 </file>
 
@@ -16655,13 +16375,6 @@
   <p:clrMapOvr>
     <a:masterClrMapping/>
   </p:clrMapOvr>
-  <p:timing>
-    <p:tnLst>
-      <p:par>
-        <p:cTn xmlns:p14="http://schemas.microsoft.com/office/powerpoint/2010/main" id="1" dur="indefinite" restart="never" nodeType="tmRoot"/>
-      </p:par>
-    </p:tnLst>
-  </p:timing>
 </p:sld>
 </file>
 
@@ -16957,13 +16670,6 @@
   <p:clrMapOvr>
     <a:masterClrMapping/>
   </p:clrMapOvr>
-  <p:timing>
-    <p:tnLst>
-      <p:par>
-        <p:cTn xmlns:p14="http://schemas.microsoft.com/office/powerpoint/2010/main" id="1" dur="indefinite" restart="never" nodeType="tmRoot"/>
-      </p:par>
-    </p:tnLst>
-  </p:timing>
 </p:sld>
 </file>
 
@@ -17441,13 +17147,6 @@
   <p:clrMapOvr>
     <a:masterClrMapping/>
   </p:clrMapOvr>
-  <p:timing>
-    <p:tnLst>
-      <p:par>
-        <p:cTn xmlns:p14="http://schemas.microsoft.com/office/powerpoint/2010/main" id="1" dur="indefinite" restart="never" nodeType="tmRoot"/>
-      </p:par>
-    </p:tnLst>
-  </p:timing>
 </p:sld>
 </file>
 
@@ -17534,13 +17233,6 @@
   <p:clrMapOvr>
     <a:masterClrMapping/>
   </p:clrMapOvr>
-  <p:timing>
-    <p:tnLst>
-      <p:par>
-        <p:cTn xmlns:p14="http://schemas.microsoft.com/office/powerpoint/2010/main" id="1" dur="indefinite" restart="never" nodeType="tmRoot"/>
-      </p:par>
-    </p:tnLst>
-  </p:timing>
 </p:sld>
 </file>
 
@@ -17593,7 +17285,7 @@
               <a:buSzPct val="25000"/>
             </a:pPr>
             <a:r>
-              <a:rPr lang="en-US" sz="3600" u="none" strike="noStrike" cap="none" dirty="0" err="1" smtClean="0">
+              <a:rPr lang="en-US" sz="3600" u="none" strike="noStrike" cap="none" dirty="0" err="1">
                 <a:solidFill>
                   <a:schemeClr val="lt1"/>
                 </a:solidFill>
@@ -17605,7 +17297,7 @@
               <a:t>csev</a:t>
             </a:r>
             <a:r>
-              <a:rPr lang="en-US" sz="3600" u="none" strike="noStrike" cap="none" dirty="0" smtClean="0">
+              <a:rPr lang="en-US" sz="3600" u="none" strike="noStrike" cap="none" dirty="0">
                 <a:solidFill>
                   <a:schemeClr val="lt1"/>
                 </a:solidFill>
@@ -17617,7 +17309,7 @@
               <a:t>$ </a:t>
             </a:r>
             <a:r>
-              <a:rPr lang="en-US" sz="3600" dirty="0" smtClean="0">
+              <a:rPr lang="en-US" sz="3600" dirty="0">
                 <a:solidFill>
                   <a:srgbClr val="FFFF00"/>
                 </a:solidFill>
@@ -17637,7 +17329,7 @@
               <a:buSzPct val="25000"/>
             </a:pPr>
             <a:r>
-              <a:rPr lang="en-US" sz="3600" dirty="0" smtClean="0">
+              <a:rPr lang="en-US" sz="3600" dirty="0">
                 <a:solidFill>
                   <a:schemeClr val="bg1"/>
                 </a:solidFill>
@@ -17646,7 +17338,19 @@
                 <a:cs typeface="Arial" charset="0"/>
                 <a:sym typeface="Cabin"/>
               </a:rPr>
-              <a:t>Python </a:t>
+              <a:t>Python 3.5.1 (v3.5.1:37a07cee5969, Dec  5 2015, 21:12:44) [GCC 4.2.1 (Apple Inc. build 5666) (dot 3)] on </a:t>
+            </a:r>
+            <a:r>
+              <a:rPr lang="en-US" sz="3600" dirty="0" err="1">
+                <a:solidFill>
+                  <a:schemeClr val="bg1"/>
+                </a:solidFill>
+                <a:latin typeface="Arial" charset="0"/>
+                <a:ea typeface="Arial" charset="0"/>
+                <a:cs typeface="Arial" charset="0"/>
+                <a:sym typeface="Cabin"/>
+              </a:rPr>
+              <a:t>darwinType</a:t>
             </a:r>
             <a:r>
               <a:rPr lang="en-US" sz="3600" dirty="0">
@@ -17658,54 +17362,18 @@
                 <a:cs typeface="Arial" charset="0"/>
                 <a:sym typeface="Cabin"/>
               </a:rPr>
-              <a:t>3.5.1 (v3.5.1:37a07cee5969, Dec  5 2015, 21:12:44) [GCC 4.2.1 (Apple Inc. build 5666) (dot 3)] on </a:t>
-            </a:r>
-            <a:r>
-              <a:rPr lang="en-US" sz="3600" dirty="0" err="1">
-                <a:solidFill>
-                  <a:schemeClr val="bg1"/>
-                </a:solidFill>
-                <a:latin typeface="Arial" charset="0"/>
-                <a:ea typeface="Arial" charset="0"/>
-                <a:cs typeface="Arial" charset="0"/>
-                <a:sym typeface="Cabin"/>
-              </a:rPr>
-              <a:t>darwinType</a:t>
-            </a:r>
+              <a:t> "help", "copyright", "credits" or "license" for more information.</a:t>
+            </a:r>
+          </a:p>
+          <a:p>
+            <a:pPr lvl="0">
+              <a:buClr>
+                <a:schemeClr val="lt1"/>
+              </a:buClr>
+              <a:buSzPct val="25000"/>
+            </a:pPr>
             <a:r>
               <a:rPr lang="en-US" sz="3600" dirty="0">
-                <a:solidFill>
-                  <a:schemeClr val="bg1"/>
-                </a:solidFill>
-                <a:latin typeface="Arial" charset="0"/>
-                <a:ea typeface="Arial" charset="0"/>
-                <a:cs typeface="Arial" charset="0"/>
-                <a:sym typeface="Cabin"/>
-              </a:rPr>
-              <a:t> "help", "copyright", "credits" or "license" for more information</a:t>
-            </a:r>
-            <a:r>
-              <a:rPr lang="en-US" sz="3600" dirty="0" smtClean="0">
-                <a:solidFill>
-                  <a:schemeClr val="bg1"/>
-                </a:solidFill>
-                <a:latin typeface="Arial" charset="0"/>
-                <a:ea typeface="Arial" charset="0"/>
-                <a:cs typeface="Arial" charset="0"/>
-                <a:sym typeface="Cabin"/>
-              </a:rPr>
-              <a:t>.</a:t>
-            </a:r>
-          </a:p>
-          <a:p>
-            <a:pPr lvl="0">
-              <a:buClr>
-                <a:schemeClr val="lt1"/>
-              </a:buClr>
-              <a:buSzPct val="25000"/>
-            </a:pPr>
-            <a:r>
-              <a:rPr lang="en-US" sz="3600" dirty="0" smtClean="0">
                 <a:solidFill>
                   <a:schemeClr val="bg1"/>
                 </a:solidFill>
@@ -17831,13 +17499,6 @@
   <p:clrMapOvr>
     <a:masterClrMapping/>
   </p:clrMapOvr>
-  <p:timing>
-    <p:tnLst>
-      <p:par>
-        <p:cTn xmlns:p14="http://schemas.microsoft.com/office/powerpoint/2010/main" id="1" dur="indefinite" restart="never" nodeType="tmRoot"/>
-      </p:par>
-    </p:tnLst>
-  </p:timing>
 </p:sld>
 </file>
 
@@ -17890,7 +17551,7 @@
               <a:buSzPct val="25000"/>
             </a:pPr>
             <a:r>
-              <a:rPr lang="en-US" sz="3600" u="none" strike="noStrike" cap="none" dirty="0" err="1" smtClean="0">
+              <a:rPr lang="en-US" sz="3600" u="none" strike="noStrike" cap="none" dirty="0" err="1">
                 <a:solidFill>
                   <a:schemeClr val="lt1"/>
                 </a:solidFill>
@@ -17902,7 +17563,7 @@
               <a:t>csev</a:t>
             </a:r>
             <a:r>
-              <a:rPr lang="en-US" sz="3600" u="none" strike="noStrike" cap="none" dirty="0" smtClean="0">
+              <a:rPr lang="en-US" sz="3600" u="none" strike="noStrike" cap="none" dirty="0">
                 <a:solidFill>
                   <a:schemeClr val="lt1"/>
                 </a:solidFill>
@@ -17914,7 +17575,7 @@
               <a:t>$ </a:t>
             </a:r>
             <a:r>
-              <a:rPr lang="en-US" sz="3600" dirty="0" smtClean="0">
+              <a:rPr lang="en-US" sz="3600" dirty="0">
                 <a:solidFill>
                   <a:srgbClr val="FFFF00"/>
                 </a:solidFill>
@@ -17925,15 +17586,6 @@
               </a:rPr>
               <a:t>python3</a:t>
             </a:r>
-            <a:endParaRPr lang="en-US" sz="3600" dirty="0">
-              <a:solidFill>
-                <a:srgbClr val="FFFF00"/>
-              </a:solidFill>
-              <a:latin typeface="Arial" charset="0"/>
-              <a:ea typeface="Arial" charset="0"/>
-              <a:cs typeface="Arial" charset="0"/>
-              <a:sym typeface="Cabin"/>
-            </a:endParaRPr>
           </a:p>
           <a:p>
             <a:pPr lvl="0">
@@ -17976,19 +17628,7 @@
                 <a:cs typeface="Arial" charset="0"/>
                 <a:sym typeface="Cabin"/>
               </a:rPr>
-              <a:t> "help", "copyright", "credits" or "license" for more information</a:t>
-            </a:r>
-            <a:r>
-              <a:rPr lang="en-US" sz="3600" dirty="0" smtClean="0">
-                <a:solidFill>
-                  <a:schemeClr val="bg1"/>
-                </a:solidFill>
-                <a:latin typeface="Arial" charset="0"/>
-                <a:ea typeface="Arial" charset="0"/>
-                <a:cs typeface="Arial" charset="0"/>
-                <a:sym typeface="Cabin"/>
-              </a:rPr>
-              <a:t>.</a:t>
+              <a:t> "help", "copyright", "credits" or "license" for more information.</a:t>
             </a:r>
             <a:endParaRPr lang="en-US" sz="3600" u="none" strike="noStrike" cap="none" dirty="0">
               <a:solidFill>
@@ -18074,7 +17714,7 @@
               <a:t>&gt;&gt;&gt; </a:t>
             </a:r>
             <a:r>
-              <a:rPr lang="en-US" sz="3600" u="none" strike="noStrike" cap="none" dirty="0" smtClean="0">
+              <a:rPr lang="en-US" sz="3600" u="none" strike="noStrike" cap="none" dirty="0">
                 <a:solidFill>
                   <a:srgbClr val="FFFF00"/>
                 </a:solidFill>
@@ -18085,15 +17725,6 @@
               </a:rPr>
               <a:t>print(x)</a:t>
             </a:r>
-            <a:endParaRPr lang="en-US" sz="3600" u="none" strike="noStrike" cap="none" dirty="0">
-              <a:solidFill>
-                <a:srgbClr val="FFFF00"/>
-              </a:solidFill>
-              <a:latin typeface="Arial" charset="0"/>
-              <a:ea typeface="Arial" charset="0"/>
-              <a:cs typeface="Arial" charset="0"/>
-              <a:sym typeface="Cabin"/>
-            </a:endParaRPr>
           </a:p>
           <a:p>
             <a:pPr marL="0" marR="0" lvl="0" indent="0" algn="l" rtl="0">
@@ -18212,7 +17843,7 @@
               <a:t> </a:t>
             </a:r>
             <a:r>
-              <a:rPr lang="en-US" sz="3600" u="none" strike="noStrike" cap="none" dirty="0" smtClean="0">
+              <a:rPr lang="en-US" sz="3600" u="none" strike="noStrike" cap="none" dirty="0">
                 <a:solidFill>
                   <a:srgbClr val="FFFF00"/>
                 </a:solidFill>
@@ -18223,15 +17854,6 @@
               </a:rPr>
               <a:t>print(x)</a:t>
             </a:r>
-            <a:endParaRPr lang="en-US" sz="3600" u="none" strike="noStrike" cap="none" dirty="0">
-              <a:solidFill>
-                <a:srgbClr val="FFFF00"/>
-              </a:solidFill>
-              <a:latin typeface="Arial" charset="0"/>
-              <a:ea typeface="Arial" charset="0"/>
-              <a:cs typeface="Arial" charset="0"/>
-              <a:sym typeface="Cabin"/>
-            </a:endParaRPr>
           </a:p>
           <a:p>
             <a:pPr marL="0" marR="0" lvl="0" indent="0" algn="l" rtl="0">
@@ -18371,13 +17993,6 @@
   <p:clrMapOvr>
     <a:masterClrMapping/>
   </p:clrMapOvr>
-  <p:timing>
-    <p:tnLst>
-      <p:par>
-        <p:cTn xmlns:p14="http://schemas.microsoft.com/office/powerpoint/2010/main" id="1" dur="indefinite" restart="never" nodeType="tmRoot"/>
-      </p:par>
-    </p:tnLst>
-  </p:timing>
 </p:sld>
 </file>
 
@@ -19414,13 +19029,6 @@
   <p:clrMapOvr>
     <a:masterClrMapping/>
   </p:clrMapOvr>
-  <p:timing>
-    <p:tnLst>
-      <p:par>
-        <p:cTn xmlns:p14="http://schemas.microsoft.com/office/powerpoint/2010/main" id="1" dur="indefinite" restart="never" nodeType="tmRoot"/>
-      </p:par>
-    </p:tnLst>
-  </p:timing>
 </p:sld>
 </file>
 
@@ -19551,13 +19159,6 @@
   <p:clrMapOvr>
     <a:masterClrMapping/>
   </p:clrMapOvr>
-  <p:timing>
-    <p:tnLst>
-      <p:par>
-        <p:cTn xmlns:p14="http://schemas.microsoft.com/office/powerpoint/2010/main" id="1" dur="indefinite" restart="never" nodeType="tmRoot"/>
-      </p:par>
-    </p:tnLst>
-  </p:timing>
 </p:sld>
 </file>
 
@@ -19799,13 +19400,6 @@
   <p:clrMapOvr>
     <a:masterClrMapping/>
   </p:clrMapOvr>
-  <p:timing>
-    <p:tnLst>
-      <p:par>
-        <p:cTn xmlns:p14="http://schemas.microsoft.com/office/powerpoint/2010/main" id="1" dur="indefinite" restart="never" nodeType="tmRoot"/>
-      </p:par>
-    </p:tnLst>
-  </p:timing>
 </p:sld>
 </file>
 
@@ -19867,31 +19461,7 @@
                 <a:cs typeface="Courier"/>
                 <a:sym typeface="Courier New"/>
               </a:rPr>
-              <a:t>name = </a:t>
-            </a:r>
-            <a:r>
-              <a:rPr lang="en-US" sz="2800" dirty="0" smtClean="0">
-                <a:solidFill>
-                  <a:srgbClr val="00FF00"/>
-                </a:solidFill>
-                <a:latin typeface="Courier"/>
-                <a:ea typeface="Courier"/>
-                <a:cs typeface="Courier"/>
-                <a:sym typeface="Courier New"/>
-              </a:rPr>
-              <a:t>input(</a:t>
-            </a:r>
-            <a:r>
-              <a:rPr lang="en-US" sz="2800" dirty="0">
-                <a:solidFill>
-                  <a:srgbClr val="00FF00"/>
-                </a:solidFill>
-                <a:latin typeface="Courier"/>
-                <a:ea typeface="Courier"/>
-                <a:cs typeface="Courier"/>
-                <a:sym typeface="Courier New"/>
-              </a:rPr>
-              <a:t>'Enter file:')</a:t>
+              <a:t>name = input('Enter file:')</a:t>
             </a:r>
           </a:p>
           <a:p>
@@ -20771,13 +20341,6 @@
   <p:clrMapOvr>
     <a:masterClrMapping/>
   </p:clrMapOvr>
-  <p:timing>
-    <p:tnLst>
-      <p:par>
-        <p:cTn xmlns:p14="http://schemas.microsoft.com/office/powerpoint/2010/main" id="1" dur="indefinite" restart="never" nodeType="tmRoot"/>
-      </p:par>
-    </p:tnLst>
-  </p:timing>
 </p:sld>
 </file>
 
@@ -20995,8 +20558,8 @@
         </p:nvSpPr>
         <p:spPr>
           <a:xfrm>
-            <a:off x="3346315" y="3482501"/>
-            <a:ext cx="10369686" cy="4182269"/>
+            <a:off x="1617527" y="3336900"/>
+            <a:ext cx="14144308" cy="4182269"/>
           </a:xfrm>
           <a:prstGeom prst="rect">
             <a:avLst/>
@@ -21019,7 +20582,7 @@
               <a:buSzPct val="25000"/>
             </a:pPr>
             <a:r>
-              <a:rPr lang="de-DE" sz="3200" dirty="0" err="1" smtClean="0">
+              <a:rPr lang="de-DE" sz="3200" dirty="0" err="1">
                 <a:solidFill>
                   <a:srgbClr val="FFFF00"/>
                 </a:solidFill>
@@ -21031,7 +20594,7 @@
               <a:t>False</a:t>
             </a:r>
             <a:r>
-              <a:rPr lang="de-DE" sz="3200" dirty="0" smtClean="0">
+              <a:rPr lang="de-DE" sz="3200" dirty="0">
                 <a:solidFill>
                   <a:srgbClr val="FFFF00"/>
                 </a:solidFill>
@@ -21040,10 +20603,10 @@
                 <a:cs typeface="Courier" charset="0"/>
                 <a:sym typeface="Cabin"/>
               </a:rPr>
-              <a:t> 	</a:t>
-            </a:r>
-            <a:r>
-              <a:rPr lang="de-DE" sz="3200" dirty="0" err="1" smtClean="0">
+              <a:t>      </a:t>
+            </a:r>
+            <a:r>
+              <a:rPr lang="de-DE" sz="3200" dirty="0" err="1">
                 <a:solidFill>
                   <a:srgbClr val="FFFF00"/>
                 </a:solidFill>
@@ -21052,10 +20615,10 @@
                 <a:cs typeface="Courier" charset="0"/>
                 <a:sym typeface="Cabin"/>
               </a:rPr>
-              <a:t>class</a:t>
-            </a:r>
-            <a:r>
-              <a:rPr lang="de-DE" sz="3200" dirty="0" smtClean="0">
+              <a:t>await</a:t>
+            </a:r>
+            <a:r>
+              <a:rPr lang="de-DE" sz="3200" dirty="0">
                 <a:solidFill>
                   <a:srgbClr val="FFFF00"/>
                 </a:solidFill>
@@ -21064,10 +20627,10 @@
                 <a:cs typeface="Courier" charset="0"/>
                 <a:sym typeface="Cabin"/>
               </a:rPr>
-              <a:t> 	</a:t>
-            </a:r>
-            <a:r>
-              <a:rPr lang="de-DE" sz="3200" dirty="0" err="1" smtClean="0">
+              <a:t>      </a:t>
+            </a:r>
+            <a:r>
+              <a:rPr lang="de-DE" sz="3200" dirty="0" err="1">
                 <a:solidFill>
                   <a:srgbClr val="FFFF00"/>
                 </a:solidFill>
@@ -21076,10 +20639,10 @@
                 <a:cs typeface="Courier" charset="0"/>
                 <a:sym typeface="Cabin"/>
               </a:rPr>
-              <a:t>return</a:t>
-            </a:r>
-            <a:r>
-              <a:rPr lang="de-DE" sz="3200" dirty="0" smtClean="0">
+              <a:t>else</a:t>
+            </a:r>
+            <a:r>
+              <a:rPr lang="de-DE" sz="3200" dirty="0">
                 <a:solidFill>
                   <a:srgbClr val="FFFF00"/>
                 </a:solidFill>
@@ -21088,10 +20651,10 @@
                 <a:cs typeface="Courier" charset="0"/>
                 <a:sym typeface="Cabin"/>
               </a:rPr>
-              <a:t>	</a:t>
-            </a:r>
-            <a:r>
-              <a:rPr lang="de-DE" sz="3200" dirty="0" err="1" smtClean="0">
+              <a:t>       </a:t>
+            </a:r>
+            <a:r>
+              <a:rPr lang="de-DE" sz="3200" dirty="0" err="1">
                 <a:solidFill>
                   <a:srgbClr val="FFFF00"/>
                 </a:solidFill>
@@ -21100,10 +20663,10 @@
                 <a:cs typeface="Courier" charset="0"/>
                 <a:sym typeface="Cabin"/>
               </a:rPr>
-              <a:t>is</a:t>
-            </a:r>
-            <a:r>
-              <a:rPr lang="de-DE" sz="3200" dirty="0" smtClean="0">
+              <a:t>import</a:t>
+            </a:r>
+            <a:r>
+              <a:rPr lang="de-DE" sz="3200" dirty="0">
                 <a:solidFill>
                   <a:srgbClr val="FFFF00"/>
                 </a:solidFill>
@@ -21112,10 +20675,18 @@
                 <a:cs typeface="Courier" charset="0"/>
                 <a:sym typeface="Cabin"/>
               </a:rPr>
-              <a:t> 		</a:t>
-            </a:r>
-            <a:r>
-              <a:rPr lang="de-DE" sz="3200" dirty="0" err="1" smtClean="0">
+              <a:t>     pass</a:t>
+            </a:r>
+          </a:p>
+          <a:p>
+            <a:pPr lvl="0">
+              <a:buClr>
+                <a:srgbClr val="FFFF00"/>
+              </a:buClr>
+              <a:buSzPct val="25000"/>
+            </a:pPr>
+            <a:r>
+              <a:rPr lang="de-DE" sz="3200" dirty="0">
                 <a:solidFill>
                   <a:srgbClr val="FFFF00"/>
                 </a:solidFill>
@@ -21124,10 +20695,10 @@
                 <a:cs typeface="Courier" charset="0"/>
                 <a:sym typeface="Cabin"/>
               </a:rPr>
-              <a:t>finally</a:t>
-            </a:r>
-            <a:r>
-              <a:rPr lang="de-DE" sz="3200" dirty="0" smtClean="0">
+              <a:t>None       break      </a:t>
+            </a:r>
+            <a:r>
+              <a:rPr lang="de-DE" sz="3200" dirty="0" err="1">
                 <a:solidFill>
                   <a:srgbClr val="FFFF00"/>
                 </a:solidFill>
@@ -21136,18 +20707,10 @@
                 <a:cs typeface="Courier" charset="0"/>
                 <a:sym typeface="Cabin"/>
               </a:rPr>
-              <a:t> </a:t>
-            </a:r>
-          </a:p>
-          <a:p>
-            <a:pPr lvl="0">
-              <a:buClr>
-                <a:srgbClr val="FFFF00"/>
-              </a:buClr>
-              <a:buSzPct val="25000"/>
-            </a:pPr>
-            <a:r>
-              <a:rPr lang="de-DE" sz="3200" dirty="0" smtClean="0">
+              <a:t>except</a:t>
+            </a:r>
+            <a:r>
+              <a:rPr lang="de-DE" sz="3200" dirty="0">
                 <a:solidFill>
                   <a:srgbClr val="FFFF00"/>
                 </a:solidFill>
@@ -21156,10 +20719,10 @@
                 <a:cs typeface="Courier" charset="0"/>
                 <a:sym typeface="Cabin"/>
               </a:rPr>
-              <a:t>None 	</a:t>
-            </a:r>
-            <a:r>
-              <a:rPr lang="de-DE" sz="3200" dirty="0" err="1" smtClean="0">
+              <a:t>     in         </a:t>
+            </a:r>
+            <a:r>
+              <a:rPr lang="de-DE" sz="3200" dirty="0" err="1">
                 <a:solidFill>
                   <a:srgbClr val="FFFF00"/>
                 </a:solidFill>
@@ -21168,197 +20731,9 @@
                 <a:cs typeface="Courier" charset="0"/>
                 <a:sym typeface="Cabin"/>
               </a:rPr>
-              <a:t>if</a:t>
-            </a:r>
-            <a:r>
-              <a:rPr lang="de-DE" sz="3200" dirty="0" smtClean="0">
-                <a:solidFill>
-                  <a:srgbClr val="FFFF00"/>
-                </a:solidFill>
-                <a:latin typeface="Courier" charset="0"/>
-                <a:ea typeface="Courier" charset="0"/>
-                <a:cs typeface="Courier" charset="0"/>
-                <a:sym typeface="Cabin"/>
-              </a:rPr>
-              <a:t>		</a:t>
-            </a:r>
-            <a:r>
-              <a:rPr lang="de-DE" sz="3200" dirty="0" err="1" smtClean="0">
-                <a:solidFill>
-                  <a:srgbClr val="FFFF00"/>
-                </a:solidFill>
-                <a:latin typeface="Courier" charset="0"/>
-                <a:ea typeface="Courier" charset="0"/>
-                <a:cs typeface="Courier" charset="0"/>
-                <a:sym typeface="Cabin"/>
-              </a:rPr>
-              <a:t>for</a:t>
-            </a:r>
-            <a:r>
-              <a:rPr lang="de-DE" sz="3200" dirty="0" smtClean="0">
-                <a:solidFill>
-                  <a:srgbClr val="FFFF00"/>
-                </a:solidFill>
-                <a:latin typeface="Courier" charset="0"/>
-                <a:ea typeface="Courier" charset="0"/>
-                <a:cs typeface="Courier" charset="0"/>
-                <a:sym typeface="Cabin"/>
-              </a:rPr>
-              <a:t> 	</a:t>
-            </a:r>
-            <a:r>
-              <a:rPr lang="de-DE" sz="3200" dirty="0" err="1" smtClean="0">
-                <a:solidFill>
-                  <a:srgbClr val="FFFF00"/>
-                </a:solidFill>
-                <a:latin typeface="Courier" charset="0"/>
-                <a:ea typeface="Courier" charset="0"/>
-                <a:cs typeface="Courier" charset="0"/>
-                <a:sym typeface="Cabin"/>
-              </a:rPr>
-              <a:t>lambda</a:t>
-            </a:r>
-            <a:r>
-              <a:rPr lang="de-DE" sz="3200" dirty="0" smtClean="0">
-                <a:solidFill>
-                  <a:srgbClr val="FFFF00"/>
-                </a:solidFill>
-                <a:latin typeface="Courier" charset="0"/>
-                <a:ea typeface="Courier" charset="0"/>
-                <a:cs typeface="Courier" charset="0"/>
-                <a:sym typeface="Cabin"/>
-              </a:rPr>
-              <a:t> 	</a:t>
-            </a:r>
-            <a:r>
-              <a:rPr lang="de-DE" sz="3200" dirty="0" err="1" smtClean="0">
-                <a:solidFill>
-                  <a:srgbClr val="FFFF00"/>
-                </a:solidFill>
-                <a:latin typeface="Courier" charset="0"/>
-                <a:ea typeface="Courier" charset="0"/>
-                <a:cs typeface="Courier" charset="0"/>
-                <a:sym typeface="Cabin"/>
-              </a:rPr>
-              <a:t>continue</a:t>
-            </a:r>
-            <a:r>
-              <a:rPr lang="de-DE" sz="3200" dirty="0" smtClean="0">
-                <a:solidFill>
-                  <a:srgbClr val="FFFF00"/>
-                </a:solidFill>
-                <a:latin typeface="Courier" charset="0"/>
-                <a:ea typeface="Courier" charset="0"/>
-                <a:cs typeface="Courier" charset="0"/>
-                <a:sym typeface="Cabin"/>
-              </a:rPr>
-              <a:t> </a:t>
-            </a:r>
-          </a:p>
-          <a:p>
-            <a:pPr lvl="0">
-              <a:buClr>
-                <a:srgbClr val="FFFF00"/>
-              </a:buClr>
-              <a:buSzPct val="25000"/>
-            </a:pPr>
-            <a:r>
-              <a:rPr lang="de-DE" sz="3200" dirty="0" smtClean="0">
-                <a:solidFill>
-                  <a:srgbClr val="FFFF00"/>
-                </a:solidFill>
-                <a:latin typeface="Courier" charset="0"/>
-                <a:ea typeface="Courier" charset="0"/>
-                <a:cs typeface="Courier" charset="0"/>
-                <a:sym typeface="Cabin"/>
-              </a:rPr>
-              <a:t>True 	</a:t>
-            </a:r>
-            <a:r>
-              <a:rPr lang="de-DE" sz="3200" dirty="0" err="1" smtClean="0">
-                <a:solidFill>
-                  <a:srgbClr val="FFFF00"/>
-                </a:solidFill>
-                <a:latin typeface="Courier" charset="0"/>
-                <a:ea typeface="Courier" charset="0"/>
-                <a:cs typeface="Courier" charset="0"/>
-                <a:sym typeface="Cabin"/>
-              </a:rPr>
-              <a:t>def</a:t>
-            </a:r>
-            <a:r>
-              <a:rPr lang="de-DE" sz="3200" dirty="0" smtClean="0">
-                <a:solidFill>
-                  <a:srgbClr val="FFFF00"/>
-                </a:solidFill>
-                <a:latin typeface="Courier" charset="0"/>
-                <a:ea typeface="Courier" charset="0"/>
-                <a:cs typeface="Courier" charset="0"/>
-                <a:sym typeface="Cabin"/>
-              </a:rPr>
-              <a:t> 	</a:t>
-            </a:r>
-            <a:r>
-              <a:rPr lang="de-DE" sz="3200" dirty="0" err="1" smtClean="0">
-                <a:solidFill>
-                  <a:srgbClr val="FFFF00"/>
-                </a:solidFill>
-                <a:latin typeface="Courier" charset="0"/>
-                <a:ea typeface="Courier" charset="0"/>
-                <a:cs typeface="Courier" charset="0"/>
-                <a:sym typeface="Cabin"/>
-              </a:rPr>
-              <a:t>from</a:t>
-            </a:r>
-            <a:r>
-              <a:rPr lang="de-DE" sz="3200" dirty="0" smtClean="0">
-                <a:solidFill>
-                  <a:srgbClr val="FFFF00"/>
-                </a:solidFill>
-                <a:latin typeface="Courier" charset="0"/>
-                <a:ea typeface="Courier" charset="0"/>
-                <a:cs typeface="Courier" charset="0"/>
-                <a:sym typeface="Cabin"/>
-              </a:rPr>
-              <a:t> 	</a:t>
-            </a:r>
-            <a:r>
-              <a:rPr lang="de-DE" sz="3200" dirty="0" err="1" smtClean="0">
-                <a:solidFill>
-                  <a:srgbClr val="FFFF00"/>
-                </a:solidFill>
-                <a:latin typeface="Courier" charset="0"/>
-                <a:ea typeface="Courier" charset="0"/>
-                <a:cs typeface="Courier" charset="0"/>
-                <a:sym typeface="Cabin"/>
-              </a:rPr>
-              <a:t>while</a:t>
-            </a:r>
-            <a:r>
-              <a:rPr lang="de-DE" sz="3200" dirty="0" smtClean="0">
-                <a:solidFill>
-                  <a:srgbClr val="FFFF00"/>
-                </a:solidFill>
-                <a:latin typeface="Courier" charset="0"/>
-                <a:ea typeface="Courier" charset="0"/>
-                <a:cs typeface="Courier" charset="0"/>
-                <a:sym typeface="Cabin"/>
-              </a:rPr>
-              <a:t>	</a:t>
-            </a:r>
-            <a:r>
-              <a:rPr lang="de-DE" sz="3200" dirty="0" err="1" smtClean="0">
-                <a:solidFill>
-                  <a:srgbClr val="FFFF00"/>
-                </a:solidFill>
-                <a:latin typeface="Courier" charset="0"/>
-                <a:ea typeface="Courier" charset="0"/>
-                <a:cs typeface="Courier" charset="0"/>
-                <a:sym typeface="Cabin"/>
-              </a:rPr>
-              <a:t>nonlocal</a:t>
-            </a:r>
-            <a:endParaRPr lang="de-DE" sz="3200" dirty="0" smtClean="0">
+              <a:t>raise</a:t>
+            </a:r>
+            <a:endParaRPr lang="de-DE" sz="3200" dirty="0">
               <a:solidFill>
                 <a:srgbClr val="FFFF00"/>
               </a:solidFill>
@@ -21376,7 +20751,7 @@
               <a:buSzPct val="25000"/>
             </a:pPr>
             <a:r>
-              <a:rPr lang="de-DE" sz="3200" dirty="0" err="1" smtClean="0">
+              <a:rPr lang="de-DE" sz="3200" dirty="0">
                 <a:solidFill>
                   <a:srgbClr val="FFFF00"/>
                 </a:solidFill>
@@ -21385,10 +20760,10 @@
                 <a:cs typeface="Courier" charset="0"/>
                 <a:sym typeface="Cabin"/>
               </a:rPr>
-              <a:t>and</a:t>
-            </a:r>
-            <a:r>
-              <a:rPr lang="de-DE" sz="3200" dirty="0" smtClean="0">
+              <a:t>True       </a:t>
+            </a:r>
+            <a:r>
+              <a:rPr lang="de-DE" sz="3200" dirty="0" err="1">
                 <a:solidFill>
                   <a:srgbClr val="FFFF00"/>
                 </a:solidFill>
@@ -21397,10 +20772,10 @@
                 <a:cs typeface="Courier" charset="0"/>
                 <a:sym typeface="Cabin"/>
               </a:rPr>
-              <a:t> 	del 	global 	not 	</a:t>
-            </a:r>
-            <a:r>
-              <a:rPr lang="de-DE" sz="3200" dirty="0" err="1" smtClean="0">
+              <a:t>class</a:t>
+            </a:r>
+            <a:r>
+              <a:rPr lang="de-DE" sz="3200" dirty="0">
                 <a:solidFill>
                   <a:srgbClr val="FFFF00"/>
                 </a:solidFill>
@@ -21409,9 +20784,69 @@
                 <a:cs typeface="Courier" charset="0"/>
                 <a:sym typeface="Cabin"/>
               </a:rPr>
-              <a:t>with</a:t>
-            </a:r>
-            <a:endParaRPr lang="de-DE" sz="3200" dirty="0" smtClean="0">
+              <a:t>      </a:t>
+            </a:r>
+            <a:r>
+              <a:rPr lang="de-DE" sz="3200" dirty="0" err="1">
+                <a:solidFill>
+                  <a:srgbClr val="FFFF00"/>
+                </a:solidFill>
+                <a:latin typeface="Courier" charset="0"/>
+                <a:ea typeface="Courier" charset="0"/>
+                <a:cs typeface="Courier" charset="0"/>
+                <a:sym typeface="Cabin"/>
+              </a:rPr>
+              <a:t>finally</a:t>
+            </a:r>
+            <a:r>
+              <a:rPr lang="de-DE" sz="3200" dirty="0">
+                <a:solidFill>
+                  <a:srgbClr val="FFFF00"/>
+                </a:solidFill>
+                <a:latin typeface="Courier" charset="0"/>
+                <a:ea typeface="Courier" charset="0"/>
+                <a:cs typeface="Courier" charset="0"/>
+                <a:sym typeface="Cabin"/>
+              </a:rPr>
+              <a:t>    </a:t>
+            </a:r>
+            <a:r>
+              <a:rPr lang="de-DE" sz="3200" dirty="0" err="1">
+                <a:solidFill>
+                  <a:srgbClr val="FFFF00"/>
+                </a:solidFill>
+                <a:latin typeface="Courier" charset="0"/>
+                <a:ea typeface="Courier" charset="0"/>
+                <a:cs typeface="Courier" charset="0"/>
+                <a:sym typeface="Cabin"/>
+              </a:rPr>
+              <a:t>is</a:t>
+            </a:r>
+            <a:r>
+              <a:rPr lang="de-DE" sz="3200" dirty="0">
+                <a:solidFill>
+                  <a:srgbClr val="FFFF00"/>
+                </a:solidFill>
+                <a:latin typeface="Courier" charset="0"/>
+                <a:ea typeface="Courier" charset="0"/>
+                <a:cs typeface="Courier" charset="0"/>
+                <a:sym typeface="Cabin"/>
+              </a:rPr>
+              <a:t>         </a:t>
+            </a:r>
+            <a:r>
+              <a:rPr lang="de-DE" sz="3200" dirty="0" err="1">
+                <a:solidFill>
+                  <a:srgbClr val="FFFF00"/>
+                </a:solidFill>
+                <a:latin typeface="Courier" charset="0"/>
+                <a:ea typeface="Courier" charset="0"/>
+                <a:cs typeface="Courier" charset="0"/>
+                <a:sym typeface="Cabin"/>
+              </a:rPr>
+              <a:t>return</a:t>
+            </a:r>
+            <a:endParaRPr lang="de-DE" sz="3200" dirty="0">
               <a:solidFill>
                 <a:srgbClr val="FFFF00"/>
               </a:solidFill>
@@ -21429,7 +20864,7 @@
               <a:buSzPct val="25000"/>
             </a:pPr>
             <a:r>
-              <a:rPr lang="de-DE" sz="3200" dirty="0" err="1" smtClean="0">
+              <a:rPr lang="de-DE" sz="3200" dirty="0">
                 <a:solidFill>
                   <a:srgbClr val="FFFF00"/>
                 </a:solidFill>
@@ -21438,10 +20873,10 @@
                 <a:cs typeface="Courier" charset="0"/>
                 <a:sym typeface="Cabin"/>
               </a:rPr>
-              <a:t>as</a:t>
-            </a:r>
-            <a:r>
-              <a:rPr lang="de-DE" sz="3200" dirty="0" smtClean="0">
+              <a:t>and        </a:t>
+            </a:r>
+            <a:r>
+              <a:rPr lang="de-DE" sz="3200" dirty="0" err="1">
                 <a:solidFill>
                   <a:srgbClr val="FFFF00"/>
                 </a:solidFill>
@@ -21450,10 +20885,10 @@
                 <a:cs typeface="Courier" charset="0"/>
                 <a:sym typeface="Cabin"/>
               </a:rPr>
-              <a:t>  	</a:t>
-            </a:r>
-            <a:r>
-              <a:rPr lang="de-DE" sz="3200" dirty="0" err="1" smtClean="0">
+              <a:t>continue</a:t>
+            </a:r>
+            <a:r>
+              <a:rPr lang="de-DE" sz="3200" dirty="0">
                 <a:solidFill>
                   <a:srgbClr val="FFFF00"/>
                 </a:solidFill>
@@ -21462,10 +20897,10 @@
                 <a:cs typeface="Courier" charset="0"/>
                 <a:sym typeface="Cabin"/>
               </a:rPr>
-              <a:t>elif</a:t>
-            </a:r>
-            <a:r>
-              <a:rPr lang="de-DE" sz="3200" dirty="0" smtClean="0">
+              <a:t>   </a:t>
+            </a:r>
+            <a:r>
+              <a:rPr lang="de-DE" sz="3200" dirty="0" err="1">
                 <a:solidFill>
                   <a:srgbClr val="FFFF00"/>
                 </a:solidFill>
@@ -21474,10 +20909,10 @@
                 <a:cs typeface="Courier" charset="0"/>
                 <a:sym typeface="Cabin"/>
               </a:rPr>
-              <a:t> 	</a:t>
-            </a:r>
-            <a:r>
-              <a:rPr lang="de-DE" sz="3200" dirty="0" err="1" smtClean="0">
+              <a:t>for</a:t>
+            </a:r>
+            <a:r>
+              <a:rPr lang="de-DE" sz="3200" dirty="0">
                 <a:solidFill>
                   <a:srgbClr val="FFFF00"/>
                 </a:solidFill>
@@ -21486,10 +20921,10 @@
                 <a:cs typeface="Courier" charset="0"/>
                 <a:sym typeface="Cabin"/>
               </a:rPr>
-              <a:t>try</a:t>
-            </a:r>
-            <a:r>
-              <a:rPr lang="de-DE" sz="3200" dirty="0" smtClean="0">
+              <a:t>        </a:t>
+            </a:r>
+            <a:r>
+              <a:rPr lang="de-DE" sz="3200" dirty="0" err="1">
                 <a:solidFill>
                   <a:srgbClr val="FFFF00"/>
                 </a:solidFill>
@@ -21498,10 +20933,10 @@
                 <a:cs typeface="Courier" charset="0"/>
                 <a:sym typeface="Cabin"/>
               </a:rPr>
-              <a:t>		</a:t>
-            </a:r>
-            <a:r>
-              <a:rPr lang="de-DE" sz="3200" dirty="0" err="1" smtClean="0">
+              <a:t>lambda</a:t>
+            </a:r>
+            <a:r>
+              <a:rPr lang="de-DE" sz="3200" dirty="0">
                 <a:solidFill>
                   <a:srgbClr val="FFFF00"/>
                 </a:solidFill>
@@ -21510,10 +20945,10 @@
                 <a:cs typeface="Courier" charset="0"/>
                 <a:sym typeface="Cabin"/>
               </a:rPr>
-              <a:t>or</a:t>
-            </a:r>
-            <a:r>
-              <a:rPr lang="de-DE" sz="3200" dirty="0" smtClean="0">
+              <a:t>     </a:t>
+            </a:r>
+            <a:r>
+              <a:rPr lang="de-DE" sz="3200" dirty="0" err="1">
                 <a:solidFill>
                   <a:srgbClr val="FFFF00"/>
                 </a:solidFill>
@@ -21522,21 +20957,9 @@
                 <a:cs typeface="Courier" charset="0"/>
                 <a:sym typeface="Cabin"/>
               </a:rPr>
-              <a:t> 		</a:t>
-            </a:r>
-            <a:r>
-              <a:rPr lang="de-DE" sz="3200" dirty="0" err="1" smtClean="0">
-                <a:solidFill>
-                  <a:srgbClr val="FFFF00"/>
-                </a:solidFill>
-                <a:latin typeface="Courier" charset="0"/>
-                <a:ea typeface="Courier" charset="0"/>
-                <a:cs typeface="Courier" charset="0"/>
-                <a:sym typeface="Cabin"/>
-              </a:rPr>
-              <a:t>yield</a:t>
-            </a:r>
-            <a:endParaRPr lang="de-DE" sz="3200" dirty="0" smtClean="0">
+              <a:t>try</a:t>
+            </a:r>
+            <a:endParaRPr lang="de-DE" sz="3200" dirty="0">
               <a:solidFill>
                 <a:srgbClr val="FFFF00"/>
               </a:solidFill>
@@ -21554,7 +20977,7 @@
               <a:buSzPct val="25000"/>
             </a:pPr>
             <a:r>
-              <a:rPr lang="de-DE" sz="3200" dirty="0" err="1" smtClean="0">
+              <a:rPr lang="de-DE" sz="3200" dirty="0" err="1">
                 <a:solidFill>
                   <a:srgbClr val="FFFF00"/>
                 </a:solidFill>
@@ -21563,10 +20986,10 @@
                 <a:cs typeface="Courier" charset="0"/>
                 <a:sym typeface="Cabin"/>
               </a:rPr>
-              <a:t>assert</a:t>
-            </a:r>
-            <a:r>
-              <a:rPr lang="de-DE" sz="3200" dirty="0" smtClean="0">
+              <a:t>as</a:t>
+            </a:r>
+            <a:r>
+              <a:rPr lang="de-DE" sz="3200" dirty="0">
                 <a:solidFill>
                   <a:srgbClr val="FFFF00"/>
                 </a:solidFill>
@@ -21575,10 +20998,10 @@
                 <a:cs typeface="Courier" charset="0"/>
                 <a:sym typeface="Cabin"/>
               </a:rPr>
-              <a:t> 	</a:t>
-            </a:r>
-            <a:r>
-              <a:rPr lang="de-DE" sz="3200" dirty="0" err="1" smtClean="0">
+              <a:t>         </a:t>
+            </a:r>
+            <a:r>
+              <a:rPr lang="de-DE" sz="3200" dirty="0" err="1">
                 <a:solidFill>
                   <a:srgbClr val="FFFF00"/>
                 </a:solidFill>
@@ -21587,10 +21010,10 @@
                 <a:cs typeface="Courier" charset="0"/>
                 <a:sym typeface="Cabin"/>
               </a:rPr>
-              <a:t>else</a:t>
-            </a:r>
-            <a:r>
-              <a:rPr lang="de-DE" sz="3200" dirty="0" smtClean="0">
+              <a:t>def</a:t>
+            </a:r>
+            <a:r>
+              <a:rPr lang="de-DE" sz="3200" dirty="0">
                 <a:solidFill>
                   <a:srgbClr val="FFFF00"/>
                 </a:solidFill>
@@ -21599,10 +21022,10 @@
                 <a:cs typeface="Courier" charset="0"/>
                 <a:sym typeface="Cabin"/>
               </a:rPr>
-              <a:t> 	</a:t>
-            </a:r>
-            <a:r>
-              <a:rPr lang="de-DE" sz="3200" dirty="0" err="1" smtClean="0">
+              <a:t>        </a:t>
+            </a:r>
+            <a:r>
+              <a:rPr lang="de-DE" sz="3200" dirty="0" err="1">
                 <a:solidFill>
                   <a:srgbClr val="FFFF00"/>
                 </a:solidFill>
@@ -21611,10 +21034,10 @@
                 <a:cs typeface="Courier" charset="0"/>
                 <a:sym typeface="Cabin"/>
               </a:rPr>
-              <a:t>import</a:t>
-            </a:r>
-            <a:r>
-              <a:rPr lang="de-DE" sz="3200" dirty="0" smtClean="0">
+              <a:t>from</a:t>
+            </a:r>
+            <a:r>
+              <a:rPr lang="de-DE" sz="3200" dirty="0">
                 <a:solidFill>
                   <a:srgbClr val="FFFF00"/>
                 </a:solidFill>
@@ -21623,18 +21046,10 @@
                 <a:cs typeface="Courier" charset="0"/>
                 <a:sym typeface="Cabin"/>
               </a:rPr>
-              <a:t> 	pass</a:t>
-            </a:r>
-          </a:p>
-          <a:p>
-            <a:pPr lvl="0">
-              <a:buClr>
-                <a:srgbClr val="FFFF00"/>
-              </a:buClr>
-              <a:buSzPct val="25000"/>
-            </a:pPr>
-            <a:r>
-              <a:rPr lang="de-DE" sz="3200" dirty="0" smtClean="0">
+              <a:t>       </a:t>
+            </a:r>
+            <a:r>
+              <a:rPr lang="de-DE" sz="3200" dirty="0" err="1">
                 <a:solidFill>
                   <a:srgbClr val="FFFF00"/>
                 </a:solidFill>
@@ -21643,10 +21058,10 @@
                 <a:cs typeface="Courier" charset="0"/>
                 <a:sym typeface="Cabin"/>
               </a:rPr>
-              <a:t>break 	</a:t>
-            </a:r>
-            <a:r>
-              <a:rPr lang="de-DE" sz="3200" dirty="0" err="1" smtClean="0">
+              <a:t>nonlocal</a:t>
+            </a:r>
+            <a:r>
+              <a:rPr lang="de-DE" sz="3200" dirty="0">
                 <a:solidFill>
                   <a:srgbClr val="FFFF00"/>
                 </a:solidFill>
@@ -21655,10 +21070,10 @@
                 <a:cs typeface="Courier" charset="0"/>
                 <a:sym typeface="Cabin"/>
               </a:rPr>
-              <a:t>except</a:t>
-            </a:r>
-            <a:r>
-              <a:rPr lang="de-DE" sz="3200" dirty="0" smtClean="0">
+              <a:t>   </a:t>
+            </a:r>
+            <a:r>
+              <a:rPr lang="de-DE" sz="3200" dirty="0" err="1">
                 <a:solidFill>
                   <a:srgbClr val="FFFF00"/>
                 </a:solidFill>
@@ -21667,10 +21082,27 @@
                 <a:cs typeface="Courier" charset="0"/>
                 <a:sym typeface="Cabin"/>
               </a:rPr>
-              <a:t> 	in 		</a:t>
-            </a:r>
-            <a:r>
-              <a:rPr lang="de-DE" sz="3200" dirty="0" err="1" smtClean="0">
+              <a:t>while</a:t>
+            </a:r>
+            <a:endParaRPr lang="de-DE" sz="3200" dirty="0">
+              <a:solidFill>
+                <a:srgbClr val="FFFF00"/>
+              </a:solidFill>
+              <a:latin typeface="Courier" charset="0"/>
+              <a:ea typeface="Courier" charset="0"/>
+              <a:cs typeface="Courier" charset="0"/>
+              <a:sym typeface="Cabin"/>
+            </a:endParaRPr>
+          </a:p>
+          <a:p>
+            <a:pPr lvl="0">
+              <a:buClr>
+                <a:srgbClr val="FFFF00"/>
+              </a:buClr>
+              <a:buSzPct val="25000"/>
+            </a:pPr>
+            <a:r>
+              <a:rPr lang="de-DE" sz="3200" dirty="0" err="1">
                 <a:solidFill>
                   <a:srgbClr val="FFFF00"/>
                 </a:solidFill>
@@ -21679,7 +21111,156 @@
                 <a:cs typeface="Courier" charset="0"/>
                 <a:sym typeface="Cabin"/>
               </a:rPr>
-              <a:t>raise</a:t>
+              <a:t>assert</a:t>
+            </a:r>
+            <a:r>
+              <a:rPr lang="de-DE" sz="3200" dirty="0">
+                <a:solidFill>
+                  <a:srgbClr val="FFFF00"/>
+                </a:solidFill>
+                <a:latin typeface="Courier" charset="0"/>
+                <a:ea typeface="Courier" charset="0"/>
+                <a:cs typeface="Courier" charset="0"/>
+                <a:sym typeface="Cabin"/>
+              </a:rPr>
+              <a:t>     del        global     not        </a:t>
+            </a:r>
+            <a:r>
+              <a:rPr lang="de-DE" sz="3200" dirty="0" err="1">
+                <a:solidFill>
+                  <a:srgbClr val="FFFF00"/>
+                </a:solidFill>
+                <a:latin typeface="Courier" charset="0"/>
+                <a:ea typeface="Courier" charset="0"/>
+                <a:cs typeface="Courier" charset="0"/>
+                <a:sym typeface="Cabin"/>
+              </a:rPr>
+              <a:t>with</a:t>
+            </a:r>
+            <a:endParaRPr lang="de-DE" sz="3200" dirty="0">
+              <a:solidFill>
+                <a:srgbClr val="FFFF00"/>
+              </a:solidFill>
+              <a:latin typeface="Courier" charset="0"/>
+              <a:ea typeface="Courier" charset="0"/>
+              <a:cs typeface="Courier" charset="0"/>
+              <a:sym typeface="Cabin"/>
+            </a:endParaRPr>
+          </a:p>
+          <a:p>
+            <a:pPr lvl="0">
+              <a:buClr>
+                <a:srgbClr val="FFFF00"/>
+              </a:buClr>
+              <a:buSzPct val="25000"/>
+            </a:pPr>
+            <a:r>
+              <a:rPr lang="de-DE" sz="3200" dirty="0" err="1">
+                <a:solidFill>
+                  <a:srgbClr val="FFFF00"/>
+                </a:solidFill>
+                <a:latin typeface="Courier" charset="0"/>
+                <a:ea typeface="Courier" charset="0"/>
+                <a:cs typeface="Courier" charset="0"/>
+                <a:sym typeface="Cabin"/>
+              </a:rPr>
+              <a:t>async</a:t>
+            </a:r>
+            <a:r>
+              <a:rPr lang="de-DE" sz="3200" dirty="0">
+                <a:solidFill>
+                  <a:srgbClr val="FFFF00"/>
+                </a:solidFill>
+                <a:latin typeface="Courier" charset="0"/>
+                <a:ea typeface="Courier" charset="0"/>
+                <a:cs typeface="Courier" charset="0"/>
+                <a:sym typeface="Cabin"/>
+              </a:rPr>
+              <a:t>      </a:t>
+            </a:r>
+            <a:r>
+              <a:rPr lang="de-DE" sz="3200" dirty="0" err="1">
+                <a:solidFill>
+                  <a:srgbClr val="FFFF00"/>
+                </a:solidFill>
+                <a:latin typeface="Courier" charset="0"/>
+                <a:ea typeface="Courier" charset="0"/>
+                <a:cs typeface="Courier" charset="0"/>
+                <a:sym typeface="Cabin"/>
+              </a:rPr>
+              <a:t>elif</a:t>
+            </a:r>
+            <a:r>
+              <a:rPr lang="de-DE" sz="3200" dirty="0">
+                <a:solidFill>
+                  <a:srgbClr val="FFFF00"/>
+                </a:solidFill>
+                <a:latin typeface="Courier" charset="0"/>
+                <a:ea typeface="Courier" charset="0"/>
+                <a:cs typeface="Courier" charset="0"/>
+                <a:sym typeface="Cabin"/>
+              </a:rPr>
+              <a:t>       </a:t>
+            </a:r>
+            <a:r>
+              <a:rPr lang="de-DE" sz="3200" dirty="0" err="1">
+                <a:solidFill>
+                  <a:srgbClr val="FFFF00"/>
+                </a:solidFill>
+                <a:latin typeface="Courier" charset="0"/>
+                <a:ea typeface="Courier" charset="0"/>
+                <a:cs typeface="Courier" charset="0"/>
+                <a:sym typeface="Cabin"/>
+              </a:rPr>
+              <a:t>if</a:t>
+            </a:r>
+            <a:r>
+              <a:rPr lang="de-DE" sz="3200" dirty="0">
+                <a:solidFill>
+                  <a:srgbClr val="FFFF00"/>
+                </a:solidFill>
+                <a:latin typeface="Courier" charset="0"/>
+                <a:ea typeface="Courier" charset="0"/>
+                <a:cs typeface="Courier" charset="0"/>
+                <a:sym typeface="Cabin"/>
+              </a:rPr>
+              <a:t>         </a:t>
+            </a:r>
+            <a:r>
+              <a:rPr lang="de-DE" sz="3200" dirty="0" err="1">
+                <a:solidFill>
+                  <a:srgbClr val="FFFF00"/>
+                </a:solidFill>
+                <a:latin typeface="Courier" charset="0"/>
+                <a:ea typeface="Courier" charset="0"/>
+                <a:cs typeface="Courier" charset="0"/>
+                <a:sym typeface="Cabin"/>
+              </a:rPr>
+              <a:t>or</a:t>
+            </a:r>
+            <a:r>
+              <a:rPr lang="de-DE" sz="3200" dirty="0">
+                <a:solidFill>
+                  <a:srgbClr val="FFFF00"/>
+                </a:solidFill>
+                <a:latin typeface="Courier" charset="0"/>
+                <a:ea typeface="Courier" charset="0"/>
+                <a:cs typeface="Courier" charset="0"/>
+                <a:sym typeface="Cabin"/>
+              </a:rPr>
+              <a:t>         </a:t>
+            </a:r>
+            <a:r>
+              <a:rPr lang="de-DE" sz="3200" dirty="0" err="1">
+                <a:solidFill>
+                  <a:srgbClr val="FFFF00"/>
+                </a:solidFill>
+                <a:latin typeface="Courier" charset="0"/>
+                <a:ea typeface="Courier" charset="0"/>
+                <a:cs typeface="Courier" charset="0"/>
+                <a:sym typeface="Cabin"/>
+              </a:rPr>
+              <a:t>yield</a:t>
             </a:r>
             <a:endParaRPr lang="en-US" sz="3200" u="none" strike="noStrike" cap="none" dirty="0">
               <a:solidFill>
@@ -21698,13 +21279,6 @@
   <p:clrMapOvr>
     <a:masterClrMapping/>
   </p:clrMapOvr>
-  <p:timing>
-    <p:tnLst>
-      <p:par>
-        <p:cTn xmlns:p14="http://schemas.microsoft.com/office/powerpoint/2010/main" id="1" dur="indefinite" restart="never" nodeType="tmRoot"/>
-      </p:par>
-    </p:tnLst>
-  </p:timing>
 </p:sld>
 </file>
 
@@ -22044,7 +21618,7 @@
               <a:t>x</a:t>
             </a:r>
             <a:r>
-              <a:rPr lang="en-US" sz="4800" dirty="0" smtClean="0">
+              <a:rPr lang="en-US" sz="4800" dirty="0">
                 <a:solidFill>
                   <a:srgbClr val="FFFF00"/>
                 </a:solidFill>
@@ -22055,15 +21629,6 @@
               </a:rPr>
               <a:t>)</a:t>
             </a:r>
-            <a:endParaRPr lang="en-US" sz="4800" dirty="0">
-              <a:solidFill>
-                <a:srgbClr val="FFFF00"/>
-              </a:solidFill>
-              <a:latin typeface="Courier"/>
-              <a:ea typeface="Courier"/>
-              <a:cs typeface="Courier"/>
-              <a:sym typeface="Courier New"/>
-            </a:endParaRPr>
           </a:p>
         </p:txBody>
       </p:sp>
@@ -22281,7 +21846,7 @@
               <a:buNone/>
             </a:pPr>
             <a:r>
-              <a:rPr lang="en-US" sz="4200" u="none" strike="noStrike" cap="none" smtClean="0">
+              <a:rPr lang="en-US" sz="4200" u="none" strike="noStrike" cap="none">
                 <a:solidFill>
                   <a:srgbClr val="FFFF00"/>
                 </a:solidFill>
@@ -22530,13 +22095,6 @@
   <p:clrMapOvr>
     <a:masterClrMapping/>
   </p:clrMapOvr>
-  <p:timing>
-    <p:tnLst>
-      <p:par>
-        <p:cTn xmlns:p14="http://schemas.microsoft.com/office/powerpoint/2010/main" id="1" dur="indefinite" restart="never" nodeType="tmRoot"/>
-      </p:par>
-    </p:tnLst>
-  </p:timing>
 </p:sld>
 </file>
 
@@ -22623,13 +22181,6 @@
   <p:clrMapOvr>
     <a:masterClrMapping/>
   </p:clrMapOvr>
-  <p:timing>
-    <p:tnLst>
-      <p:par>
-        <p:cTn xmlns:p14="http://schemas.microsoft.com/office/powerpoint/2010/main" id="1" dur="indefinite" restart="never" nodeType="tmRoot"/>
-      </p:par>
-    </p:tnLst>
-  </p:timing>
 </p:sld>
 </file>
 
@@ -22982,13 +22533,6 @@
   <p:clrMapOvr>
     <a:masterClrMapping/>
   </p:clrMapOvr>
-  <p:timing>
-    <p:tnLst>
-      <p:par>
-        <p:cTn xmlns:p14="http://schemas.microsoft.com/office/powerpoint/2010/main" id="1" dur="indefinite" restart="never" nodeType="tmRoot"/>
-      </p:par>
-    </p:tnLst>
-  </p:timing>
 </p:sld>
 </file>
 
@@ -23219,13 +22763,6 @@
   <p:clrMapOvr>
     <a:masterClrMapping/>
   </p:clrMapOvr>
-  <p:timing>
-    <p:tnLst>
-      <p:par>
-        <p:cTn xmlns:p14="http://schemas.microsoft.com/office/powerpoint/2010/main" id="1" dur="indefinite" restart="never" nodeType="tmRoot"/>
-      </p:par>
-    </p:tnLst>
-  </p:timing>
 </p:sld>
 </file>
 
@@ -23465,31 +23002,7 @@
                 <a:cs typeface="Arial" charset="0"/>
                 <a:sym typeface="Cabin"/>
               </a:rPr>
-              <a:t>Sometimes a step or group of steps </a:t>
-            </a:r>
-            <a:r>
-              <a:rPr lang="en-US" sz="3600" u="none" strike="noStrike" cap="none" dirty="0" smtClean="0">
-                <a:solidFill>
-                  <a:schemeClr val="lt1"/>
-                </a:solidFill>
-                <a:latin typeface="Arial" charset="0"/>
-                <a:ea typeface="Arial" charset="0"/>
-                <a:cs typeface="Arial" charset="0"/>
-                <a:sym typeface="Cabin"/>
-              </a:rPr>
-              <a:t>is </a:t>
-            </a:r>
-            <a:r>
-              <a:rPr lang="en-US" sz="3600" u="none" strike="noStrike" cap="none" dirty="0">
-                <a:solidFill>
-                  <a:schemeClr val="lt1"/>
-                </a:solidFill>
-                <a:latin typeface="Arial" charset="0"/>
-                <a:ea typeface="Arial" charset="0"/>
-                <a:cs typeface="Arial" charset="0"/>
-                <a:sym typeface="Cabin"/>
-              </a:rPr>
-              <a:t>to be </a:t>
+              <a:t>Sometimes a step or group of steps is to be </a:t>
             </a:r>
             <a:r>
               <a:rPr lang="en-US" sz="3600" u="none" strike="noStrike" cap="none" dirty="0">
@@ -23554,13 +23067,6 @@
   <p:clrMapOvr>
     <a:masterClrMapping/>
   </p:clrMapOvr>
-  <p:timing>
-    <p:tnLst>
-      <p:par>
-        <p:cTn xmlns:p14="http://schemas.microsoft.com/office/powerpoint/2010/main" id="1" dur="indefinite" restart="never" nodeType="tmRoot"/>
-      </p:par>
-    </p:tnLst>
-  </p:timing>
 </p:sld>
 </file>
 
@@ -23755,7 +23261,7 @@
               <a:buSzPct val="25000"/>
             </a:pPr>
             <a:r>
-              <a:rPr lang="en-US" sz="3600" u="none" strike="noStrike" cap="none" dirty="0" smtClean="0">
+              <a:rPr lang="en-US" sz="3600" u="none" strike="noStrike" cap="none" dirty="0">
                 <a:solidFill>
                   <a:srgbClr val="FFFF00"/>
                 </a:solidFill>
@@ -23767,7 +23273,7 @@
               <a:t>print(</a:t>
             </a:r>
             <a:r>
-              <a:rPr lang="en-US" sz="3600" u="none" strike="noStrike" cap="none" dirty="0" smtClean="0">
+              <a:rPr lang="en-US" sz="3600" u="none" strike="noStrike" cap="none" dirty="0">
                 <a:solidFill>
                   <a:srgbClr val="00FF00"/>
                 </a:solidFill>
@@ -23839,7 +23345,7 @@
               <a:buSzPct val="25000"/>
             </a:pPr>
             <a:r>
-              <a:rPr lang="en-US" sz="3600" u="none" strike="noStrike" cap="none" dirty="0" smtClean="0">
+              <a:rPr lang="en-US" sz="3600" u="none" strike="noStrike" cap="none" dirty="0">
                 <a:solidFill>
                   <a:srgbClr val="FFFF00"/>
                 </a:solidFill>
@@ -23851,7 +23357,7 @@
               <a:t>print(</a:t>
             </a:r>
             <a:r>
-              <a:rPr lang="en-US" sz="3600" u="none" strike="noStrike" cap="none" dirty="0" smtClean="0">
+              <a:rPr lang="en-US" sz="3600" u="none" strike="noStrike" cap="none" dirty="0">
                 <a:solidFill>
                   <a:srgbClr val="00FF00"/>
                 </a:solidFill>
@@ -23983,7 +23489,7 @@
               <a:buNone/>
             </a:pPr>
             <a:r>
-              <a:rPr lang="en-US" sz="3600" u="none" strike="noStrike" cap="none" dirty="0" smtClean="0">
+              <a:rPr lang="en-US" sz="3600" u="none" strike="noStrike" cap="none" dirty="0">
                 <a:solidFill>
                   <a:srgbClr val="FFFF00"/>
                 </a:solidFill>
@@ -23994,15 +23500,6 @@
               </a:rPr>
               <a:t>  2</a:t>
             </a:r>
-            <a:endParaRPr lang="en-US" sz="3600" u="none" strike="noStrike" cap="none" dirty="0">
-              <a:solidFill>
-                <a:srgbClr val="FFFF00"/>
-              </a:solidFill>
-              <a:latin typeface="Arial" charset="0"/>
-              <a:ea typeface="Arial" charset="0"/>
-              <a:cs typeface="Arial" charset="0"/>
-              <a:sym typeface="Cabin"/>
-            </a:endParaRPr>
           </a:p>
           <a:p>
             <a:pPr marL="0" marR="0" lvl="0" indent="0" algn="l" rtl="0">
@@ -24023,7 +23520,7 @@
               <a:buNone/>
             </a:pPr>
             <a:r>
-              <a:rPr lang="en-US" sz="3600" u="none" strike="noStrike" cap="none" dirty="0" smtClean="0">
+              <a:rPr lang="en-US" sz="3600" u="none" strike="noStrike" cap="none" dirty="0">
                 <a:solidFill>
                   <a:srgbClr val="FFFF00"/>
                 </a:solidFill>
@@ -24034,15 +23531,6 @@
               </a:rPr>
               <a:t>  4</a:t>
             </a:r>
-            <a:endParaRPr lang="en-US" sz="3600" u="none" strike="noStrike" cap="none" dirty="0">
-              <a:solidFill>
-                <a:srgbClr val="FFFF00"/>
-              </a:solidFill>
-              <a:latin typeface="Arial" charset="0"/>
-              <a:ea typeface="Arial" charset="0"/>
-              <a:cs typeface="Arial" charset="0"/>
-              <a:sym typeface="Cabin"/>
-            </a:endParaRPr>
           </a:p>
         </p:txBody>
       </p:sp>
@@ -24158,7 +23646,7 @@
               <a:buNone/>
             </a:pPr>
             <a:r>
-              <a:rPr lang="en-US" sz="3500" u="none" strike="noStrike" cap="none" dirty="0" smtClean="0">
+              <a:rPr lang="en-US" sz="3500" u="none" strike="noStrike" cap="none" dirty="0">
                 <a:solidFill>
                   <a:schemeClr val="lt1"/>
                 </a:solidFill>
@@ -24169,15 +23657,6 @@
               </a:rPr>
               <a:t>print(x)</a:t>
             </a:r>
-            <a:endParaRPr lang="en-US" sz="3500" u="none" strike="noStrike" cap="none" dirty="0">
-              <a:solidFill>
-                <a:schemeClr val="lt1"/>
-              </a:solidFill>
-              <a:latin typeface="Arial" charset="0"/>
-              <a:ea typeface="Arial" charset="0"/>
-              <a:cs typeface="Arial" charset="0"/>
-              <a:sym typeface="Cabin"/>
-            </a:endParaRPr>
           </a:p>
         </p:txBody>
       </p:sp>
@@ -24345,7 +23824,7 @@
               <a:buNone/>
             </a:pPr>
             <a:r>
-              <a:rPr lang="en-US" sz="3500" u="none" strike="noStrike" cap="none" dirty="0" smtClean="0">
+              <a:rPr lang="en-US" sz="3500" u="none" strike="noStrike" cap="none" dirty="0">
                 <a:solidFill>
                   <a:schemeClr val="lt1"/>
                 </a:solidFill>
@@ -24356,15 +23835,6 @@
               </a:rPr>
               <a:t>print(x)</a:t>
             </a:r>
-            <a:endParaRPr lang="en-US" sz="3500" u="none" strike="noStrike" cap="none" dirty="0">
-              <a:solidFill>
-                <a:schemeClr val="lt1"/>
-              </a:solidFill>
-              <a:latin typeface="Arial" charset="0"/>
-              <a:ea typeface="Arial" charset="0"/>
-              <a:cs typeface="Arial" charset="0"/>
-              <a:sym typeface="Cabin"/>
-            </a:endParaRPr>
           </a:p>
         </p:txBody>
       </p:sp>
@@ -24580,13 +24050,6 @@
   <p:clrMapOvr>
     <a:masterClrMapping/>
   </p:clrMapOvr>
-  <p:timing>
-    <p:tnLst>
-      <p:par>
-        <p:cTn xmlns:p14="http://schemas.microsoft.com/office/powerpoint/2010/main" id="1" dur="indefinite" restart="never" nodeType="tmRoot"/>
-      </p:par>
-    </p:tnLst>
-  </p:timing>
 </p:sld>
 </file>
 
@@ -24740,31 +24203,7 @@
                 <a:cs typeface="Arial" charset="0"/>
                 <a:sym typeface="Cabin"/>
               </a:rPr>
-              <a:t>Users see computers as a set of tools - word processor, spreadsheet, map, </a:t>
-            </a:r>
-            <a:r>
-              <a:rPr lang="en-US" sz="3200" u="none" strike="noStrike" cap="none" dirty="0" smtClean="0">
-                <a:solidFill>
-                  <a:schemeClr val="lt1"/>
-                </a:solidFill>
-                <a:latin typeface="Arial" charset="0"/>
-                <a:ea typeface="Arial" charset="0"/>
-                <a:cs typeface="Arial" charset="0"/>
-                <a:sym typeface="Cabin"/>
-              </a:rPr>
-              <a:t>to-do </a:t>
-            </a:r>
-            <a:r>
-              <a:rPr lang="en-US" sz="3200" u="none" strike="noStrike" cap="none" dirty="0">
-                <a:solidFill>
-                  <a:schemeClr val="lt1"/>
-                </a:solidFill>
-                <a:latin typeface="Arial" charset="0"/>
-                <a:ea typeface="Arial" charset="0"/>
-                <a:cs typeface="Arial" charset="0"/>
-                <a:sym typeface="Cabin"/>
-              </a:rPr>
-              <a:t>list, etc.</a:t>
+              <a:t>Users see computers as a set of tools - word processor, spreadsheet, map, to-do list, etc.</a:t>
             </a:r>
           </a:p>
           <a:p>
@@ -24963,13 +24402,6 @@
   <p:clrMapOvr>
     <a:masterClrMapping/>
   </p:clrMapOvr>
-  <p:timing>
-    <p:tnLst>
-      <p:par>
-        <p:cTn xmlns:p14="http://schemas.microsoft.com/office/powerpoint/2010/main" id="1" dur="indefinite" restart="never" nodeType="tmRoot"/>
-      </p:par>
-    </p:tnLst>
-  </p:timing>
 </p:sld>
 </file>
 
@@ -25148,7 +24580,7 @@
               <a:buNone/>
             </a:pPr>
             <a:r>
-              <a:rPr lang="en-US" sz="3600" u="none" strike="noStrike" cap="none" dirty="0" smtClean="0">
+              <a:rPr lang="en-US" sz="3600" u="none" strike="noStrike" cap="none" dirty="0">
                 <a:solidFill>
                   <a:srgbClr val="FFFF00"/>
                 </a:solidFill>
@@ -25159,15 +24591,6 @@
               </a:rPr>
               <a:t>Smaller</a:t>
             </a:r>
-            <a:endParaRPr lang="en-US" sz="3600" u="none" strike="noStrike" cap="none" dirty="0">
-              <a:solidFill>
-                <a:srgbClr val="FFFF00"/>
-              </a:solidFill>
-              <a:latin typeface="Arial" charset="0"/>
-              <a:ea typeface="Arial" charset="0"/>
-              <a:cs typeface="Arial" charset="0"/>
-              <a:sym typeface="Cabin"/>
-            </a:endParaRPr>
           </a:p>
           <a:p>
             <a:pPr marL="0" marR="0" lvl="0" indent="0" algn="l" rtl="0">
@@ -25188,7 +24611,7 @@
               <a:buNone/>
             </a:pPr>
             <a:r>
-              <a:rPr lang="en-US" sz="3600" u="none" strike="noStrike" cap="none" dirty="0" smtClean="0">
+              <a:rPr lang="en-US" sz="3600" u="none" strike="noStrike" cap="none" dirty="0">
                 <a:solidFill>
                   <a:srgbClr val="FFFF00"/>
                 </a:solidFill>
@@ -25199,15 +24622,6 @@
               </a:rPr>
               <a:t>Finis </a:t>
             </a:r>
-            <a:endParaRPr lang="en-US" sz="3600" u="none" strike="noStrike" cap="none" dirty="0">
-              <a:solidFill>
-                <a:srgbClr val="FFFF00"/>
-              </a:solidFill>
-              <a:latin typeface="Arial" charset="0"/>
-              <a:ea typeface="Arial" charset="0"/>
-              <a:cs typeface="Arial" charset="0"/>
-              <a:sym typeface="Cabin"/>
-            </a:endParaRPr>
           </a:p>
         </p:txBody>
       </p:sp>
@@ -25254,7 +24668,7 @@
               <a:buNone/>
             </a:pPr>
             <a:r>
-              <a:rPr lang="en-US" sz="3600" u="none" strike="noStrike" cap="none" dirty="0" smtClean="0">
+              <a:rPr lang="en-US" sz="3600" u="none" strike="noStrike" cap="none" dirty="0">
                 <a:solidFill>
                   <a:schemeClr val="lt1"/>
                 </a:solidFill>
@@ -25279,7 +24693,7 @@
               </a:spcAft>
               <a:buNone/>
             </a:pPr>
-            <a:endParaRPr sz="3600" u="none" strike="noStrike" cap="none" dirty="0" smtClean="0">
+            <a:endParaRPr sz="3600" u="none" strike="noStrike" cap="none" dirty="0">
               <a:solidFill>
                 <a:srgbClr val="FF7F00"/>
               </a:solidFill>
@@ -25308,7 +24722,7 @@
               <a:buNone/>
             </a:pPr>
             <a:r>
-              <a:rPr lang="en-US" sz="2800" u="none" strike="noStrike" cap="none" dirty="0" smtClean="0">
+              <a:rPr lang="en-US" sz="2800" u="none" strike="noStrike" cap="none" dirty="0">
                 <a:solidFill>
                   <a:srgbClr val="00FF00"/>
                 </a:solidFill>
@@ -25339,7 +24753,7 @@
               <a:buNone/>
             </a:pPr>
             <a:r>
-              <a:rPr lang="en-US" sz="2800" u="none" strike="noStrike" cap="none" dirty="0" smtClean="0">
+              <a:rPr lang="en-US" sz="2800" u="none" strike="noStrike" cap="none" dirty="0">
                 <a:solidFill>
                   <a:srgbClr val="FFFF00"/>
                 </a:solidFill>
@@ -25351,7 +24765,7 @@
               <a:t>if</a:t>
             </a:r>
             <a:r>
-              <a:rPr lang="en-US" sz="2800" u="none" strike="noStrike" cap="none" dirty="0" smtClean="0">
+              <a:rPr lang="en-US" sz="2800" u="none" strike="noStrike" cap="none" dirty="0">
                 <a:solidFill>
                   <a:srgbClr val="FF7F00"/>
                 </a:solidFill>
@@ -25363,7 +24777,7 @@
               <a:t> </a:t>
             </a:r>
             <a:r>
-              <a:rPr lang="en-US" sz="2800" u="none" strike="noStrike" cap="none" dirty="0" smtClean="0">
+              <a:rPr lang="en-US" sz="2800" u="none" strike="noStrike" cap="none" dirty="0">
                 <a:solidFill>
                   <a:srgbClr val="00FF00"/>
                 </a:solidFill>
@@ -25383,7 +24797,7 @@
               <a:buSzPct val="25000"/>
             </a:pPr>
             <a:r>
-              <a:rPr lang="en-US" sz="2800" u="none" strike="noStrike" cap="none" dirty="0" smtClean="0">
+              <a:rPr lang="en-US" sz="2800" u="none" strike="noStrike" cap="none" dirty="0">
                 <a:solidFill>
                   <a:srgbClr val="FF7F00"/>
                 </a:solidFill>
@@ -25395,7 +24809,7 @@
               <a:t>    </a:t>
             </a:r>
             <a:r>
-              <a:rPr lang="en-US" sz="2800" u="none" strike="noStrike" cap="none" dirty="0" smtClean="0">
+              <a:rPr lang="en-US" sz="2800" u="none" strike="noStrike" cap="none" dirty="0">
                 <a:solidFill>
                   <a:srgbClr val="FFFF00"/>
                 </a:solidFill>
@@ -25407,7 +24821,7 @@
               <a:t>print(</a:t>
             </a:r>
             <a:r>
-              <a:rPr lang="en-US" sz="2800" u="none" strike="noStrike" cap="none" dirty="0" smtClean="0">
+              <a:rPr lang="en-US" sz="2800" u="none" strike="noStrike" cap="none" dirty="0">
                 <a:solidFill>
                   <a:srgbClr val="00FF00"/>
                 </a:solidFill>
@@ -25419,7 +24833,7 @@
               <a:t>'</a:t>
             </a:r>
             <a:r>
-              <a:rPr lang="en-US" sz="2800" dirty="0" smtClean="0">
+              <a:rPr lang="en-US" sz="2800" dirty="0">
                 <a:solidFill>
                   <a:srgbClr val="00FF00"/>
                 </a:solidFill>
@@ -25431,7 +24845,7 @@
               <a:t>Smaller'</a:t>
             </a:r>
             <a:r>
-              <a:rPr lang="en-US" sz="2800" dirty="0" smtClean="0">
+              <a:rPr lang="en-US" sz="2800" dirty="0">
                 <a:solidFill>
                   <a:srgbClr val="FFFF00"/>
                 </a:solidFill>
@@ -25442,7 +24856,7 @@
               </a:rPr>
               <a:t>)</a:t>
             </a:r>
-            <a:endParaRPr lang="en-US" sz="2800" u="none" strike="noStrike" cap="none" dirty="0" smtClean="0">
+            <a:endParaRPr lang="en-US" sz="2800" u="none" strike="noStrike" cap="none" dirty="0">
               <a:solidFill>
                 <a:srgbClr val="00FF00"/>
               </a:solidFill>
@@ -25471,7 +24885,7 @@
               <a:buNone/>
             </a:pPr>
             <a:r>
-              <a:rPr lang="en-US" sz="2800" u="none" strike="noStrike" cap="none" dirty="0" smtClean="0">
+              <a:rPr lang="en-US" sz="2800" u="none" strike="noStrike" cap="none" dirty="0">
                 <a:solidFill>
                   <a:srgbClr val="FFFF00"/>
                 </a:solidFill>
@@ -25483,7 +24897,7 @@
               <a:t>if</a:t>
             </a:r>
             <a:r>
-              <a:rPr lang="en-US" sz="2800" u="none" strike="noStrike" cap="none" dirty="0" smtClean="0">
+              <a:rPr lang="en-US" sz="2800" u="none" strike="noStrike" cap="none" dirty="0">
                 <a:solidFill>
                   <a:srgbClr val="FF7F00"/>
                 </a:solidFill>
@@ -25495,7 +24909,7 @@
               <a:t> </a:t>
             </a:r>
             <a:r>
-              <a:rPr lang="en-US" sz="2800" u="none" strike="noStrike" cap="none" dirty="0" smtClean="0">
+              <a:rPr lang="en-US" sz="2800" u="none" strike="noStrike" cap="none" dirty="0">
                 <a:solidFill>
                   <a:srgbClr val="00FF00"/>
                 </a:solidFill>
@@ -25515,7 +24929,7 @@
               <a:buSzPct val="25000"/>
             </a:pPr>
             <a:r>
-              <a:rPr lang="en-US" sz="2800" u="none" strike="noStrike" cap="none" dirty="0" smtClean="0">
+              <a:rPr lang="en-US" sz="2800" u="none" strike="noStrike" cap="none" dirty="0">
                 <a:solidFill>
                   <a:srgbClr val="FF7F00"/>
                 </a:solidFill>
@@ -25527,7 +24941,7 @@
               <a:t>    </a:t>
             </a:r>
             <a:r>
-              <a:rPr lang="en-US" sz="2800" u="none" strike="noStrike" cap="none" dirty="0" smtClean="0">
+              <a:rPr lang="en-US" sz="2800" u="none" strike="noStrike" cap="none" dirty="0">
                 <a:solidFill>
                   <a:srgbClr val="FFFF00"/>
                 </a:solidFill>
@@ -25539,7 +24953,7 @@
               <a:t>print(</a:t>
             </a:r>
             <a:r>
-              <a:rPr lang="en-US" sz="2800" u="none" strike="noStrike" cap="none" dirty="0" smtClean="0">
+              <a:rPr lang="en-US" sz="2800" u="none" strike="noStrike" cap="none" dirty="0">
                 <a:solidFill>
                   <a:srgbClr val="00FF00"/>
                 </a:solidFill>
@@ -25551,7 +24965,7 @@
               <a:t>'</a:t>
             </a:r>
             <a:r>
-              <a:rPr lang="en-US" sz="2800" dirty="0" smtClean="0">
+              <a:rPr lang="en-US" sz="2800" dirty="0">
                 <a:solidFill>
                   <a:srgbClr val="00FF00"/>
                 </a:solidFill>
@@ -25563,7 +24977,7 @@
               <a:t>Bigger'</a:t>
             </a:r>
             <a:r>
-              <a:rPr lang="en-US" sz="2800" dirty="0" smtClean="0">
+              <a:rPr lang="en-US" sz="2800" dirty="0">
                 <a:solidFill>
                   <a:srgbClr val="FFFF00"/>
                 </a:solidFill>
@@ -25574,7 +24988,7 @@
               </a:rPr>
               <a:t>)</a:t>
             </a:r>
-            <a:endParaRPr lang="en-US" sz="2800" u="none" strike="noStrike" cap="none" dirty="0" smtClean="0">
+            <a:endParaRPr lang="en-US" sz="2800" u="none" strike="noStrike" cap="none" dirty="0">
               <a:solidFill>
                 <a:srgbClr val="00FF00"/>
               </a:solidFill>
@@ -25597,7 +25011,7 @@
               </a:spcAft>
               <a:buNone/>
             </a:pPr>
-            <a:endParaRPr sz="2800" u="none" strike="noStrike" cap="none" dirty="0" smtClean="0">
+            <a:endParaRPr sz="2800" u="none" strike="noStrike" cap="none" dirty="0">
               <a:solidFill>
                 <a:srgbClr val="00FF00"/>
               </a:solidFill>
@@ -25615,7 +25029,7 @@
               <a:buSzPct val="25000"/>
             </a:pPr>
             <a:r>
-              <a:rPr lang="en-US" sz="2800" u="none" strike="noStrike" cap="none" dirty="0" smtClean="0">
+              <a:rPr lang="en-US" sz="2800" u="none" strike="noStrike" cap="none" dirty="0">
                 <a:solidFill>
                   <a:srgbClr val="FFFF00"/>
                 </a:solidFill>
@@ -25627,7 +25041,7 @@
               <a:t>print(</a:t>
             </a:r>
             <a:r>
-              <a:rPr lang="en-US" sz="2800" u="none" strike="noStrike" cap="none" dirty="0" smtClean="0">
+              <a:rPr lang="en-US" sz="2800" u="none" strike="noStrike" cap="none" dirty="0">
                 <a:solidFill>
                   <a:srgbClr val="00FF00"/>
                 </a:solidFill>
@@ -25639,7 +25053,7 @@
               <a:t>'Finis'</a:t>
             </a:r>
             <a:r>
-              <a:rPr lang="en-US" sz="2800" dirty="0" smtClean="0">
+              <a:rPr lang="en-US" sz="2800" dirty="0">
                 <a:solidFill>
                   <a:srgbClr val="FFFF00"/>
                 </a:solidFill>
@@ -25918,7 +25332,7 @@
               <a:buSzPct val="25000"/>
             </a:pPr>
             <a:r>
-              <a:rPr lang="en-US" sz="3000" u="none" strike="noStrike" cap="none" dirty="0" smtClean="0">
+              <a:rPr lang="en-US" sz="3000" u="none" strike="noStrike" cap="none" dirty="0">
                 <a:solidFill>
                   <a:schemeClr val="lt1"/>
                 </a:solidFill>
@@ -26196,7 +25610,7 @@
               <a:buSzPct val="25000"/>
             </a:pPr>
             <a:r>
-              <a:rPr lang="en-US" sz="3000" u="none" strike="noStrike" cap="none" dirty="0" smtClean="0">
+              <a:rPr lang="en-US" sz="3000" u="none" strike="noStrike" cap="none" dirty="0">
                 <a:solidFill>
                   <a:schemeClr val="lt1"/>
                 </a:solidFill>
@@ -26399,7 +25813,7 @@
               <a:buSzPct val="25000"/>
             </a:pPr>
             <a:r>
-              <a:rPr lang="en-US" sz="3000" u="none" strike="noStrike" cap="none" dirty="0" smtClean="0">
+              <a:rPr lang="en-US" sz="3000" u="none" strike="noStrike" cap="none" dirty="0">
                 <a:solidFill>
                   <a:schemeClr val="lt1"/>
                 </a:solidFill>
@@ -26718,13 +26132,6 @@
   <p:clrMapOvr>
     <a:masterClrMapping/>
   </p:clrMapOvr>
-  <p:timing>
-    <p:tnLst>
-      <p:par>
-        <p:cTn xmlns:p14="http://schemas.microsoft.com/office/powerpoint/2010/main" id="1" dur="indefinite" restart="never" nodeType="tmRoot"/>
-      </p:par>
-    </p:tnLst>
-  </p:timing>
 </p:sld>
 </file>
 
@@ -27264,34 +26671,53 @@
                 <a:cs typeface="Courier" charset="0"/>
                 <a:sym typeface="Cabin"/>
               </a:rPr>
-              <a:t>    </a:t>
-            </a:r>
-            <a:r>
-              <a:rPr lang="en-US" sz="2800" u="none" strike="noStrike" cap="none" dirty="0" smtClean="0">
-                <a:solidFill>
-                  <a:srgbClr val="FFFF00"/>
+              <a:t>    print(</a:t>
+            </a:r>
+            <a:r>
+              <a:rPr lang="en-US" sz="2800" u="none" strike="noStrike" cap="none" dirty="0">
+                <a:solidFill>
+                  <a:srgbClr val="00FF00"/>
                 </a:solidFill>
                 <a:latin typeface="Courier" charset="0"/>
                 <a:ea typeface="Courier" charset="0"/>
                 <a:cs typeface="Courier" charset="0"/>
                 <a:sym typeface="Cabin"/>
               </a:rPr>
-              <a:t>print(</a:t>
-            </a:r>
-            <a:r>
-              <a:rPr lang="en-US" sz="2800" u="none" strike="noStrike" cap="none" dirty="0" smtClean="0">
-                <a:solidFill>
-                  <a:srgbClr val="00FF00"/>
+              <a:t>n</a:t>
+            </a:r>
+            <a:r>
+              <a:rPr lang="en-US" sz="2800" u="none" strike="noStrike" cap="none" dirty="0">
+                <a:solidFill>
+                  <a:srgbClr val="FFFF00"/>
                 </a:solidFill>
                 <a:latin typeface="Courier" charset="0"/>
                 <a:ea typeface="Courier" charset="0"/>
                 <a:cs typeface="Courier" charset="0"/>
                 <a:sym typeface="Cabin"/>
               </a:rPr>
-              <a:t>n</a:t>
-            </a:r>
-            <a:r>
-              <a:rPr lang="en-US" sz="2800" u="none" strike="noStrike" cap="none" dirty="0" smtClean="0">
+              <a:t>)</a:t>
+            </a:r>
+          </a:p>
+          <a:p>
+            <a:pPr marL="0" marR="0" lvl="0" indent="0" algn="l" rtl="0">
+              <a:lnSpc>
+                <a:spcPct val="100000"/>
+              </a:lnSpc>
+              <a:spcBef>
+                <a:spcPts val="0"/>
+              </a:spcBef>
+              <a:spcAft>
+                <a:spcPts val="0"/>
+              </a:spcAft>
+              <a:buClr>
+                <a:srgbClr val="FFFF00"/>
+              </a:buClr>
+              <a:buSzPct val="25000"/>
+              <a:buFont typeface="Cabin"/>
+              <a:buNone/>
+            </a:pPr>
+            <a:r>
+              <a:rPr lang="en-US" sz="2800" u="none" strike="noStrike" cap="none" dirty="0">
                 <a:solidFill>
                   <a:srgbClr val="FFFF00"/>
                 </a:solidFill>
@@ -27300,70 +26726,42 @@
                 <a:cs typeface="Courier" charset="0"/>
                 <a:sym typeface="Cabin"/>
               </a:rPr>
-              <a:t>)</a:t>
-            </a:r>
-            <a:endParaRPr lang="en-US" sz="2800" u="none" strike="noStrike" cap="none" dirty="0">
-              <a:solidFill>
-                <a:srgbClr val="FFFF00"/>
-              </a:solidFill>
-              <a:latin typeface="Courier" charset="0"/>
-              <a:ea typeface="Courier" charset="0"/>
-              <a:cs typeface="Courier" charset="0"/>
-              <a:sym typeface="Cabin"/>
-            </a:endParaRPr>
-          </a:p>
-          <a:p>
-            <a:pPr marL="0" marR="0" lvl="0" indent="0" algn="l" rtl="0">
-              <a:lnSpc>
-                <a:spcPct val="100000"/>
-              </a:lnSpc>
-              <a:spcBef>
-                <a:spcPts val="0"/>
-              </a:spcBef>
-              <a:spcAft>
-                <a:spcPts val="0"/>
-              </a:spcAft>
-              <a:buClr>
-                <a:srgbClr val="FFFF00"/>
-              </a:buClr>
-              <a:buSzPct val="25000"/>
-              <a:buFont typeface="Cabin"/>
-              <a:buNone/>
-            </a:pPr>
+              <a:t>    </a:t>
+            </a:r>
             <a:r>
               <a:rPr lang="en-US" sz="2800" u="none" strike="noStrike" cap="none" dirty="0">
                 <a:solidFill>
-                  <a:srgbClr val="FFFF00"/>
+                  <a:srgbClr val="00FF00"/>
                 </a:solidFill>
                 <a:latin typeface="Courier" charset="0"/>
                 <a:ea typeface="Courier" charset="0"/>
                 <a:cs typeface="Courier" charset="0"/>
                 <a:sym typeface="Cabin"/>
               </a:rPr>
-              <a:t>    </a:t>
-            </a:r>
-            <a:r>
-              <a:rPr lang="en-US" sz="2800" u="none" strike="noStrike" cap="none" dirty="0">
-                <a:solidFill>
-                  <a:srgbClr val="00FF00"/>
+              <a:t>n = n – 1</a:t>
+            </a:r>
+          </a:p>
+          <a:p>
+            <a:pPr lvl="0">
+              <a:buClr>
+                <a:srgbClr val="FFFF00"/>
+              </a:buClr>
+              <a:buSzPct val="25000"/>
+            </a:pPr>
+            <a:r>
+              <a:rPr lang="en-US" sz="2800" dirty="0">
+                <a:solidFill>
+                  <a:srgbClr val="FFFF00"/>
                 </a:solidFill>
                 <a:latin typeface="Courier" charset="0"/>
                 <a:ea typeface="Courier" charset="0"/>
                 <a:cs typeface="Courier" charset="0"/>
                 <a:sym typeface="Cabin"/>
               </a:rPr>
-              <a:t>n = n – 1</a:t>
-            </a:r>
-          </a:p>
-          <a:p>
-            <a:pPr lvl="0">
-              <a:buClr>
-                <a:srgbClr val="FFFF00"/>
-              </a:buClr>
-              <a:buSzPct val="25000"/>
-            </a:pPr>
-            <a:r>
-              <a:rPr lang="en-US" sz="2800" dirty="0">
+              <a:t>p</a:t>
+            </a:r>
+            <a:r>
+              <a:rPr lang="en-US" sz="2800" u="none" strike="noStrike" cap="none" dirty="0">
                 <a:solidFill>
                   <a:srgbClr val="FFFF00"/>
                 </a:solidFill>
@@ -27372,22 +26770,22 @@
                 <a:cs typeface="Courier" charset="0"/>
                 <a:sym typeface="Cabin"/>
               </a:rPr>
-              <a:t>p</a:t>
-            </a:r>
-            <a:r>
-              <a:rPr lang="en-US" sz="2800" u="none" strike="noStrike" cap="none" dirty="0" smtClean="0">
-                <a:solidFill>
-                  <a:srgbClr val="FFFF00"/>
+              <a:t>rint(</a:t>
+            </a:r>
+            <a:r>
+              <a:rPr lang="en-US" sz="2800" u="none" strike="noStrike" cap="none" dirty="0">
+                <a:solidFill>
+                  <a:srgbClr val="00FF00"/>
                 </a:solidFill>
                 <a:latin typeface="Courier" charset="0"/>
                 <a:ea typeface="Courier" charset="0"/>
                 <a:cs typeface="Courier" charset="0"/>
                 <a:sym typeface="Cabin"/>
               </a:rPr>
-              <a:t>rint(</a:t>
-            </a:r>
-            <a:r>
-              <a:rPr lang="en-US" sz="2800" u="none" strike="noStrike" cap="none" dirty="0" smtClean="0">
+              <a:t>'Blastoff</a:t>
+            </a:r>
+            <a:r>
+              <a:rPr lang="en-US" sz="2800" dirty="0">
                 <a:solidFill>
                   <a:srgbClr val="00FF00"/>
                 </a:solidFill>
@@ -27396,41 +26794,20 @@
                 <a:cs typeface="Courier" charset="0"/>
                 <a:sym typeface="Cabin"/>
               </a:rPr>
-              <a:t>'Blastoff</a:t>
-            </a:r>
-            <a:r>
-              <a:rPr lang="en-US" sz="2800" dirty="0" smtClean="0">
-                <a:solidFill>
-                  <a:srgbClr val="00FF00"/>
+              <a:t>!'</a:t>
+            </a:r>
+            <a:r>
+              <a:rPr lang="en-US" sz="2800" b="1" u="none" strike="noStrike" cap="none" dirty="0">
+                <a:solidFill>
+                  <a:srgbClr val="FFFF00"/>
                 </a:solidFill>
                 <a:latin typeface="Courier" charset="0"/>
                 <a:ea typeface="Courier" charset="0"/>
                 <a:cs typeface="Courier" charset="0"/>
                 <a:sym typeface="Cabin"/>
               </a:rPr>
-              <a:t>!'</a:t>
-            </a:r>
-            <a:r>
-              <a:rPr lang="en-US" sz="2800" b="1" u="none" strike="noStrike" cap="none" dirty="0" smtClean="0">
-                <a:solidFill>
-                  <a:srgbClr val="FFFF00"/>
-                </a:solidFill>
-                <a:latin typeface="Courier" charset="0"/>
-                <a:ea typeface="Courier" charset="0"/>
-                <a:cs typeface="Courier" charset="0"/>
-                <a:sym typeface="Cabin"/>
-              </a:rPr>
               <a:t>)</a:t>
             </a:r>
-            <a:endParaRPr lang="en-US" sz="2800" b="1" u="none" strike="noStrike" cap="none" dirty="0">
-              <a:solidFill>
-                <a:srgbClr val="FFFF00"/>
-              </a:solidFill>
-              <a:latin typeface="Courier" charset="0"/>
-              <a:ea typeface="Courier" charset="0"/>
-              <a:cs typeface="Courier" charset="0"/>
-              <a:sym typeface="Cabin"/>
-            </a:endParaRPr>
           </a:p>
         </p:txBody>
       </p:sp>
@@ -27911,19 +27288,7 @@
                 <a:cs typeface="Arial" charset="0"/>
                 <a:sym typeface="Cabin"/>
               </a:rPr>
-              <a:t>a </a:t>
-            </a:r>
-            <a:r>
-              <a:rPr lang="en-US" sz="3200" u="none" strike="noStrike" cap="none" smtClean="0">
-                <a:solidFill>
-                  <a:schemeClr val="lt1"/>
-                </a:solidFill>
-                <a:latin typeface="Arial" charset="0"/>
-                <a:ea typeface="Arial" charset="0"/>
-                <a:cs typeface="Arial" charset="0"/>
-                <a:sym typeface="Cabin"/>
-              </a:rPr>
-              <a:t>loop.</a:t>
+              <a:t>a loop.</a:t>
             </a:r>
             <a:endParaRPr lang="en-US" sz="3200" u="none" strike="noStrike" cap="none" dirty="0">
               <a:solidFill>
@@ -28036,7 +27401,7 @@
               <a:buSzPct val="25000"/>
             </a:pPr>
             <a:r>
-              <a:rPr lang="en-US" sz="3500" u="none" strike="noStrike" cap="none" dirty="0" smtClean="0">
+              <a:rPr lang="en-US" sz="3500" u="none" strike="noStrike" cap="none" dirty="0">
                 <a:solidFill>
                   <a:schemeClr val="lt1"/>
                 </a:solidFill>
@@ -28244,7 +27609,7 @@
               <a:buNone/>
             </a:pPr>
             <a:r>
-              <a:rPr lang="en-US" sz="3500" u="none" strike="noStrike" cap="none" dirty="0" smtClean="0">
+              <a:rPr lang="en-US" sz="3500" u="none" strike="noStrike" cap="none" dirty="0">
                 <a:solidFill>
                   <a:schemeClr val="lt1"/>
                 </a:solidFill>
@@ -28256,7 +27621,7 @@
               <a:t>print(</a:t>
             </a:r>
             <a:r>
-              <a:rPr lang="en-US" sz="3500" u="none" strike="noStrike" cap="none" dirty="0" smtClean="0">
+              <a:rPr lang="en-US" sz="3500" u="none" strike="noStrike" cap="none" dirty="0">
                 <a:solidFill>
                   <a:srgbClr val="FFFFFF"/>
                 </a:solidFill>
@@ -28267,15 +27632,6 @@
               </a:rPr>
               <a:t>n)</a:t>
             </a:r>
-            <a:endParaRPr lang="en-US" sz="3500" u="none" strike="noStrike" cap="none" dirty="0">
-              <a:solidFill>
-                <a:srgbClr val="FFFFFF"/>
-              </a:solidFill>
-              <a:latin typeface="Arial" charset="0"/>
-              <a:ea typeface="Arial" charset="0"/>
-              <a:cs typeface="Arial" charset="0"/>
-              <a:sym typeface="Cabin"/>
-            </a:endParaRPr>
           </a:p>
         </p:txBody>
       </p:sp>
@@ -28414,13 +27770,6 @@
   <p:clrMapOvr>
     <a:masterClrMapping/>
   </p:clrMapOvr>
-  <p:timing>
-    <p:tnLst>
-      <p:par>
-        <p:cTn xmlns:p14="http://schemas.microsoft.com/office/powerpoint/2010/main" id="1" dur="indefinite" restart="never" nodeType="tmRoot"/>
-      </p:par>
-    </p:tnLst>
-  </p:timing>
 </p:sld>
 </file>
 
@@ -28497,7 +27846,7 @@
               <a:t>input</a:t>
             </a:r>
             <a:r>
-              <a:rPr lang="en-US" sz="2800" dirty="0" smtClean="0">
+              <a:rPr lang="en-US" sz="2800" dirty="0">
                 <a:solidFill>
                   <a:srgbClr val="FFFF00"/>
                 </a:solidFill>
@@ -28506,8 +27855,16 @@
                 <a:cs typeface="Courier"/>
                 <a:sym typeface="Courier New"/>
               </a:rPr>
-              <a:t>(</a:t>
-            </a:r>
+              <a:t>('Enter file:')</a:t>
+            </a:r>
+          </a:p>
+          <a:p>
+            <a:pPr lvl="0">
+              <a:buClr>
+                <a:srgbClr val="00FF00"/>
+              </a:buClr>
+              <a:buSzPct val="25000"/>
+            </a:pPr>
             <a:r>
               <a:rPr lang="en-US" sz="2800" dirty="0">
                 <a:solidFill>
@@ -28518,49 +27875,8 @@
                 <a:cs typeface="Courier"/>
                 <a:sym typeface="Courier New"/>
               </a:rPr>
-              <a:t>'Enter file:')</a:t>
-            </a:r>
-          </a:p>
-          <a:p>
-            <a:pPr lvl="0">
-              <a:buClr>
-                <a:srgbClr val="00FF00"/>
-              </a:buClr>
-              <a:buSzPct val="25000"/>
-            </a:pPr>
-            <a:r>
-              <a:rPr lang="en-US" sz="2800" dirty="0">
-                <a:solidFill>
-                  <a:srgbClr val="FFFF00"/>
-                </a:solidFill>
-                <a:latin typeface="Courier"/>
-                <a:ea typeface="Courier"/>
-                <a:cs typeface="Courier"/>
-                <a:sym typeface="Courier New"/>
-              </a:rPr>
-              <a:t>handle = </a:t>
-            </a:r>
-            <a:r>
-              <a:rPr lang="en-US" sz="2800" dirty="0" smtClean="0">
-                <a:solidFill>
-                  <a:srgbClr val="FFFF00"/>
-                </a:solidFill>
-                <a:latin typeface="Courier"/>
-                <a:ea typeface="Courier"/>
-                <a:cs typeface="Courier"/>
-                <a:sym typeface="Courier New"/>
-              </a:rPr>
-              <a:t>open(name, 'r')</a:t>
-            </a:r>
-            <a:endParaRPr lang="en-US" sz="2800" dirty="0">
-              <a:solidFill>
-                <a:srgbClr val="FFFF00"/>
-              </a:solidFill>
-              <a:latin typeface="Courier"/>
-              <a:ea typeface="Courier"/>
-              <a:cs typeface="Courier"/>
-              <a:sym typeface="Courier New"/>
-            </a:endParaRPr>
+              <a:t>handle = open(name, 'r')</a:t>
+            </a:r>
           </a:p>
           <a:p>
             <a:pPr lvl="0" algn="ctr"/>
@@ -29260,13 +28576,6 @@
   <p:clrMapOvr>
     <a:masterClrMapping/>
   </p:clrMapOvr>
-  <p:timing>
-    <p:tnLst>
-      <p:par>
-        <p:cTn xmlns:p14="http://schemas.microsoft.com/office/powerpoint/2010/main" id="1" dur="indefinite" restart="never" nodeType="tmRoot"/>
-      </p:par>
-    </p:tnLst>
-  </p:timing>
 </p:sld>
 </file>
 
@@ -29342,7 +28651,7 @@
               <a:t>name = </a:t>
             </a:r>
             <a:r>
-              <a:rPr lang="en-US" sz="2800" i="0" u="none" strike="noStrike" cap="none" dirty="0" smtClean="0">
+              <a:rPr lang="en-US" sz="2800" i="0" u="none" strike="noStrike" cap="none" dirty="0">
                 <a:solidFill>
                   <a:schemeClr val="bg1"/>
                 </a:solidFill>
@@ -29736,7 +29045,7 @@
               <a:buNone/>
             </a:pPr>
             <a:r>
-              <a:rPr lang="en-US" sz="2800" i="0" u="none" strike="noStrike" cap="none" dirty="0" smtClean="0">
+              <a:rPr lang="en-US" sz="2800" i="0" u="none" strike="noStrike" cap="none" dirty="0">
                 <a:solidFill>
                   <a:srgbClr val="00FF00"/>
                 </a:solidFill>
@@ -30055,7 +29364,7 @@
               <a:buNone/>
             </a:pPr>
             <a:r>
-              <a:rPr lang="en-US" sz="2800" i="0" u="none" strike="noStrike" cap="none" dirty="0" smtClean="0">
+              <a:rPr lang="en-US" sz="2800" i="0" u="none" strike="noStrike" cap="none" dirty="0">
                 <a:solidFill>
                   <a:srgbClr val="FFFF00"/>
                 </a:solidFill>
@@ -30067,7 +29376,7 @@
               <a:t>print(</a:t>
             </a:r>
             <a:r>
-              <a:rPr lang="en-US" sz="2800" i="0" u="none" strike="noStrike" cap="none" dirty="0" err="1" smtClean="0">
+              <a:rPr lang="en-US" sz="2800" i="0" u="none" strike="noStrike" cap="none" dirty="0" err="1">
                 <a:solidFill>
                   <a:srgbClr val="FFFF00"/>
                 </a:solidFill>
@@ -30091,7 +29400,7 @@
               <a:t>, </a:t>
             </a:r>
             <a:r>
-              <a:rPr lang="en-US" sz="2800" i="0" u="none" strike="noStrike" cap="none" dirty="0" err="1" smtClean="0">
+              <a:rPr lang="en-US" sz="2800" i="0" u="none" strike="noStrike" cap="none" dirty="0" err="1">
                 <a:solidFill>
                   <a:srgbClr val="FFFF00"/>
                 </a:solidFill>
@@ -30103,7 +29412,7 @@
               <a:t>bigcount</a:t>
             </a:r>
             <a:r>
-              <a:rPr lang="en-US" sz="2800" i="0" u="none" strike="noStrike" cap="none" dirty="0" smtClean="0">
+              <a:rPr lang="en-US" sz="2800" i="0" u="none" strike="noStrike" cap="none" dirty="0">
                 <a:solidFill>
                   <a:srgbClr val="FFFF00"/>
                 </a:solidFill>
@@ -30114,15 +29423,6 @@
               </a:rPr>
               <a:t>)</a:t>
             </a:r>
-            <a:endParaRPr lang="en-US" sz="2800" i="0" u="none" strike="noStrike" cap="none" dirty="0">
-              <a:solidFill>
-                <a:srgbClr val="FFFF00"/>
-              </a:solidFill>
-              <a:latin typeface="Courier"/>
-              <a:ea typeface="Courier"/>
-              <a:cs typeface="Courier"/>
-              <a:sym typeface="Courier New"/>
-            </a:endParaRPr>
           </a:p>
         </p:txBody>
       </p:sp>
@@ -30446,13 +29746,6 @@
   <p:clrMapOvr>
     <a:masterClrMapping/>
   </p:clrMapOvr>
-  <p:timing>
-    <p:tnLst>
-      <p:par>
-        <p:cTn xmlns:p14="http://schemas.microsoft.com/office/powerpoint/2010/main" id="1" dur="indefinite" restart="never" nodeType="tmRoot"/>
-      </p:par>
-    </p:tnLst>
-  </p:timing>
 </p:sld>
 </file>
 
@@ -30670,13 +29963,6 @@
   <p:clrMapOvr>
     <a:masterClrMapping/>
   </p:clrMapOvr>
-  <p:timing>
-    <p:tnLst>
-      <p:par>
-        <p:cTn xmlns:p14="http://schemas.microsoft.com/office/powerpoint/2010/main" id="1" dur="indefinite" restart="never" nodeType="tmRoot"/>
-      </p:par>
-    </p:tnLst>
-  </p:timing>
 </p:sld>
 </file>
 
@@ -30789,23 +30075,7 @@
                   <a:srgbClr val="FFFFFF"/>
                 </a:solidFill>
               </a:rPr>
-              <a:t>) of the University of Michigan School of Information </a:t>
-            </a:r>
-            <a:r>
-              <a:rPr lang="en-US" sz="1800" dirty="0" smtClean="0">
-                <a:solidFill>
-                  <a:srgbClr val="FFFFFF"/>
-                </a:solidFill>
-              </a:rPr>
-              <a:t>and </a:t>
-            </a:r>
-            <a:r>
-              <a:rPr lang="en-US" sz="1800" dirty="0">
-                <a:solidFill>
-                  <a:srgbClr val="FFFFFF"/>
-                </a:solidFill>
-              </a:rPr>
-              <a:t>made available under a Creative Commons Attribution 4.0 License.  Please maintain this last slide in all copies of the document to comply with the attribution requirements of the license.  If you make a change, feel free to add your name and organization to the list of contributors on this page as you republish the materials.</a:t>
+              <a:t>) of the University of Michigan School of Information and made available under a Creative Commons Attribution 4.0 License.  Please maintain this last slide in all copies of the document to comply with the attribution requirements of the license.  If you make a change, feel free to add your name and organization to the list of contributors on this page as you republish the materials.</a:t>
             </a:r>
           </a:p>
           <a:p>
@@ -30945,7 +30215,7 @@
               <a:buNone/>
             </a:pPr>
             <a:r>
-              <a:rPr lang="en-US" sz="1800" dirty="0" smtClean="0">
+              <a:rPr lang="en-US" sz="1800" dirty="0">
                 <a:solidFill>
                   <a:srgbClr val="FFFFFF"/>
                 </a:solidFill>
@@ -30953,7 +30223,7 @@
               <a:t>Continue</a:t>
             </a:r>
             <a:r>
-              <a:rPr lang="is-IS" sz="1800" dirty="0" smtClean="0">
+              <a:rPr lang="is-IS" sz="1800" dirty="0">
                 <a:solidFill>
                   <a:srgbClr val="FFFFFF"/>
                 </a:solidFill>
@@ -30973,13 +30243,6 @@
   <p:clrMapOvr>
     <a:masterClrMapping/>
   </p:clrMapOvr>
-  <p:timing>
-    <p:tnLst>
-      <p:par>
-        <p:cTn xmlns:p14="http://schemas.microsoft.com/office/powerpoint/2010/main" id="1" dur="indefinite" restart="never" nodeType="tmRoot"/>
-      </p:par>
-    </p:tnLst>
-  </p:timing>
 </p:sld>
 </file>
 
@@ -31276,13 +30539,6 @@
   <p:clrMapOvr>
     <a:masterClrMapping/>
   </p:clrMapOvr>
-  <p:timing>
-    <p:tnLst>
-      <p:par>
-        <p:cTn xmlns:p14="http://schemas.microsoft.com/office/powerpoint/2010/main" id="1" dur="indefinite" restart="never" nodeType="tmRoot"/>
-      </p:par>
-    </p:tnLst>
-  </p:timing>
 </p:sld>
 </file>
 
@@ -32065,13 +31321,6 @@
   <p:clrMapOvr>
     <a:masterClrMapping/>
   </p:clrMapOvr>
-  <p:timing>
-    <p:tnLst>
-      <p:par>
-        <p:cTn xmlns:p14="http://schemas.microsoft.com/office/powerpoint/2010/main" id="1" dur="indefinite" restart="never" nodeType="tmRoot"/>
-      </p:par>
-    </p:tnLst>
-  </p:timing>
 </p:sld>
 </file>
 
@@ -32144,31 +31393,7 @@
                 <a:cs typeface="Arial" charset="0"/>
                 <a:sym typeface="Cabin"/>
               </a:rPr>
-              <a:t>What is Code?  Software? </a:t>
-            </a:r>
-            <a:r>
-              <a:rPr lang="en-US" sz="6000" u="none" strike="noStrike" cap="none" dirty="0" smtClean="0">
-                <a:solidFill>
-                  <a:srgbClr val="FFD966"/>
-                </a:solidFill>
-                <a:latin typeface="Arial" charset="0"/>
-                <a:ea typeface="Arial" charset="0"/>
-                <a:cs typeface="Arial" charset="0"/>
-                <a:sym typeface="Cabin"/>
-              </a:rPr>
-              <a:t>A </a:t>
-            </a:r>
-            <a:r>
-              <a:rPr lang="en-US" sz="6000" u="none" strike="noStrike" cap="none" dirty="0">
-                <a:solidFill>
-                  <a:srgbClr val="FFD966"/>
-                </a:solidFill>
-                <a:latin typeface="Arial" charset="0"/>
-                <a:ea typeface="Arial" charset="0"/>
-                <a:cs typeface="Arial" charset="0"/>
-                <a:sym typeface="Cabin"/>
-              </a:rPr>
-              <a:t>Program?</a:t>
+              <a:t>What is Code?  Software? A Program?</a:t>
             </a:r>
           </a:p>
         </p:txBody>
@@ -32276,7 +31501,7 @@
               <a:buNone/>
             </a:pPr>
             <a:r>
-              <a:rPr lang="en-US" sz="3200" u="none" strike="noStrike" cap="none" dirty="0" smtClean="0">
+              <a:rPr lang="en-US" sz="3200" u="none" strike="noStrike" cap="none" dirty="0">
                 <a:solidFill>
                   <a:schemeClr val="lt1"/>
                 </a:solidFill>
@@ -32285,19 +31510,7 @@
                 <a:cs typeface="Arial" charset="0"/>
                 <a:sym typeface="Cabin"/>
               </a:rPr>
-              <a:t>-  We figure </a:t>
-            </a:r>
-            <a:r>
-              <a:rPr lang="en-US" sz="3200" u="none" strike="noStrike" cap="none" dirty="0">
-                <a:solidFill>
-                  <a:schemeClr val="lt1"/>
-                </a:solidFill>
-                <a:latin typeface="Arial" charset="0"/>
-                <a:ea typeface="Arial" charset="0"/>
-                <a:cs typeface="Arial" charset="0"/>
-                <a:sym typeface="Cabin"/>
-              </a:rPr>
-              <a:t>something out and then we encode it and then give it to someone else to save them the time and energy of figuring it out</a:t>
+              <a:t>-  We figure something out and then we encode it and then give it to someone else to save them the time and energy of figuring it out</a:t>
             </a:r>
           </a:p>
           <a:p>
@@ -32350,13 +31563,6 @@
   <p:clrMapOvr>
     <a:masterClrMapping/>
   </p:clrMapOvr>
-  <p:timing>
-    <p:tnLst>
-      <p:par>
-        <p:cTn xmlns:p14="http://schemas.microsoft.com/office/powerpoint/2010/main" id="1" dur="indefinite" restart="never" nodeType="tmRoot"/>
-      </p:par>
-    </p:tnLst>
-  </p:timing>
 </p:sld>
 </file>
 
@@ -32513,13 +31719,6 @@
   <p:clrMapOvr>
     <a:masterClrMapping/>
   </p:clrMapOvr>
-  <p:timing>
-    <p:tnLst>
-      <p:par>
-        <p:cTn xmlns:p14="http://schemas.microsoft.com/office/powerpoint/2010/main" id="1" dur="indefinite" restart="never" nodeType="tmRoot"/>
-      </p:par>
-    </p:tnLst>
-  </p:timing>
 </p:sld>
 </file>
 
@@ -33198,13 +32397,6 @@
   <p:clrMapOvr>
     <a:masterClrMapping/>
   </p:clrMapOvr>
-  <p:timing>
-    <p:tnLst>
-      <p:par>
-        <p:cTn xmlns:p14="http://schemas.microsoft.com/office/powerpoint/2010/main" id="1" dur="indefinite" restart="never" nodeType="tmRoot"/>
-      </p:par>
-    </p:tnLst>
-  </p:timing>
 </p:sld>
 </file>
 

</xml_diff>

<commit_message>
Update the machine code :)
</commit_message>
<xml_diff>
--- a/lectures3/Pythonlearn-01-Intro.pptx
+++ b/lectures3/Pythonlearn-01-Intro.pptx
@@ -15481,8 +15481,17 @@
                 <a:cs typeface="Courier"/>
                 <a:sym typeface="Courier New"/>
               </a:rPr>
-              <a:t>01001001</a:t>
-            </a:r>
+              <a:t>1110010</a:t>
+            </a:r>
+            <a:endParaRPr lang="en-US" sz="2600" b="1" dirty="0">
+              <a:solidFill>
+                <a:schemeClr val="accent4"/>
+              </a:solidFill>
+              <a:latin typeface="Courier"/>
+              <a:ea typeface="Courier"/>
+              <a:cs typeface="Courier"/>
+              <a:sym typeface="Courier New"/>
+            </a:endParaRPr>
           </a:p>
           <a:p>
             <a:pPr marL="0" marR="0" lvl="0" indent="0" algn="ctr" rtl="0">
@@ -15512,7 +15521,7 @@
                 <a:cs typeface="Courier"/>
                 <a:sym typeface="Courier New"/>
               </a:rPr>
-              <a:t>00111001</a:t>
+              <a:t>11101000</a:t>
             </a:r>
           </a:p>
         </p:txBody>

</xml_diff>